<commit_message>
update tables with border attribute value
</commit_message>
<xml_diff>
--- a/Week04/TablesAndIFrames.pptx
+++ b/Week04/TablesAndIFrames.pptx
@@ -5,19 +5,20 @@
     <p:sldMasterId id="2147483664" r:id="rId1"/>
   </p:sldMasterIdLst>
   <p:notesMasterIdLst>
-    <p:notesMasterId r:id="rId12"/>
+    <p:notesMasterId r:id="rId13"/>
   </p:notesMasterIdLst>
   <p:sldIdLst>
     <p:sldId id="257" r:id="rId2"/>
     <p:sldId id="333" r:id="rId3"/>
     <p:sldId id="334" r:id="rId4"/>
     <p:sldId id="335" r:id="rId5"/>
-    <p:sldId id="336" r:id="rId6"/>
-    <p:sldId id="337" r:id="rId7"/>
-    <p:sldId id="338" r:id="rId8"/>
-    <p:sldId id="339" r:id="rId9"/>
-    <p:sldId id="340" r:id="rId10"/>
-    <p:sldId id="341" r:id="rId11"/>
+    <p:sldId id="342" r:id="rId6"/>
+    <p:sldId id="336" r:id="rId7"/>
+    <p:sldId id="337" r:id="rId8"/>
+    <p:sldId id="338" r:id="rId9"/>
+    <p:sldId id="339" r:id="rId10"/>
+    <p:sldId id="340" r:id="rId11"/>
+    <p:sldId id="341" r:id="rId12"/>
   </p:sldIdLst>
   <p:sldSz cx="12192000" cy="6858000"/>
   <p:notesSz cx="6858000" cy="9144000"/>
@@ -206,7 +207,7 @@
           <a:p>
             <a:fld id="{60C6A8C3-8392-4BC1-B99F-0D6991348B0F}" type="datetimeFigureOut">
               <a:rPr lang="en-US" smtClean="0"/>
-              <a:t>2/27/2020</a:t>
+              <a:t>3/13/2020</a:t>
             </a:fld>
             <a:endParaRPr lang="en-US"/>
           </a:p>
@@ -686,44 +687,6 @@
           <a:bodyPr/>
           <a:lstStyle/>
           <a:p>
-            <a:r>
-              <a:rPr lang="en-US" dirty="0" smtClean="0"/>
-              <a:t>Here, ask for the relationships between the different HTML elements.</a:t>
-            </a:r>
-            <a:r>
-              <a:rPr lang="en-US" baseline="0" dirty="0" smtClean="0"/>
-              <a:t> E.g., &lt;</a:t>
-            </a:r>
-            <a:r>
-              <a:rPr lang="en-US" baseline="0" dirty="0" err="1" smtClean="0"/>
-              <a:t>thead</a:t>
-            </a:r>
-            <a:r>
-              <a:rPr lang="en-US" baseline="0" dirty="0" smtClean="0"/>
-              <a:t>&gt; is the parent of &lt;</a:t>
-            </a:r>
-            <a:r>
-              <a:rPr lang="en-US" baseline="0" dirty="0" err="1" smtClean="0"/>
-              <a:t>tr</a:t>
-            </a:r>
-            <a:r>
-              <a:rPr lang="en-US" baseline="0" dirty="0" smtClean="0"/>
-              <a:t>&gt;, grandparent of &lt;</a:t>
-            </a:r>
-            <a:r>
-              <a:rPr lang="en-US" baseline="0" dirty="0" err="1" smtClean="0"/>
-              <a:t>th</a:t>
-            </a:r>
-            <a:r>
-              <a:rPr lang="en-US" baseline="0" dirty="0" smtClean="0"/>
-              <a:t>&gt;, etc.</a:t>
-            </a:r>
-          </a:p>
-          <a:p>
-            <a:r>
-              <a:rPr lang="en-US" baseline="0" dirty="0" smtClean="0"/>
-              <a:t>Show this example in the CodePen</a:t>
-            </a:r>
             <a:endParaRPr lang="en-US" dirty="0"/>
           </a:p>
         </p:txBody>
@@ -754,7 +717,7 @@
     </p:spTree>
     <p:extLst>
       <p:ext uri="{BB962C8B-B14F-4D97-AF65-F5344CB8AC3E}">
-        <p14:creationId xmlns:p14="http://schemas.microsoft.com/office/powerpoint/2010/main" val="2280575702"/>
+        <p14:creationId xmlns:p14="http://schemas.microsoft.com/office/powerpoint/2010/main" val="3835199247"/>
       </p:ext>
     </p:extLst>
   </p:cSld>
@@ -810,7 +773,41 @@
           <a:p>
             <a:r>
               <a:rPr lang="en-US" dirty="0" smtClean="0"/>
-              <a:t>https://codepen.io/jmaxwell/pen/vawRQP</a:t>
+              <a:t>Here, ask for the relationships between the different HTML elements.</a:t>
+            </a:r>
+            <a:r>
+              <a:rPr lang="en-US" baseline="0" dirty="0" smtClean="0"/>
+              <a:t> E.g., &lt;</a:t>
+            </a:r>
+            <a:r>
+              <a:rPr lang="en-US" baseline="0" dirty="0" err="1" smtClean="0"/>
+              <a:t>thead</a:t>
+            </a:r>
+            <a:r>
+              <a:rPr lang="en-US" baseline="0" dirty="0" smtClean="0"/>
+              <a:t>&gt; is the parent of &lt;</a:t>
+            </a:r>
+            <a:r>
+              <a:rPr lang="en-US" baseline="0" dirty="0" err="1" smtClean="0"/>
+              <a:t>tr</a:t>
+            </a:r>
+            <a:r>
+              <a:rPr lang="en-US" baseline="0" dirty="0" smtClean="0"/>
+              <a:t>&gt;, grandparent of &lt;</a:t>
+            </a:r>
+            <a:r>
+              <a:rPr lang="en-US" baseline="0" dirty="0" err="1" smtClean="0"/>
+              <a:t>th</a:t>
+            </a:r>
+            <a:r>
+              <a:rPr lang="en-US" baseline="0" dirty="0" smtClean="0"/>
+              <a:t>&gt;, etc.</a:t>
+            </a:r>
+          </a:p>
+          <a:p>
+            <a:r>
+              <a:rPr lang="en-US" baseline="0" dirty="0" smtClean="0"/>
+              <a:t>Show this example in the CodePen</a:t>
             </a:r>
             <a:endParaRPr lang="en-US" dirty="0"/>
           </a:p>
@@ -842,7 +839,7 @@
     </p:spTree>
     <p:extLst>
       <p:ext uri="{BB962C8B-B14F-4D97-AF65-F5344CB8AC3E}">
-        <p14:creationId xmlns:p14="http://schemas.microsoft.com/office/powerpoint/2010/main" val="1699475900"/>
+        <p14:creationId xmlns:p14="http://schemas.microsoft.com/office/powerpoint/2010/main" val="2280575702"/>
       </p:ext>
     </p:extLst>
   </p:cSld>
@@ -896,6 +893,10 @@
           <a:bodyPr/>
           <a:lstStyle/>
           <a:p>
+            <a:r>
+              <a:rPr lang="en-US" dirty="0" smtClean="0"/>
+              <a:t>https://codepen.io/jmaxwell/pen/vawRQP</a:t>
+            </a:r>
             <a:endParaRPr lang="en-US" dirty="0"/>
           </a:p>
         </p:txBody>
@@ -917,7 +918,7 @@
           <a:p>
             <a:fld id="{34ADFCAE-C707-4D57-8D9E-8616E654C606}" type="slidenum">
               <a:rPr lang="en-US" smtClean="0"/>
-              <a:t>8</a:t>
+              <a:t>7</a:t>
             </a:fld>
             <a:endParaRPr lang="en-US"/>
           </a:p>
@@ -926,7 +927,7 @@
     </p:spTree>
     <p:extLst>
       <p:ext uri="{BB962C8B-B14F-4D97-AF65-F5344CB8AC3E}">
-        <p14:creationId xmlns:p14="http://schemas.microsoft.com/office/powerpoint/2010/main" val="826436011"/>
+        <p14:creationId xmlns:p14="http://schemas.microsoft.com/office/powerpoint/2010/main" val="1699475900"/>
       </p:ext>
     </p:extLst>
   </p:cSld>
@@ -1010,7 +1011,7 @@
     </p:spTree>
     <p:extLst>
       <p:ext uri="{BB962C8B-B14F-4D97-AF65-F5344CB8AC3E}">
-        <p14:creationId xmlns:p14="http://schemas.microsoft.com/office/powerpoint/2010/main" val="879672458"/>
+        <p14:creationId xmlns:p14="http://schemas.microsoft.com/office/powerpoint/2010/main" val="826436011"/>
       </p:ext>
     </p:extLst>
   </p:cSld>
@@ -1064,6 +1065,90 @@
           <a:bodyPr/>
           <a:lstStyle/>
           <a:p>
+            <a:endParaRPr lang="en-US" dirty="0"/>
+          </a:p>
+        </p:txBody>
+      </p:sp>
+      <p:sp>
+        <p:nvSpPr>
+          <p:cNvPr id="4" name="Slide Number Placeholder 3"/>
+          <p:cNvSpPr>
+            <a:spLocks noGrp="1"/>
+          </p:cNvSpPr>
+          <p:nvPr>
+            <p:ph type="sldNum" sz="quarter" idx="10"/>
+          </p:nvPr>
+        </p:nvSpPr>
+        <p:spPr/>
+        <p:txBody>
+          <a:bodyPr/>
+          <a:lstStyle/>
+          <a:p>
+            <a:fld id="{34ADFCAE-C707-4D57-8D9E-8616E654C606}" type="slidenum">
+              <a:rPr lang="en-US" smtClean="0"/>
+              <a:t>10</a:t>
+            </a:fld>
+            <a:endParaRPr lang="en-US"/>
+          </a:p>
+        </p:txBody>
+      </p:sp>
+    </p:spTree>
+    <p:extLst>
+      <p:ext uri="{BB962C8B-B14F-4D97-AF65-F5344CB8AC3E}">
+        <p14:creationId xmlns:p14="http://schemas.microsoft.com/office/powerpoint/2010/main" val="879672458"/>
+      </p:ext>
+    </p:extLst>
+  </p:cSld>
+  <p:clrMapOvr>
+    <a:masterClrMapping/>
+  </p:clrMapOvr>
+</p:notes>
+</file>
+
+<file path=ppt/notesSlides/notesSlide8.xml><?xml version="1.0" encoding="utf-8"?>
+<p:notes xmlns:a="http://schemas.openxmlformats.org/drawingml/2006/main" xmlns:r="http://schemas.openxmlformats.org/officeDocument/2006/relationships" xmlns:p="http://schemas.openxmlformats.org/presentationml/2006/main">
+  <p:cSld>
+    <p:spTree>
+      <p:nvGrpSpPr>
+        <p:cNvPr id="1" name=""/>
+        <p:cNvGrpSpPr/>
+        <p:nvPr/>
+      </p:nvGrpSpPr>
+      <p:grpSpPr>
+        <a:xfrm>
+          <a:off x="0" y="0"/>
+          <a:ext cx="0" cy="0"/>
+          <a:chOff x="0" y="0"/>
+          <a:chExt cx="0" cy="0"/>
+        </a:xfrm>
+      </p:grpSpPr>
+      <p:sp>
+        <p:nvSpPr>
+          <p:cNvPr id="2" name="Slide Image Placeholder 1"/>
+          <p:cNvSpPr>
+            <a:spLocks noGrp="1" noRot="1" noChangeAspect="1"/>
+          </p:cNvSpPr>
+          <p:nvPr>
+            <p:ph type="sldImg"/>
+          </p:nvPr>
+        </p:nvSpPr>
+        <p:spPr/>
+      </p:sp>
+      <p:sp>
+        <p:nvSpPr>
+          <p:cNvPr id="3" name="Notes Placeholder 2"/>
+          <p:cNvSpPr>
+            <a:spLocks noGrp="1"/>
+          </p:cNvSpPr>
+          <p:nvPr>
+            <p:ph type="body" idx="1"/>
+          </p:nvPr>
+        </p:nvSpPr>
+        <p:spPr/>
+        <p:txBody>
+          <a:bodyPr/>
+          <a:lstStyle/>
+          <a:p>
             <a:r>
               <a:rPr lang="en-US" dirty="0" smtClean="0"/>
               <a:t>https://codepen.io/jmaxwell/pen/exvoOR?editors=1000</a:t>
@@ -1089,7 +1174,7 @@
           <a:p>
             <a:fld id="{34ADFCAE-C707-4D57-8D9E-8616E654C606}" type="slidenum">
               <a:rPr lang="en-US" smtClean="0"/>
-              <a:t>10</a:t>
+              <a:t>11</a:t>
             </a:fld>
             <a:endParaRPr lang="en-US"/>
           </a:p>
@@ -1239,7 +1324,7 @@
           <a:p>
             <a:fld id="{61FD5E12-641C-4696-BA65-B86205845F69}" type="datetimeFigureOut">
               <a:rPr lang="en-US" smtClean="0"/>
-              <a:t>2/27/2020</a:t>
+              <a:t>3/13/2020</a:t>
             </a:fld>
             <a:endParaRPr lang="en-US"/>
           </a:p>
@@ -1409,7 +1494,7 @@
           <a:p>
             <a:fld id="{61FD5E12-641C-4696-BA65-B86205845F69}" type="datetimeFigureOut">
               <a:rPr lang="en-US" smtClean="0"/>
-              <a:t>2/27/2020</a:t>
+              <a:t>3/13/2020</a:t>
             </a:fld>
             <a:endParaRPr lang="en-US"/>
           </a:p>
@@ -1589,7 +1674,7 @@
           <a:p>
             <a:fld id="{61FD5E12-641C-4696-BA65-B86205845F69}" type="datetimeFigureOut">
               <a:rPr lang="en-US" smtClean="0"/>
-              <a:t>2/27/2020</a:t>
+              <a:t>3/13/2020</a:t>
             </a:fld>
             <a:endParaRPr lang="en-US"/>
           </a:p>
@@ -2574,7 +2659,7 @@
           <a:p>
             <a:fld id="{61FD5E12-641C-4696-BA65-B86205845F69}" type="datetimeFigureOut">
               <a:rPr lang="en-US" smtClean="0"/>
-              <a:t>2/27/2020</a:t>
+              <a:t>3/13/2020</a:t>
             </a:fld>
             <a:endParaRPr lang="en-US"/>
           </a:p>
@@ -2820,7 +2905,7 @@
           <a:p>
             <a:fld id="{61FD5E12-641C-4696-BA65-B86205845F69}" type="datetimeFigureOut">
               <a:rPr lang="en-US" smtClean="0"/>
-              <a:t>2/27/2020</a:t>
+              <a:t>3/13/2020</a:t>
             </a:fld>
             <a:endParaRPr lang="en-US"/>
           </a:p>
@@ -3052,7 +3137,7 @@
           <a:p>
             <a:fld id="{61FD5E12-641C-4696-BA65-B86205845F69}" type="datetimeFigureOut">
               <a:rPr lang="en-US" smtClean="0"/>
-              <a:t>2/27/2020</a:t>
+              <a:t>3/13/2020</a:t>
             </a:fld>
             <a:endParaRPr lang="en-US"/>
           </a:p>
@@ -3419,7 +3504,7 @@
           <a:p>
             <a:fld id="{61FD5E12-641C-4696-BA65-B86205845F69}" type="datetimeFigureOut">
               <a:rPr lang="en-US" smtClean="0"/>
-              <a:t>2/27/2020</a:t>
+              <a:t>3/13/2020</a:t>
             </a:fld>
             <a:endParaRPr lang="en-US"/>
           </a:p>
@@ -3537,7 +3622,7 @@
           <a:p>
             <a:fld id="{61FD5E12-641C-4696-BA65-B86205845F69}" type="datetimeFigureOut">
               <a:rPr lang="en-US" smtClean="0"/>
-              <a:t>2/27/2020</a:t>
+              <a:t>3/13/2020</a:t>
             </a:fld>
             <a:endParaRPr lang="en-US"/>
           </a:p>
@@ -3632,7 +3717,7 @@
           <a:p>
             <a:fld id="{61FD5E12-641C-4696-BA65-B86205845F69}" type="datetimeFigureOut">
               <a:rPr lang="en-US" smtClean="0"/>
-              <a:t>2/27/2020</a:t>
+              <a:t>3/13/2020</a:t>
             </a:fld>
             <a:endParaRPr lang="en-US"/>
           </a:p>
@@ -3909,7 +3994,7 @@
           <a:p>
             <a:fld id="{61FD5E12-641C-4696-BA65-B86205845F69}" type="datetimeFigureOut">
               <a:rPr lang="en-US" smtClean="0"/>
-              <a:t>2/27/2020</a:t>
+              <a:t>3/13/2020</a:t>
             </a:fld>
             <a:endParaRPr lang="en-US"/>
           </a:p>
@@ -4166,7 +4251,7 @@
           <a:p>
             <a:fld id="{61FD5E12-641C-4696-BA65-B86205845F69}" type="datetimeFigureOut">
               <a:rPr lang="en-US" smtClean="0"/>
-              <a:t>2/27/2020</a:t>
+              <a:t>3/13/2020</a:t>
             </a:fld>
             <a:endParaRPr lang="en-US"/>
           </a:p>
@@ -4379,7 +4464,7 @@
           <a:p>
             <a:fld id="{61FD5E12-641C-4696-BA65-B86205845F69}" type="datetimeFigureOut">
               <a:rPr lang="en-US" smtClean="0"/>
-              <a:t>2/27/2020</a:t>
+              <a:t>3/13/2020</a:t>
             </a:fld>
             <a:endParaRPr lang="en-US"/>
           </a:p>
@@ -4891,6 +4976,429 @@
       </p:grpSpPr>
       <p:sp>
         <p:nvSpPr>
+          <p:cNvPr id="2" name="Text Placeholder 1"/>
+          <p:cNvSpPr>
+            <a:spLocks noGrp="1"/>
+          </p:cNvSpPr>
+          <p:nvPr>
+            <p:ph type="body" sz="quarter" idx="10"/>
+          </p:nvPr>
+        </p:nvSpPr>
+        <p:spPr/>
+        <p:txBody>
+          <a:bodyPr/>
+          <a:lstStyle/>
+          <a:p>
+            <a:r>
+              <a:rPr lang="en-US" dirty="0" err="1" smtClean="0"/>
+              <a:t>IFrame</a:t>
+            </a:r>
+            <a:r>
+              <a:rPr lang="en-US" dirty="0" smtClean="0"/>
+              <a:t> Example</a:t>
+            </a:r>
+            <a:endParaRPr lang="en-US" dirty="0"/>
+          </a:p>
+        </p:txBody>
+      </p:sp>
+      <p:sp>
+        <p:nvSpPr>
+          <p:cNvPr id="3" name="Content Placeholder 2"/>
+          <p:cNvSpPr>
+            <a:spLocks noGrp="1"/>
+          </p:cNvSpPr>
+          <p:nvPr>
+            <p:ph sz="quarter" idx="18"/>
+          </p:nvPr>
+        </p:nvSpPr>
+        <p:spPr>
+          <a:xfrm>
+            <a:off x="405033" y="1201003"/>
+            <a:ext cx="9650516" cy="5513696"/>
+          </a:xfrm>
+        </p:spPr>
+        <p:txBody>
+          <a:bodyPr>
+            <a:normAutofit/>
+          </a:bodyPr>
+          <a:lstStyle/>
+          <a:p>
+            <a:pPr marL="0" indent="0">
+              <a:buNone/>
+            </a:pPr>
+            <a:r>
+              <a:rPr lang="en-US" dirty="0" smtClean="0">
+                <a:solidFill>
+                  <a:srgbClr val="800000"/>
+                </a:solidFill>
+                <a:latin typeface="Consolas" panose="020B0609020204030204" pitchFamily="49" charset="0"/>
+              </a:rPr>
+              <a:t>&lt;</a:t>
+            </a:r>
+            <a:r>
+              <a:rPr lang="en-US" dirty="0">
+                <a:solidFill>
+                  <a:srgbClr val="800000"/>
+                </a:solidFill>
+                <a:latin typeface="Consolas" panose="020B0609020204030204" pitchFamily="49" charset="0"/>
+              </a:rPr>
+              <a:t>iframe</a:t>
+            </a:r>
+            <a:r>
+              <a:rPr lang="en-US" dirty="0">
+                <a:solidFill>
+                  <a:srgbClr val="000000"/>
+                </a:solidFill>
+                <a:latin typeface="Consolas" panose="020B0609020204030204" pitchFamily="49" charset="0"/>
+              </a:rPr>
+              <a:t> </a:t>
+            </a:r>
+            <a:r>
+              <a:rPr lang="en-US" dirty="0" err="1">
+                <a:solidFill>
+                  <a:srgbClr val="FF0000"/>
+                </a:solidFill>
+                <a:latin typeface="Consolas" panose="020B0609020204030204" pitchFamily="49" charset="0"/>
+              </a:rPr>
+              <a:t>src</a:t>
+            </a:r>
+            <a:r>
+              <a:rPr lang="en-US" dirty="0">
+                <a:solidFill>
+                  <a:srgbClr val="000000"/>
+                </a:solidFill>
+                <a:latin typeface="Consolas" panose="020B0609020204030204" pitchFamily="49" charset="0"/>
+              </a:rPr>
+              <a:t>=</a:t>
+            </a:r>
+            <a:r>
+              <a:rPr lang="en-US" dirty="0">
+                <a:solidFill>
+                  <a:srgbClr val="0000FF"/>
+                </a:solidFill>
+                <a:latin typeface="Consolas" panose="020B0609020204030204" pitchFamily="49" charset="0"/>
+              </a:rPr>
+              <a:t>"http://weather.gov"</a:t>
+            </a:r>
+            <a:r>
+              <a:rPr lang="en-US" dirty="0">
+                <a:solidFill>
+                  <a:srgbClr val="800000"/>
+                </a:solidFill>
+                <a:latin typeface="Consolas" panose="020B0609020204030204" pitchFamily="49" charset="0"/>
+              </a:rPr>
+              <a:t>&gt;&lt;/iframe</a:t>
+            </a:r>
+            <a:r>
+              <a:rPr lang="en-US" dirty="0" smtClean="0">
+                <a:solidFill>
+                  <a:srgbClr val="800000"/>
+                </a:solidFill>
+                <a:latin typeface="Consolas" panose="020B0609020204030204" pitchFamily="49" charset="0"/>
+              </a:rPr>
+              <a:t>&gt;</a:t>
+            </a:r>
+          </a:p>
+          <a:p>
+            <a:pPr marL="0" indent="0">
+              <a:buNone/>
+            </a:pPr>
+            <a:endParaRPr lang="en-US" dirty="0">
+              <a:solidFill>
+                <a:srgbClr val="800000"/>
+              </a:solidFill>
+              <a:latin typeface="Consolas" panose="020B0609020204030204" pitchFamily="49" charset="0"/>
+            </a:endParaRPr>
+          </a:p>
+          <a:p>
+            <a:pPr marL="0" indent="0">
+              <a:buNone/>
+            </a:pPr>
+            <a:endParaRPr lang="en-US" dirty="0" smtClean="0">
+              <a:solidFill>
+                <a:srgbClr val="000000"/>
+              </a:solidFill>
+              <a:latin typeface="Consolas" panose="020B0609020204030204" pitchFamily="49" charset="0"/>
+            </a:endParaRPr>
+          </a:p>
+          <a:p>
+            <a:pPr marL="0" indent="0">
+              <a:buNone/>
+            </a:pPr>
+            <a:r>
+              <a:rPr lang="en-US" dirty="0">
+                <a:solidFill>
+                  <a:srgbClr val="800000"/>
+                </a:solidFill>
+                <a:latin typeface="Consolas" panose="020B0609020204030204" pitchFamily="49" charset="0"/>
+              </a:rPr>
+              <a:t>&lt;</a:t>
+            </a:r>
+            <a:r>
+              <a:rPr lang="en-US" dirty="0" smtClean="0">
+                <a:solidFill>
+                  <a:srgbClr val="800000"/>
+                </a:solidFill>
+                <a:latin typeface="Consolas" panose="020B0609020204030204" pitchFamily="49" charset="0"/>
+              </a:rPr>
+              <a:t>iframe</a:t>
+            </a:r>
+            <a:endParaRPr lang="en-US" dirty="0" smtClean="0">
+              <a:solidFill>
+                <a:srgbClr val="000000"/>
+              </a:solidFill>
+              <a:latin typeface="Consolas" panose="020B0609020204030204" pitchFamily="49" charset="0"/>
+            </a:endParaRPr>
+          </a:p>
+          <a:p>
+            <a:pPr marL="0" indent="0">
+              <a:buNone/>
+            </a:pPr>
+            <a:r>
+              <a:rPr lang="en-US" dirty="0">
+                <a:solidFill>
+                  <a:srgbClr val="000000"/>
+                </a:solidFill>
+                <a:latin typeface="Consolas" panose="020B0609020204030204" pitchFamily="49" charset="0"/>
+              </a:rPr>
+              <a:t>	</a:t>
+            </a:r>
+            <a:r>
+              <a:rPr lang="en-US" dirty="0" err="1" smtClean="0">
+                <a:solidFill>
+                  <a:srgbClr val="FF0000"/>
+                </a:solidFill>
+                <a:latin typeface="Consolas" panose="020B0609020204030204" pitchFamily="49" charset="0"/>
+              </a:rPr>
+              <a:t>src</a:t>
+            </a:r>
+            <a:r>
+              <a:rPr lang="en-US" dirty="0" smtClean="0">
+                <a:solidFill>
+                  <a:srgbClr val="000000"/>
+                </a:solidFill>
+                <a:latin typeface="Consolas" panose="020B0609020204030204" pitchFamily="49" charset="0"/>
+              </a:rPr>
+              <a:t>=</a:t>
+            </a:r>
+            <a:r>
+              <a:rPr lang="en-US" dirty="0" smtClean="0">
+                <a:solidFill>
+                  <a:srgbClr val="0000FF"/>
+                </a:solidFill>
+                <a:latin typeface="Consolas" panose="020B0609020204030204" pitchFamily="49" charset="0"/>
+              </a:rPr>
+              <a:t>"http</a:t>
+            </a:r>
+            <a:r>
+              <a:rPr lang="en-US" dirty="0">
+                <a:solidFill>
+                  <a:srgbClr val="0000FF"/>
+                </a:solidFill>
+                <a:latin typeface="Consolas" panose="020B0609020204030204" pitchFamily="49" charset="0"/>
+              </a:rPr>
+              <a:t>://</a:t>
+            </a:r>
+            <a:r>
+              <a:rPr lang="en-US" dirty="0" smtClean="0">
+                <a:solidFill>
+                  <a:srgbClr val="0000FF"/>
+                </a:solidFill>
+                <a:latin typeface="Consolas" panose="020B0609020204030204" pitchFamily="49" charset="0"/>
+              </a:rPr>
+              <a:t>weather.gov"</a:t>
+            </a:r>
+            <a:endParaRPr lang="en-US" dirty="0" smtClean="0">
+              <a:solidFill>
+                <a:srgbClr val="000000"/>
+              </a:solidFill>
+              <a:latin typeface="Consolas" panose="020B0609020204030204" pitchFamily="49" charset="0"/>
+            </a:endParaRPr>
+          </a:p>
+          <a:p>
+            <a:pPr marL="0" indent="0">
+              <a:buNone/>
+            </a:pPr>
+            <a:r>
+              <a:rPr lang="en-US" dirty="0" smtClean="0">
+                <a:solidFill>
+                  <a:srgbClr val="FF0000"/>
+                </a:solidFill>
+                <a:latin typeface="Consolas" panose="020B0609020204030204" pitchFamily="49" charset="0"/>
+              </a:rPr>
+              <a:t>	height</a:t>
+            </a:r>
+            <a:r>
+              <a:rPr lang="en-US" dirty="0">
+                <a:solidFill>
+                  <a:srgbClr val="000000"/>
+                </a:solidFill>
+                <a:latin typeface="Consolas" panose="020B0609020204030204" pitchFamily="49" charset="0"/>
+              </a:rPr>
+              <a:t>=</a:t>
+            </a:r>
+            <a:r>
+              <a:rPr lang="en-US" dirty="0">
+                <a:solidFill>
+                  <a:srgbClr val="0000FF"/>
+                </a:solidFill>
+                <a:latin typeface="Consolas" panose="020B0609020204030204" pitchFamily="49" charset="0"/>
+              </a:rPr>
+              <a:t>"</a:t>
+            </a:r>
+            <a:r>
+              <a:rPr lang="en-US" dirty="0" smtClean="0">
+                <a:solidFill>
+                  <a:srgbClr val="0000FF"/>
+                </a:solidFill>
+                <a:latin typeface="Consolas" panose="020B0609020204030204" pitchFamily="49" charset="0"/>
+              </a:rPr>
+              <a:t>800"</a:t>
+            </a:r>
+            <a:endParaRPr lang="en-US" dirty="0" smtClean="0">
+              <a:solidFill>
+                <a:srgbClr val="000000"/>
+              </a:solidFill>
+              <a:latin typeface="Consolas" panose="020B0609020204030204" pitchFamily="49" charset="0"/>
+            </a:endParaRPr>
+          </a:p>
+          <a:p>
+            <a:pPr marL="0" indent="0">
+              <a:buNone/>
+            </a:pPr>
+            <a:r>
+              <a:rPr lang="en-US" dirty="0">
+                <a:solidFill>
+                  <a:srgbClr val="000000"/>
+                </a:solidFill>
+                <a:latin typeface="Consolas" panose="020B0609020204030204" pitchFamily="49" charset="0"/>
+              </a:rPr>
+              <a:t>	</a:t>
+            </a:r>
+            <a:r>
+              <a:rPr lang="en-US" dirty="0" smtClean="0">
+                <a:solidFill>
+                  <a:srgbClr val="FF0000"/>
+                </a:solidFill>
+                <a:latin typeface="Consolas" panose="020B0609020204030204" pitchFamily="49" charset="0"/>
+              </a:rPr>
+              <a:t>width</a:t>
+            </a:r>
+            <a:r>
+              <a:rPr lang="en-US" dirty="0">
+                <a:solidFill>
+                  <a:srgbClr val="000000"/>
+                </a:solidFill>
+                <a:latin typeface="Consolas" panose="020B0609020204030204" pitchFamily="49" charset="0"/>
+              </a:rPr>
+              <a:t>=</a:t>
+            </a:r>
+            <a:r>
+              <a:rPr lang="en-US" dirty="0">
+                <a:solidFill>
+                  <a:srgbClr val="0000FF"/>
+                </a:solidFill>
+                <a:latin typeface="Consolas" panose="020B0609020204030204" pitchFamily="49" charset="0"/>
+              </a:rPr>
+              <a:t>"1000</a:t>
+            </a:r>
+            <a:r>
+              <a:rPr lang="en-US" dirty="0" smtClean="0">
+                <a:solidFill>
+                  <a:srgbClr val="0000FF"/>
+                </a:solidFill>
+                <a:latin typeface="Consolas" panose="020B0609020204030204" pitchFamily="49" charset="0"/>
+              </a:rPr>
+              <a:t>"</a:t>
+            </a:r>
+            <a:r>
+              <a:rPr lang="en-US" dirty="0" smtClean="0">
+                <a:solidFill>
+                  <a:srgbClr val="800000"/>
+                </a:solidFill>
+                <a:latin typeface="Consolas" panose="020B0609020204030204" pitchFamily="49" charset="0"/>
+              </a:rPr>
+              <a:t>&gt;</a:t>
+            </a:r>
+          </a:p>
+          <a:p>
+            <a:pPr marL="0" indent="0">
+              <a:buNone/>
+            </a:pPr>
+            <a:r>
+              <a:rPr lang="en-US" dirty="0" smtClean="0">
+                <a:solidFill>
+                  <a:srgbClr val="800000"/>
+                </a:solidFill>
+                <a:latin typeface="Consolas" panose="020B0609020204030204" pitchFamily="49" charset="0"/>
+              </a:rPr>
+              <a:t>&lt;/</a:t>
+            </a:r>
+            <a:r>
+              <a:rPr lang="en-US" dirty="0">
+                <a:solidFill>
+                  <a:srgbClr val="800000"/>
+                </a:solidFill>
+                <a:latin typeface="Consolas" panose="020B0609020204030204" pitchFamily="49" charset="0"/>
+              </a:rPr>
+              <a:t>iframe&gt;</a:t>
+            </a:r>
+            <a:endParaRPr lang="en-US" dirty="0">
+              <a:solidFill>
+                <a:srgbClr val="000000"/>
+              </a:solidFill>
+              <a:latin typeface="Consolas" panose="020B0609020204030204" pitchFamily="49" charset="0"/>
+            </a:endParaRPr>
+          </a:p>
+          <a:p>
+            <a:pPr marL="0" indent="0">
+              <a:buNone/>
+            </a:pPr>
+            <a:endParaRPr lang="en-US" dirty="0" smtClean="0">
+              <a:latin typeface="Consolas" panose="020B0609020204030204" pitchFamily="49" charset="0"/>
+            </a:endParaRPr>
+          </a:p>
+        </p:txBody>
+      </p:sp>
+    </p:spTree>
+    <p:extLst>
+      <p:ext uri="{BB962C8B-B14F-4D97-AF65-F5344CB8AC3E}">
+        <p14:creationId xmlns:p14="http://schemas.microsoft.com/office/powerpoint/2010/main" val="2552192741"/>
+      </p:ext>
+    </p:extLst>
+  </p:cSld>
+  <p:clrMapOvr>
+    <a:masterClrMapping/>
+  </p:clrMapOvr>
+  <p:timing>
+    <p:tnLst>
+      <p:par>
+        <p:cTn id="1" dur="indefinite" restart="never" nodeType="tmRoot"/>
+      </p:par>
+    </p:tnLst>
+  </p:timing>
+</p:sld>
+</file>
+
+<file path=ppt/slides/slide11.xml><?xml version="1.0" encoding="utf-8"?>
+<p:sld xmlns:a="http://schemas.openxmlformats.org/drawingml/2006/main" xmlns:r="http://schemas.openxmlformats.org/officeDocument/2006/relationships" xmlns:p="http://schemas.openxmlformats.org/presentationml/2006/main">
+  <p:cSld>
+    <p:spTree>
+      <p:nvGrpSpPr>
+        <p:cNvPr id="1" name=""/>
+        <p:cNvGrpSpPr/>
+        <p:nvPr/>
+      </p:nvGrpSpPr>
+      <p:grpSpPr>
+        <a:xfrm>
+          <a:off x="0" y="0"/>
+          <a:ext cx="0" cy="0"/>
+          <a:chOff x="0" y="0"/>
+          <a:chExt cx="0" cy="0"/>
+        </a:xfrm>
+      </p:grpSpPr>
+      <p:sp>
+        <p:nvSpPr>
           <p:cNvPr id="4" name="Rectangle 3"/>
           <p:cNvSpPr/>
           <p:nvPr/>
@@ -5332,476 +5840,17 @@
           <a:p>
             <a:r>
               <a:rPr lang="en-US" dirty="0" smtClean="0"/>
-              <a:t>Tables, continued</a:t>
-            </a:r>
-            <a:endParaRPr lang="en-US" dirty="0"/>
-          </a:p>
-        </p:txBody>
-      </p:sp>
-      <p:sp>
-        <p:nvSpPr>
-          <p:cNvPr id="3" name="Content Placeholder 2"/>
-          <p:cNvSpPr>
-            <a:spLocks noGrp="1"/>
-          </p:cNvSpPr>
-          <p:nvPr>
-            <p:ph sz="quarter" idx="18"/>
-          </p:nvPr>
-        </p:nvSpPr>
-        <p:spPr>
-          <a:xfrm>
-            <a:off x="405033" y="1201003"/>
-            <a:ext cx="9650516" cy="5513696"/>
-          </a:xfrm>
-        </p:spPr>
-        <p:txBody>
-          <a:bodyPr>
-            <a:normAutofit fontScale="55000" lnSpcReduction="20000"/>
-          </a:bodyPr>
-          <a:lstStyle/>
-          <a:p>
-            <a:pPr marL="0" indent="0">
-              <a:buNone/>
-            </a:pPr>
+              <a:t>The </a:t>
+            </a:r>
             <a:r>
               <a:rPr lang="en-US" dirty="0" smtClean="0">
                 <a:latin typeface="Consolas" panose="020B0609020204030204" pitchFamily="49" charset="0"/>
               </a:rPr>
-              <a:t>&lt;table&gt;</a:t>
-            </a:r>
-          </a:p>
-          <a:p>
-            <a:pPr marL="0" indent="0">
-              <a:buNone/>
-            </a:pPr>
-            <a:r>
-              <a:rPr lang="en-US" dirty="0">
-                <a:latin typeface="Consolas" panose="020B0609020204030204" pitchFamily="49" charset="0"/>
-              </a:rPr>
-              <a:t>	</a:t>
-            </a:r>
-            <a:r>
-              <a:rPr lang="en-US" dirty="0" smtClean="0">
-                <a:latin typeface="Consolas" panose="020B0609020204030204" pitchFamily="49" charset="0"/>
-              </a:rPr>
-              <a:t>&lt;</a:t>
-            </a:r>
-            <a:r>
-              <a:rPr lang="en-US" dirty="0" err="1" smtClean="0">
-                <a:latin typeface="Consolas" panose="020B0609020204030204" pitchFamily="49" charset="0"/>
-              </a:rPr>
-              <a:t>thead</a:t>
-            </a:r>
-            <a:r>
-              <a:rPr lang="en-US" dirty="0" smtClean="0">
-                <a:latin typeface="Consolas" panose="020B0609020204030204" pitchFamily="49" charset="0"/>
-              </a:rPr>
-              <a:t>&gt;</a:t>
-            </a:r>
-          </a:p>
-          <a:p>
-            <a:pPr marL="0" indent="0">
-              <a:buNone/>
-            </a:pPr>
-            <a:r>
-              <a:rPr lang="en-US" dirty="0">
-                <a:latin typeface="Consolas" panose="020B0609020204030204" pitchFamily="49" charset="0"/>
-              </a:rPr>
-              <a:t>		</a:t>
-            </a:r>
-            <a:r>
-              <a:rPr lang="en-US" dirty="0" smtClean="0">
-                <a:latin typeface="Consolas" panose="020B0609020204030204" pitchFamily="49" charset="0"/>
-              </a:rPr>
-              <a:t>&lt;</a:t>
-            </a:r>
-            <a:r>
-              <a:rPr lang="en-US" dirty="0" err="1" smtClean="0">
-                <a:latin typeface="Consolas" panose="020B0609020204030204" pitchFamily="49" charset="0"/>
-              </a:rPr>
-              <a:t>tr</a:t>
-            </a:r>
-            <a:r>
-              <a:rPr lang="en-US" dirty="0" smtClean="0">
-                <a:latin typeface="Consolas" panose="020B0609020204030204" pitchFamily="49" charset="0"/>
-              </a:rPr>
-              <a:t>&gt;</a:t>
-            </a:r>
-          </a:p>
-          <a:p>
-            <a:pPr marL="0" indent="0">
-              <a:buNone/>
-            </a:pPr>
-            <a:r>
-              <a:rPr lang="en-US" dirty="0">
-                <a:latin typeface="Consolas" panose="020B0609020204030204" pitchFamily="49" charset="0"/>
-              </a:rPr>
-              <a:t>	</a:t>
-            </a:r>
-            <a:r>
-              <a:rPr lang="en-US" dirty="0" smtClean="0">
-                <a:latin typeface="Consolas" panose="020B0609020204030204" pitchFamily="49" charset="0"/>
-              </a:rPr>
-              <a:t>		&lt;</a:t>
-            </a:r>
-            <a:r>
-              <a:rPr lang="en-US" dirty="0" err="1" smtClean="0">
-                <a:latin typeface="Consolas" panose="020B0609020204030204" pitchFamily="49" charset="0"/>
-              </a:rPr>
-              <a:t>th</a:t>
-            </a:r>
-            <a:r>
-              <a:rPr lang="en-US" dirty="0" smtClean="0">
-                <a:latin typeface="Consolas" panose="020B0609020204030204" pitchFamily="49" charset="0"/>
-              </a:rPr>
-              <a:t>&gt;Name&lt;/</a:t>
-            </a:r>
-            <a:r>
-              <a:rPr lang="en-US" dirty="0" err="1" smtClean="0">
-                <a:latin typeface="Consolas" panose="020B0609020204030204" pitchFamily="49" charset="0"/>
-              </a:rPr>
-              <a:t>th</a:t>
-            </a:r>
-            <a:r>
-              <a:rPr lang="en-US" dirty="0" smtClean="0">
-                <a:latin typeface="Consolas" panose="020B0609020204030204" pitchFamily="49" charset="0"/>
-              </a:rPr>
-              <a:t>&gt;</a:t>
-            </a:r>
-          </a:p>
-          <a:p>
-            <a:pPr marL="0" indent="0">
-              <a:buNone/>
-            </a:pPr>
-            <a:r>
-              <a:rPr lang="en-US" dirty="0">
-                <a:latin typeface="Consolas" panose="020B0609020204030204" pitchFamily="49" charset="0"/>
-              </a:rPr>
-              <a:t>	</a:t>
-            </a:r>
-            <a:r>
-              <a:rPr lang="en-US" dirty="0" smtClean="0">
-                <a:latin typeface="Consolas" panose="020B0609020204030204" pitchFamily="49" charset="0"/>
-              </a:rPr>
-              <a:t>		&lt;</a:t>
-            </a:r>
-            <a:r>
-              <a:rPr lang="en-US" dirty="0" err="1" smtClean="0">
-                <a:latin typeface="Consolas" panose="020B0609020204030204" pitchFamily="49" charset="0"/>
-              </a:rPr>
-              <a:t>th</a:t>
-            </a:r>
-            <a:r>
-              <a:rPr lang="en-US" dirty="0" smtClean="0">
-                <a:latin typeface="Consolas" panose="020B0609020204030204" pitchFamily="49" charset="0"/>
-              </a:rPr>
-              <a:t>&gt;Age&lt;/</a:t>
-            </a:r>
-            <a:r>
-              <a:rPr lang="en-US" dirty="0" err="1" smtClean="0">
-                <a:latin typeface="Consolas" panose="020B0609020204030204" pitchFamily="49" charset="0"/>
-              </a:rPr>
-              <a:t>th</a:t>
-            </a:r>
-            <a:r>
-              <a:rPr lang="en-US" dirty="0" smtClean="0">
-                <a:latin typeface="Consolas" panose="020B0609020204030204" pitchFamily="49" charset="0"/>
-              </a:rPr>
-              <a:t>&gt;</a:t>
-            </a:r>
-          </a:p>
-          <a:p>
-            <a:pPr marL="0" indent="0">
-              <a:buNone/>
-            </a:pPr>
-            <a:r>
-              <a:rPr lang="en-US" dirty="0">
-                <a:latin typeface="Consolas" panose="020B0609020204030204" pitchFamily="49" charset="0"/>
-              </a:rPr>
-              <a:t>	</a:t>
-            </a:r>
-            <a:r>
-              <a:rPr lang="en-US" dirty="0" smtClean="0">
-                <a:latin typeface="Consolas" panose="020B0609020204030204" pitchFamily="49" charset="0"/>
-              </a:rPr>
-              <a:t>		&lt;</a:t>
-            </a:r>
-            <a:r>
-              <a:rPr lang="en-US" dirty="0" err="1" smtClean="0">
-                <a:latin typeface="Consolas" panose="020B0609020204030204" pitchFamily="49" charset="0"/>
-              </a:rPr>
-              <a:t>th</a:t>
-            </a:r>
-            <a:r>
-              <a:rPr lang="en-US" dirty="0" smtClean="0">
-                <a:latin typeface="Consolas" panose="020B0609020204030204" pitchFamily="49" charset="0"/>
-              </a:rPr>
-              <a:t>&gt;Favorite Subject&lt;/</a:t>
-            </a:r>
-            <a:r>
-              <a:rPr lang="en-US" dirty="0" err="1" smtClean="0">
-                <a:latin typeface="Consolas" panose="020B0609020204030204" pitchFamily="49" charset="0"/>
-              </a:rPr>
-              <a:t>th</a:t>
-            </a:r>
-            <a:r>
-              <a:rPr lang="en-US" dirty="0" smtClean="0">
-                <a:latin typeface="Consolas" panose="020B0609020204030204" pitchFamily="49" charset="0"/>
-              </a:rPr>
-              <a:t>&gt;</a:t>
-            </a:r>
-          </a:p>
-          <a:p>
-            <a:pPr marL="0" indent="0">
-              <a:buNone/>
-            </a:pPr>
-            <a:r>
-              <a:rPr lang="en-US" dirty="0">
-                <a:latin typeface="Consolas" panose="020B0609020204030204" pitchFamily="49" charset="0"/>
-              </a:rPr>
-              <a:t>	</a:t>
-            </a:r>
-            <a:r>
-              <a:rPr lang="en-US" dirty="0" smtClean="0">
-                <a:latin typeface="Consolas" panose="020B0609020204030204" pitchFamily="49" charset="0"/>
-              </a:rPr>
-              <a:t>	&lt;/</a:t>
-            </a:r>
-            <a:r>
-              <a:rPr lang="en-US" dirty="0" err="1" smtClean="0">
-                <a:latin typeface="Consolas" panose="020B0609020204030204" pitchFamily="49" charset="0"/>
-              </a:rPr>
-              <a:t>tr</a:t>
-            </a:r>
-            <a:r>
-              <a:rPr lang="en-US" dirty="0" smtClean="0">
-                <a:latin typeface="Consolas" panose="020B0609020204030204" pitchFamily="49" charset="0"/>
-              </a:rPr>
-              <a:t>&gt;</a:t>
-            </a:r>
-          </a:p>
-          <a:p>
-            <a:pPr marL="0" indent="0">
-              <a:buNone/>
-            </a:pPr>
-            <a:r>
-              <a:rPr lang="en-US" dirty="0">
-                <a:latin typeface="Consolas" panose="020B0609020204030204" pitchFamily="49" charset="0"/>
-              </a:rPr>
-              <a:t>	</a:t>
-            </a:r>
-            <a:r>
-              <a:rPr lang="en-US" dirty="0" smtClean="0">
-                <a:latin typeface="Consolas" panose="020B0609020204030204" pitchFamily="49" charset="0"/>
-              </a:rPr>
-              <a:t>&lt;/</a:t>
-            </a:r>
-            <a:r>
-              <a:rPr lang="en-US" dirty="0" err="1" smtClean="0">
-                <a:latin typeface="Consolas" panose="020B0609020204030204" pitchFamily="49" charset="0"/>
-              </a:rPr>
-              <a:t>thead</a:t>
-            </a:r>
-            <a:r>
-              <a:rPr lang="en-US" dirty="0" smtClean="0">
-                <a:latin typeface="Consolas" panose="020B0609020204030204" pitchFamily="49" charset="0"/>
-              </a:rPr>
-              <a:t>&gt;</a:t>
-            </a:r>
-          </a:p>
-          <a:p>
-            <a:pPr marL="0" indent="0">
-              <a:buNone/>
-            </a:pPr>
-            <a:r>
-              <a:rPr lang="en-US" dirty="0">
-                <a:latin typeface="Consolas" panose="020B0609020204030204" pitchFamily="49" charset="0"/>
-              </a:rPr>
-              <a:t>	</a:t>
-            </a:r>
-            <a:r>
-              <a:rPr lang="en-US" dirty="0" smtClean="0">
-                <a:latin typeface="Consolas" panose="020B0609020204030204" pitchFamily="49" charset="0"/>
-              </a:rPr>
-              <a:t>&lt;</a:t>
-            </a:r>
-            <a:r>
-              <a:rPr lang="en-US" dirty="0" err="1" smtClean="0">
-                <a:latin typeface="Consolas" panose="020B0609020204030204" pitchFamily="49" charset="0"/>
-              </a:rPr>
-              <a:t>tbody</a:t>
-            </a:r>
-            <a:r>
-              <a:rPr lang="en-US" dirty="0" smtClean="0">
-                <a:latin typeface="Consolas" panose="020B0609020204030204" pitchFamily="49" charset="0"/>
-              </a:rPr>
-              <a:t>&gt;</a:t>
-            </a:r>
-          </a:p>
-          <a:p>
-            <a:pPr marL="0" indent="0">
-              <a:buNone/>
-            </a:pPr>
-            <a:r>
-              <a:rPr lang="en-US" dirty="0">
-                <a:latin typeface="Consolas" panose="020B0609020204030204" pitchFamily="49" charset="0"/>
-              </a:rPr>
-              <a:t>	</a:t>
-            </a:r>
-            <a:r>
-              <a:rPr lang="en-US" dirty="0" smtClean="0">
-                <a:latin typeface="Consolas" panose="020B0609020204030204" pitchFamily="49" charset="0"/>
-              </a:rPr>
-              <a:t>	&lt;</a:t>
-            </a:r>
-            <a:r>
-              <a:rPr lang="en-US" dirty="0" err="1" smtClean="0">
-                <a:latin typeface="Consolas" panose="020B0609020204030204" pitchFamily="49" charset="0"/>
-              </a:rPr>
-              <a:t>tr</a:t>
-            </a:r>
-            <a:r>
-              <a:rPr lang="en-US" dirty="0" smtClean="0">
-                <a:latin typeface="Consolas" panose="020B0609020204030204" pitchFamily="49" charset="0"/>
-              </a:rPr>
-              <a:t>&gt;</a:t>
-            </a:r>
-          </a:p>
-          <a:p>
-            <a:pPr marL="0" indent="0">
-              <a:buNone/>
-            </a:pPr>
-            <a:r>
-              <a:rPr lang="en-US" dirty="0">
-                <a:latin typeface="Consolas" panose="020B0609020204030204" pitchFamily="49" charset="0"/>
-              </a:rPr>
-              <a:t>	</a:t>
-            </a:r>
-            <a:r>
-              <a:rPr lang="en-US" dirty="0" smtClean="0">
-                <a:latin typeface="Consolas" panose="020B0609020204030204" pitchFamily="49" charset="0"/>
-              </a:rPr>
-              <a:t>		&lt;td&gt;John Smith&lt;/td&gt;</a:t>
-            </a:r>
-          </a:p>
-          <a:p>
-            <a:pPr marL="0" indent="0">
-              <a:buNone/>
-            </a:pPr>
-            <a:r>
-              <a:rPr lang="en-US" dirty="0">
-                <a:latin typeface="Consolas" panose="020B0609020204030204" pitchFamily="49" charset="0"/>
-              </a:rPr>
-              <a:t>	</a:t>
-            </a:r>
-            <a:r>
-              <a:rPr lang="en-US" dirty="0" smtClean="0">
-                <a:latin typeface="Consolas" panose="020B0609020204030204" pitchFamily="49" charset="0"/>
-              </a:rPr>
-              <a:t>		&lt;td&gt;65&lt;/td&gt;</a:t>
-            </a:r>
-          </a:p>
-          <a:p>
-            <a:pPr marL="0" indent="0">
-              <a:buNone/>
-            </a:pPr>
-            <a:r>
-              <a:rPr lang="en-US" dirty="0">
-                <a:latin typeface="Consolas" panose="020B0609020204030204" pitchFamily="49" charset="0"/>
-              </a:rPr>
-              <a:t>	</a:t>
-            </a:r>
-            <a:r>
-              <a:rPr lang="en-US" dirty="0" smtClean="0">
-                <a:latin typeface="Consolas" panose="020B0609020204030204" pitchFamily="49" charset="0"/>
-              </a:rPr>
-              <a:t>		&lt;td&gt;Math&lt;/td&gt;</a:t>
-            </a:r>
-          </a:p>
-          <a:p>
-            <a:pPr marL="0" indent="0">
-              <a:buNone/>
-            </a:pPr>
-            <a:r>
-              <a:rPr lang="en-US" dirty="0">
-                <a:latin typeface="Consolas" panose="020B0609020204030204" pitchFamily="49" charset="0"/>
-              </a:rPr>
-              <a:t>	</a:t>
-            </a:r>
-            <a:r>
-              <a:rPr lang="en-US" dirty="0" smtClean="0">
-                <a:latin typeface="Consolas" panose="020B0609020204030204" pitchFamily="49" charset="0"/>
-              </a:rPr>
-              <a:t>	&lt;/</a:t>
-            </a:r>
-            <a:r>
-              <a:rPr lang="en-US" dirty="0" err="1" smtClean="0">
-                <a:latin typeface="Consolas" panose="020B0609020204030204" pitchFamily="49" charset="0"/>
-              </a:rPr>
-              <a:t>tr</a:t>
-            </a:r>
-            <a:r>
-              <a:rPr lang="en-US" dirty="0" smtClean="0">
-                <a:latin typeface="Consolas" panose="020B0609020204030204" pitchFamily="49" charset="0"/>
-              </a:rPr>
-              <a:t>&gt;</a:t>
-            </a:r>
-          </a:p>
-          <a:p>
-            <a:pPr marL="0" indent="0">
-              <a:buNone/>
-            </a:pPr>
-            <a:r>
-              <a:rPr lang="en-US" dirty="0">
-                <a:latin typeface="Consolas" panose="020B0609020204030204" pitchFamily="49" charset="0"/>
-              </a:rPr>
-              <a:t>	</a:t>
-            </a:r>
-            <a:r>
-              <a:rPr lang="en-US" dirty="0" smtClean="0">
-                <a:latin typeface="Consolas" panose="020B0609020204030204" pitchFamily="49" charset="0"/>
-              </a:rPr>
-              <a:t>	…</a:t>
-            </a:r>
-          </a:p>
-          <a:p>
-            <a:pPr marL="0" indent="0">
-              <a:buNone/>
-            </a:pPr>
-            <a:r>
-              <a:rPr lang="en-US" dirty="0">
-                <a:latin typeface="Consolas" panose="020B0609020204030204" pitchFamily="49" charset="0"/>
-              </a:rPr>
-              <a:t>	</a:t>
-            </a:r>
-            <a:r>
-              <a:rPr lang="en-US" dirty="0" smtClean="0">
-                <a:latin typeface="Consolas" panose="020B0609020204030204" pitchFamily="49" charset="0"/>
-              </a:rPr>
-              <a:t>&lt;/</a:t>
-            </a:r>
-            <a:r>
-              <a:rPr lang="en-US" dirty="0" err="1" smtClean="0">
-                <a:latin typeface="Consolas" panose="020B0609020204030204" pitchFamily="49" charset="0"/>
-              </a:rPr>
-              <a:t>tbody</a:t>
-            </a:r>
-            <a:r>
-              <a:rPr lang="en-US" dirty="0" smtClean="0">
-                <a:latin typeface="Consolas" panose="020B0609020204030204" pitchFamily="49" charset="0"/>
-              </a:rPr>
-              <a:t>&gt;</a:t>
-            </a:r>
-          </a:p>
-          <a:p>
-            <a:pPr marL="0" indent="0">
-              <a:buNone/>
-            </a:pPr>
-            <a:r>
-              <a:rPr lang="en-US" dirty="0" smtClean="0">
-                <a:latin typeface="Consolas" panose="020B0609020204030204" pitchFamily="49" charset="0"/>
-              </a:rPr>
-              <a:t>&lt;/table&gt;</a:t>
+              <a:t>border</a:t>
+            </a:r>
+            <a:r>
+              <a:rPr lang="en-US" dirty="0" smtClean="0"/>
+              <a:t> attribute</a:t>
             </a:r>
             <a:endParaRPr lang="en-US" dirty="0">
               <a:latin typeface="Consolas" panose="020B0609020204030204" pitchFamily="49" charset="0"/>
@@ -5809,10 +5858,113 @@
           </a:p>
         </p:txBody>
       </p:sp>
+      <p:sp>
+        <p:nvSpPr>
+          <p:cNvPr id="3" name="Content Placeholder 2"/>
+          <p:cNvSpPr>
+            <a:spLocks noGrp="1"/>
+          </p:cNvSpPr>
+          <p:nvPr>
+            <p:ph sz="quarter" idx="18"/>
+          </p:nvPr>
+        </p:nvSpPr>
+        <p:spPr/>
+        <p:txBody>
+          <a:bodyPr/>
+          <a:lstStyle/>
+          <a:p>
+            <a:pPr marL="0" indent="0">
+              <a:buNone/>
+            </a:pPr>
+            <a:r>
+              <a:rPr lang="en-US" sz="6000" dirty="0">
+                <a:latin typeface="Consolas" panose="020B0609020204030204" pitchFamily="49" charset="0"/>
+              </a:rPr>
+              <a:t>&lt;table border="1</a:t>
+            </a:r>
+            <a:r>
+              <a:rPr lang="en-US" sz="6000" dirty="0" smtClean="0">
+                <a:latin typeface="Consolas" panose="020B0609020204030204" pitchFamily="49" charset="0"/>
+              </a:rPr>
+              <a:t>"&gt;</a:t>
+            </a:r>
+          </a:p>
+          <a:p>
+            <a:endParaRPr lang="en-US" sz="3600" dirty="0" smtClean="0"/>
+          </a:p>
+          <a:p>
+            <a:r>
+              <a:rPr lang="en-US" sz="3600" dirty="0" smtClean="0"/>
+              <a:t>Set the </a:t>
+            </a:r>
+            <a:r>
+              <a:rPr lang="en-US" sz="3600" dirty="0" smtClean="0">
+                <a:latin typeface="Consolas" panose="020B0609020204030204" pitchFamily="49" charset="0"/>
+              </a:rPr>
+              <a:t>border</a:t>
+            </a:r>
+            <a:r>
+              <a:rPr lang="en-US" sz="3600" dirty="0" smtClean="0"/>
+              <a:t> attribute to 1 to add a </a:t>
+            </a:r>
+            <a:r>
+              <a:rPr lang="en-US" sz="3600" dirty="0" smtClean="0">
+                <a:latin typeface="Consolas" panose="020B0609020204030204" pitchFamily="49" charset="0"/>
+              </a:rPr>
+              <a:t>border</a:t>
+            </a:r>
+          </a:p>
+          <a:p>
+            <a:endParaRPr lang="en-US" sz="3600" dirty="0">
+              <a:latin typeface="Consolas" panose="020B0609020204030204" pitchFamily="49" charset="0"/>
+            </a:endParaRPr>
+          </a:p>
+          <a:p>
+            <a:pPr marL="0" indent="0">
+              <a:buNone/>
+            </a:pPr>
+            <a:endParaRPr lang="en-US" sz="3600" dirty="0">
+              <a:latin typeface="Consolas" panose="020B0609020204030204" pitchFamily="49" charset="0"/>
+            </a:endParaRPr>
+          </a:p>
+          <a:p>
+            <a:pPr marL="0" indent="0">
+              <a:buNone/>
+            </a:pPr>
+            <a:endParaRPr lang="en-US" dirty="0" smtClean="0">
+              <a:latin typeface="Consolas" panose="020B0609020204030204" pitchFamily="49" charset="0"/>
+            </a:endParaRPr>
+          </a:p>
+        </p:txBody>
+      </p:sp>
+      <p:pic>
+        <p:nvPicPr>
+          <p:cNvPr id="4" name="Picture 3"/>
+          <p:cNvPicPr>
+            <a:picLocks noChangeAspect="1"/>
+          </p:cNvPicPr>
+          <p:nvPr/>
+        </p:nvPicPr>
+        <p:blipFill>
+          <a:blip r:embed="rId3"/>
+          <a:stretch>
+            <a:fillRect/>
+          </a:stretch>
+        </p:blipFill>
+        <p:spPr>
+          <a:xfrm>
+            <a:off x="3987105" y="4423788"/>
+            <a:ext cx="2486372" cy="1467055"/>
+          </a:xfrm>
+          <a:prstGeom prst="rect">
+            <a:avLst/>
+          </a:prstGeom>
+        </p:spPr>
+      </p:pic>
     </p:spTree>
     <p:extLst>
       <p:ext uri="{BB962C8B-B14F-4D97-AF65-F5344CB8AC3E}">
-        <p14:creationId xmlns:p14="http://schemas.microsoft.com/office/powerpoint/2010/main" val="543640803"/>
+        <p14:creationId xmlns:p14="http://schemas.microsoft.com/office/powerpoint/2010/main" val="1305873539"/>
       </p:ext>
     </p:extLst>
   </p:cSld>
@@ -5848,39 +6000,519 @@
       </p:grpSpPr>
       <p:sp>
         <p:nvSpPr>
-          <p:cNvPr id="4" name="Rectangle 3"/>
-          <p:cNvSpPr/>
-          <p:nvPr/>
+          <p:cNvPr id="2" name="Text Placeholder 1"/>
+          <p:cNvSpPr>
+            <a:spLocks noGrp="1"/>
+          </p:cNvSpPr>
+          <p:nvPr>
+            <p:ph type="body" sz="quarter" idx="10"/>
+          </p:nvPr>
+        </p:nvSpPr>
+        <p:spPr/>
+        <p:txBody>
+          <a:bodyPr/>
+          <a:lstStyle/>
+          <a:p>
+            <a:r>
+              <a:rPr lang="en-US" dirty="0" smtClean="0"/>
+              <a:t>Tables</a:t>
+            </a:r>
+            <a:r>
+              <a:rPr lang="en-US" dirty="0"/>
+              <a:t> </a:t>
+            </a:r>
+            <a:r>
+              <a:rPr lang="en-US" dirty="0" smtClean="0"/>
+              <a:t>example</a:t>
+            </a:r>
+            <a:endParaRPr lang="en-US" dirty="0"/>
+          </a:p>
+        </p:txBody>
+      </p:sp>
+      <p:sp>
+        <p:nvSpPr>
+          <p:cNvPr id="3" name="Content Placeholder 2"/>
+          <p:cNvSpPr>
+            <a:spLocks noGrp="1"/>
+          </p:cNvSpPr>
+          <p:nvPr>
+            <p:ph sz="quarter" idx="18"/>
+          </p:nvPr>
         </p:nvSpPr>
         <p:spPr>
           <a:xfrm>
-            <a:off x="2557723" y="2460563"/>
-            <a:ext cx="5023555" cy="1569660"/>
+            <a:off x="405033" y="1201003"/>
+            <a:ext cx="9650516" cy="5513696"/>
           </a:xfrm>
-          <a:prstGeom prst="rect">
-            <a:avLst/>
-          </a:prstGeom>
         </p:spPr>
         <p:txBody>
-          <a:bodyPr wrap="none">
-            <a:spAutoFit/>
+          <a:bodyPr>
+            <a:normAutofit fontScale="55000" lnSpcReduction="20000"/>
           </a:bodyPr>
           <a:lstStyle/>
           <a:p>
-            <a:r>
-              <a:rPr lang="en-US" sz="9600" dirty="0" smtClean="0">
-                <a:hlinkClick r:id="rId3"/>
-              </a:rPr>
-              <a:t>CodePen!</a:t>
-            </a:r>
-            <a:endParaRPr lang="en-US" sz="9600" dirty="0"/>
+            <a:pPr marL="0" indent="0">
+              <a:buNone/>
+            </a:pPr>
+            <a:r>
+              <a:rPr lang="en-US" dirty="0" smtClean="0">
+                <a:latin typeface="Consolas" panose="020B0609020204030204" pitchFamily="49" charset="0"/>
+              </a:rPr>
+              <a:t>&lt;</a:t>
+            </a:r>
+            <a:r>
+              <a:rPr lang="en-US" dirty="0" smtClean="0">
+                <a:latin typeface="Consolas" panose="020B0609020204030204" pitchFamily="49" charset="0"/>
+              </a:rPr>
+              <a:t>table border="1"&gt;</a:t>
+            </a:r>
+            <a:endParaRPr lang="en-US" dirty="0" smtClean="0">
+              <a:latin typeface="Consolas" panose="020B0609020204030204" pitchFamily="49" charset="0"/>
+            </a:endParaRPr>
+          </a:p>
+          <a:p>
+            <a:pPr marL="0" indent="0">
+              <a:buNone/>
+            </a:pPr>
+            <a:r>
+              <a:rPr lang="en-US" dirty="0">
+                <a:latin typeface="Consolas" panose="020B0609020204030204" pitchFamily="49" charset="0"/>
+              </a:rPr>
+              <a:t>	</a:t>
+            </a:r>
+            <a:r>
+              <a:rPr lang="en-US" dirty="0" smtClean="0">
+                <a:latin typeface="Consolas" panose="020B0609020204030204" pitchFamily="49" charset="0"/>
+              </a:rPr>
+              <a:t>&lt;</a:t>
+            </a:r>
+            <a:r>
+              <a:rPr lang="en-US" dirty="0" err="1" smtClean="0">
+                <a:latin typeface="Consolas" panose="020B0609020204030204" pitchFamily="49" charset="0"/>
+              </a:rPr>
+              <a:t>thead</a:t>
+            </a:r>
+            <a:r>
+              <a:rPr lang="en-US" dirty="0" smtClean="0">
+                <a:latin typeface="Consolas" panose="020B0609020204030204" pitchFamily="49" charset="0"/>
+              </a:rPr>
+              <a:t>&gt;</a:t>
+            </a:r>
+          </a:p>
+          <a:p>
+            <a:pPr marL="0" indent="0">
+              <a:buNone/>
+            </a:pPr>
+            <a:r>
+              <a:rPr lang="en-US" dirty="0">
+                <a:latin typeface="Consolas" panose="020B0609020204030204" pitchFamily="49" charset="0"/>
+              </a:rPr>
+              <a:t>		</a:t>
+            </a:r>
+            <a:r>
+              <a:rPr lang="en-US" dirty="0" smtClean="0">
+                <a:latin typeface="Consolas" panose="020B0609020204030204" pitchFamily="49" charset="0"/>
+              </a:rPr>
+              <a:t>&lt;</a:t>
+            </a:r>
+            <a:r>
+              <a:rPr lang="en-US" dirty="0" err="1" smtClean="0">
+                <a:latin typeface="Consolas" panose="020B0609020204030204" pitchFamily="49" charset="0"/>
+              </a:rPr>
+              <a:t>tr</a:t>
+            </a:r>
+            <a:r>
+              <a:rPr lang="en-US" dirty="0" smtClean="0">
+                <a:latin typeface="Consolas" panose="020B0609020204030204" pitchFamily="49" charset="0"/>
+              </a:rPr>
+              <a:t>&gt;</a:t>
+            </a:r>
+          </a:p>
+          <a:p>
+            <a:pPr marL="0" indent="0">
+              <a:buNone/>
+            </a:pPr>
+            <a:r>
+              <a:rPr lang="en-US" dirty="0">
+                <a:latin typeface="Consolas" panose="020B0609020204030204" pitchFamily="49" charset="0"/>
+              </a:rPr>
+              <a:t>	</a:t>
+            </a:r>
+            <a:r>
+              <a:rPr lang="en-US" dirty="0" smtClean="0">
+                <a:latin typeface="Consolas" panose="020B0609020204030204" pitchFamily="49" charset="0"/>
+              </a:rPr>
+              <a:t>		&lt;</a:t>
+            </a:r>
+            <a:r>
+              <a:rPr lang="en-US" dirty="0" err="1" smtClean="0">
+                <a:latin typeface="Consolas" panose="020B0609020204030204" pitchFamily="49" charset="0"/>
+              </a:rPr>
+              <a:t>th</a:t>
+            </a:r>
+            <a:r>
+              <a:rPr lang="en-US" dirty="0" smtClean="0">
+                <a:latin typeface="Consolas" panose="020B0609020204030204" pitchFamily="49" charset="0"/>
+              </a:rPr>
+              <a:t>&gt;Name&lt;/</a:t>
+            </a:r>
+            <a:r>
+              <a:rPr lang="en-US" dirty="0" err="1" smtClean="0">
+                <a:latin typeface="Consolas" panose="020B0609020204030204" pitchFamily="49" charset="0"/>
+              </a:rPr>
+              <a:t>th</a:t>
+            </a:r>
+            <a:r>
+              <a:rPr lang="en-US" dirty="0" smtClean="0">
+                <a:latin typeface="Consolas" panose="020B0609020204030204" pitchFamily="49" charset="0"/>
+              </a:rPr>
+              <a:t>&gt;</a:t>
+            </a:r>
+          </a:p>
+          <a:p>
+            <a:pPr marL="0" indent="0">
+              <a:buNone/>
+            </a:pPr>
+            <a:r>
+              <a:rPr lang="en-US" dirty="0">
+                <a:latin typeface="Consolas" panose="020B0609020204030204" pitchFamily="49" charset="0"/>
+              </a:rPr>
+              <a:t>	</a:t>
+            </a:r>
+            <a:r>
+              <a:rPr lang="en-US" dirty="0" smtClean="0">
+                <a:latin typeface="Consolas" panose="020B0609020204030204" pitchFamily="49" charset="0"/>
+              </a:rPr>
+              <a:t>		&lt;</a:t>
+            </a:r>
+            <a:r>
+              <a:rPr lang="en-US" dirty="0" err="1" smtClean="0">
+                <a:latin typeface="Consolas" panose="020B0609020204030204" pitchFamily="49" charset="0"/>
+              </a:rPr>
+              <a:t>th</a:t>
+            </a:r>
+            <a:r>
+              <a:rPr lang="en-US" dirty="0" smtClean="0">
+                <a:latin typeface="Consolas" panose="020B0609020204030204" pitchFamily="49" charset="0"/>
+              </a:rPr>
+              <a:t>&gt;Age&lt;/</a:t>
+            </a:r>
+            <a:r>
+              <a:rPr lang="en-US" dirty="0" err="1" smtClean="0">
+                <a:latin typeface="Consolas" panose="020B0609020204030204" pitchFamily="49" charset="0"/>
+              </a:rPr>
+              <a:t>th</a:t>
+            </a:r>
+            <a:r>
+              <a:rPr lang="en-US" dirty="0" smtClean="0">
+                <a:latin typeface="Consolas" panose="020B0609020204030204" pitchFamily="49" charset="0"/>
+              </a:rPr>
+              <a:t>&gt;</a:t>
+            </a:r>
+          </a:p>
+          <a:p>
+            <a:pPr marL="0" indent="0">
+              <a:buNone/>
+            </a:pPr>
+            <a:r>
+              <a:rPr lang="en-US" dirty="0">
+                <a:latin typeface="Consolas" panose="020B0609020204030204" pitchFamily="49" charset="0"/>
+              </a:rPr>
+              <a:t>	</a:t>
+            </a:r>
+            <a:r>
+              <a:rPr lang="en-US" dirty="0" smtClean="0">
+                <a:latin typeface="Consolas" panose="020B0609020204030204" pitchFamily="49" charset="0"/>
+              </a:rPr>
+              <a:t>		&lt;</a:t>
+            </a:r>
+            <a:r>
+              <a:rPr lang="en-US" dirty="0" err="1" smtClean="0">
+                <a:latin typeface="Consolas" panose="020B0609020204030204" pitchFamily="49" charset="0"/>
+              </a:rPr>
+              <a:t>th</a:t>
+            </a:r>
+            <a:r>
+              <a:rPr lang="en-US" dirty="0" smtClean="0">
+                <a:latin typeface="Consolas" panose="020B0609020204030204" pitchFamily="49" charset="0"/>
+              </a:rPr>
+              <a:t>&gt;Favorite Subject&lt;/</a:t>
+            </a:r>
+            <a:r>
+              <a:rPr lang="en-US" dirty="0" err="1" smtClean="0">
+                <a:latin typeface="Consolas" panose="020B0609020204030204" pitchFamily="49" charset="0"/>
+              </a:rPr>
+              <a:t>th</a:t>
+            </a:r>
+            <a:r>
+              <a:rPr lang="en-US" dirty="0" smtClean="0">
+                <a:latin typeface="Consolas" panose="020B0609020204030204" pitchFamily="49" charset="0"/>
+              </a:rPr>
+              <a:t>&gt;</a:t>
+            </a:r>
+          </a:p>
+          <a:p>
+            <a:pPr marL="0" indent="0">
+              <a:buNone/>
+            </a:pPr>
+            <a:r>
+              <a:rPr lang="en-US" dirty="0">
+                <a:latin typeface="Consolas" panose="020B0609020204030204" pitchFamily="49" charset="0"/>
+              </a:rPr>
+              <a:t>	</a:t>
+            </a:r>
+            <a:r>
+              <a:rPr lang="en-US" dirty="0" smtClean="0">
+                <a:latin typeface="Consolas" panose="020B0609020204030204" pitchFamily="49" charset="0"/>
+              </a:rPr>
+              <a:t>	&lt;/</a:t>
+            </a:r>
+            <a:r>
+              <a:rPr lang="en-US" dirty="0" err="1" smtClean="0">
+                <a:latin typeface="Consolas" panose="020B0609020204030204" pitchFamily="49" charset="0"/>
+              </a:rPr>
+              <a:t>tr</a:t>
+            </a:r>
+            <a:r>
+              <a:rPr lang="en-US" dirty="0" smtClean="0">
+                <a:latin typeface="Consolas" panose="020B0609020204030204" pitchFamily="49" charset="0"/>
+              </a:rPr>
+              <a:t>&gt;</a:t>
+            </a:r>
+          </a:p>
+          <a:p>
+            <a:pPr marL="0" indent="0">
+              <a:buNone/>
+            </a:pPr>
+            <a:r>
+              <a:rPr lang="en-US" dirty="0">
+                <a:latin typeface="Consolas" panose="020B0609020204030204" pitchFamily="49" charset="0"/>
+              </a:rPr>
+              <a:t>	</a:t>
+            </a:r>
+            <a:r>
+              <a:rPr lang="en-US" dirty="0" smtClean="0">
+                <a:latin typeface="Consolas" panose="020B0609020204030204" pitchFamily="49" charset="0"/>
+              </a:rPr>
+              <a:t>&lt;/</a:t>
+            </a:r>
+            <a:r>
+              <a:rPr lang="en-US" dirty="0" err="1" smtClean="0">
+                <a:latin typeface="Consolas" panose="020B0609020204030204" pitchFamily="49" charset="0"/>
+              </a:rPr>
+              <a:t>thead</a:t>
+            </a:r>
+            <a:r>
+              <a:rPr lang="en-US" dirty="0" smtClean="0">
+                <a:latin typeface="Consolas" panose="020B0609020204030204" pitchFamily="49" charset="0"/>
+              </a:rPr>
+              <a:t>&gt;</a:t>
+            </a:r>
+          </a:p>
+          <a:p>
+            <a:pPr marL="0" indent="0">
+              <a:buNone/>
+            </a:pPr>
+            <a:r>
+              <a:rPr lang="en-US" dirty="0">
+                <a:latin typeface="Consolas" panose="020B0609020204030204" pitchFamily="49" charset="0"/>
+              </a:rPr>
+              <a:t>	</a:t>
+            </a:r>
+            <a:r>
+              <a:rPr lang="en-US" dirty="0" smtClean="0">
+                <a:latin typeface="Consolas" panose="020B0609020204030204" pitchFamily="49" charset="0"/>
+              </a:rPr>
+              <a:t>&lt;</a:t>
+            </a:r>
+            <a:r>
+              <a:rPr lang="en-US" dirty="0" err="1" smtClean="0">
+                <a:latin typeface="Consolas" panose="020B0609020204030204" pitchFamily="49" charset="0"/>
+              </a:rPr>
+              <a:t>tbody</a:t>
+            </a:r>
+            <a:r>
+              <a:rPr lang="en-US" dirty="0" smtClean="0">
+                <a:latin typeface="Consolas" panose="020B0609020204030204" pitchFamily="49" charset="0"/>
+              </a:rPr>
+              <a:t>&gt;</a:t>
+            </a:r>
+          </a:p>
+          <a:p>
+            <a:pPr marL="0" indent="0">
+              <a:buNone/>
+            </a:pPr>
+            <a:r>
+              <a:rPr lang="en-US" dirty="0">
+                <a:latin typeface="Consolas" panose="020B0609020204030204" pitchFamily="49" charset="0"/>
+              </a:rPr>
+              <a:t>	</a:t>
+            </a:r>
+            <a:r>
+              <a:rPr lang="en-US" dirty="0" smtClean="0">
+                <a:latin typeface="Consolas" panose="020B0609020204030204" pitchFamily="49" charset="0"/>
+              </a:rPr>
+              <a:t>	&lt;</a:t>
+            </a:r>
+            <a:r>
+              <a:rPr lang="en-US" dirty="0" err="1" smtClean="0">
+                <a:latin typeface="Consolas" panose="020B0609020204030204" pitchFamily="49" charset="0"/>
+              </a:rPr>
+              <a:t>tr</a:t>
+            </a:r>
+            <a:r>
+              <a:rPr lang="en-US" dirty="0" smtClean="0">
+                <a:latin typeface="Consolas" panose="020B0609020204030204" pitchFamily="49" charset="0"/>
+              </a:rPr>
+              <a:t>&gt;</a:t>
+            </a:r>
+          </a:p>
+          <a:p>
+            <a:pPr marL="0" indent="0">
+              <a:buNone/>
+            </a:pPr>
+            <a:r>
+              <a:rPr lang="en-US" dirty="0">
+                <a:latin typeface="Consolas" panose="020B0609020204030204" pitchFamily="49" charset="0"/>
+              </a:rPr>
+              <a:t>	</a:t>
+            </a:r>
+            <a:r>
+              <a:rPr lang="en-US" dirty="0" smtClean="0">
+                <a:latin typeface="Consolas" panose="020B0609020204030204" pitchFamily="49" charset="0"/>
+              </a:rPr>
+              <a:t>		&lt;td&gt;John Smith&lt;/td&gt;</a:t>
+            </a:r>
+          </a:p>
+          <a:p>
+            <a:pPr marL="0" indent="0">
+              <a:buNone/>
+            </a:pPr>
+            <a:r>
+              <a:rPr lang="en-US" dirty="0">
+                <a:latin typeface="Consolas" panose="020B0609020204030204" pitchFamily="49" charset="0"/>
+              </a:rPr>
+              <a:t>	</a:t>
+            </a:r>
+            <a:r>
+              <a:rPr lang="en-US" dirty="0" smtClean="0">
+                <a:latin typeface="Consolas" panose="020B0609020204030204" pitchFamily="49" charset="0"/>
+              </a:rPr>
+              <a:t>		&lt;td&gt;65&lt;/td&gt;</a:t>
+            </a:r>
+          </a:p>
+          <a:p>
+            <a:pPr marL="0" indent="0">
+              <a:buNone/>
+            </a:pPr>
+            <a:r>
+              <a:rPr lang="en-US" dirty="0">
+                <a:latin typeface="Consolas" panose="020B0609020204030204" pitchFamily="49" charset="0"/>
+              </a:rPr>
+              <a:t>	</a:t>
+            </a:r>
+            <a:r>
+              <a:rPr lang="en-US" dirty="0" smtClean="0">
+                <a:latin typeface="Consolas" panose="020B0609020204030204" pitchFamily="49" charset="0"/>
+              </a:rPr>
+              <a:t>		&lt;td&gt;Math&lt;/td&gt;</a:t>
+            </a:r>
+          </a:p>
+          <a:p>
+            <a:pPr marL="0" indent="0">
+              <a:buNone/>
+            </a:pPr>
+            <a:r>
+              <a:rPr lang="en-US" dirty="0">
+                <a:latin typeface="Consolas" panose="020B0609020204030204" pitchFamily="49" charset="0"/>
+              </a:rPr>
+              <a:t>	</a:t>
+            </a:r>
+            <a:r>
+              <a:rPr lang="en-US" dirty="0" smtClean="0">
+                <a:latin typeface="Consolas" panose="020B0609020204030204" pitchFamily="49" charset="0"/>
+              </a:rPr>
+              <a:t>	&lt;/</a:t>
+            </a:r>
+            <a:r>
+              <a:rPr lang="en-US" dirty="0" err="1" smtClean="0">
+                <a:latin typeface="Consolas" panose="020B0609020204030204" pitchFamily="49" charset="0"/>
+              </a:rPr>
+              <a:t>tr</a:t>
+            </a:r>
+            <a:r>
+              <a:rPr lang="en-US" dirty="0" smtClean="0">
+                <a:latin typeface="Consolas" panose="020B0609020204030204" pitchFamily="49" charset="0"/>
+              </a:rPr>
+              <a:t>&gt;</a:t>
+            </a:r>
+          </a:p>
+          <a:p>
+            <a:pPr marL="0" indent="0">
+              <a:buNone/>
+            </a:pPr>
+            <a:r>
+              <a:rPr lang="en-US" dirty="0">
+                <a:latin typeface="Consolas" panose="020B0609020204030204" pitchFamily="49" charset="0"/>
+              </a:rPr>
+              <a:t>	</a:t>
+            </a:r>
+            <a:r>
+              <a:rPr lang="en-US" dirty="0" smtClean="0">
+                <a:latin typeface="Consolas" panose="020B0609020204030204" pitchFamily="49" charset="0"/>
+              </a:rPr>
+              <a:t>	…</a:t>
+            </a:r>
+          </a:p>
+          <a:p>
+            <a:pPr marL="0" indent="0">
+              <a:buNone/>
+            </a:pPr>
+            <a:r>
+              <a:rPr lang="en-US" dirty="0">
+                <a:latin typeface="Consolas" panose="020B0609020204030204" pitchFamily="49" charset="0"/>
+              </a:rPr>
+              <a:t>	</a:t>
+            </a:r>
+            <a:r>
+              <a:rPr lang="en-US" dirty="0" smtClean="0">
+                <a:latin typeface="Consolas" panose="020B0609020204030204" pitchFamily="49" charset="0"/>
+              </a:rPr>
+              <a:t>&lt;/</a:t>
+            </a:r>
+            <a:r>
+              <a:rPr lang="en-US" dirty="0" err="1" smtClean="0">
+                <a:latin typeface="Consolas" panose="020B0609020204030204" pitchFamily="49" charset="0"/>
+              </a:rPr>
+              <a:t>tbody</a:t>
+            </a:r>
+            <a:r>
+              <a:rPr lang="en-US" dirty="0" smtClean="0">
+                <a:latin typeface="Consolas" panose="020B0609020204030204" pitchFamily="49" charset="0"/>
+              </a:rPr>
+              <a:t>&gt;</a:t>
+            </a:r>
+          </a:p>
+          <a:p>
+            <a:pPr marL="0" indent="0">
+              <a:buNone/>
+            </a:pPr>
+            <a:r>
+              <a:rPr lang="en-US" dirty="0" smtClean="0">
+                <a:latin typeface="Consolas" panose="020B0609020204030204" pitchFamily="49" charset="0"/>
+              </a:rPr>
+              <a:t>&lt;/table&gt;</a:t>
+            </a:r>
+            <a:endParaRPr lang="en-US" dirty="0">
+              <a:latin typeface="Consolas" panose="020B0609020204030204" pitchFamily="49" charset="0"/>
+            </a:endParaRPr>
           </a:p>
         </p:txBody>
       </p:sp>
     </p:spTree>
     <p:extLst>
       <p:ext uri="{BB962C8B-B14F-4D97-AF65-F5344CB8AC3E}">
-        <p14:creationId xmlns:p14="http://schemas.microsoft.com/office/powerpoint/2010/main" val="1622190199"/>
+        <p14:creationId xmlns:p14="http://schemas.microsoft.com/office/powerpoint/2010/main" val="543640803"/>
       </p:ext>
     </p:extLst>
   </p:cSld>
@@ -5916,39 +6548,39 @@
       </p:grpSpPr>
       <p:sp>
         <p:nvSpPr>
-          <p:cNvPr id="2" name="Title 1"/>
-          <p:cNvSpPr>
-            <a:spLocks noGrp="1"/>
-          </p:cNvSpPr>
-          <p:nvPr>
-            <p:ph type="title"/>
-          </p:nvPr>
+          <p:cNvPr id="4" name="Rectangle 3"/>
+          <p:cNvSpPr/>
+          <p:nvPr/>
         </p:nvSpPr>
         <p:spPr>
           <a:xfrm>
-            <a:off x="2170326" y="1361660"/>
-            <a:ext cx="7838379" cy="3826565"/>
+            <a:off x="2557723" y="2460563"/>
+            <a:ext cx="5023555" cy="1569660"/>
           </a:xfrm>
+          <a:prstGeom prst="rect">
+            <a:avLst/>
+          </a:prstGeom>
         </p:spPr>
         <p:txBody>
-          <a:bodyPr>
-            <a:normAutofit/>
+          <a:bodyPr wrap="none">
+            <a:spAutoFit/>
           </a:bodyPr>
           <a:lstStyle/>
           <a:p>
-            <a:pPr algn="ctr"/>
-            <a:r>
-              <a:rPr lang="en-US" sz="6600" dirty="0" err="1" smtClean="0"/>
-              <a:t>IFrames</a:t>
-            </a:r>
-            <a:endParaRPr lang="en-US" sz="6600" dirty="0"/>
+            <a:r>
+              <a:rPr lang="en-US" sz="9600" dirty="0" smtClean="0">
+                <a:hlinkClick r:id="rId3"/>
+              </a:rPr>
+              <a:t>CodePen!</a:t>
+            </a:r>
+            <a:endParaRPr lang="en-US" sz="9600" dirty="0"/>
           </a:p>
         </p:txBody>
       </p:sp>
     </p:spTree>
     <p:extLst>
       <p:ext uri="{BB962C8B-B14F-4D97-AF65-F5344CB8AC3E}">
-        <p14:creationId xmlns:p14="http://schemas.microsoft.com/office/powerpoint/2010/main" val="424862080"/>
+        <p14:creationId xmlns:p14="http://schemas.microsoft.com/office/powerpoint/2010/main" val="1622190199"/>
       </p:ext>
     </p:extLst>
   </p:cSld>
@@ -5984,172 +6616,39 @@
       </p:grpSpPr>
       <p:sp>
         <p:nvSpPr>
-          <p:cNvPr id="2" name="Text Placeholder 1"/>
-          <p:cNvSpPr>
-            <a:spLocks noGrp="1"/>
-          </p:cNvSpPr>
-          <p:nvPr>
-            <p:ph type="body" sz="quarter" idx="10"/>
-          </p:nvPr>
-        </p:nvSpPr>
-        <p:spPr/>
-        <p:txBody>
-          <a:bodyPr/>
-          <a:lstStyle/>
-          <a:p>
-            <a:r>
-              <a:rPr lang="en-US" dirty="0" err="1" smtClean="0"/>
+          <p:cNvPr id="2" name="Title 1"/>
+          <p:cNvSpPr>
+            <a:spLocks noGrp="1"/>
+          </p:cNvSpPr>
+          <p:nvPr>
+            <p:ph type="title"/>
+          </p:nvPr>
+        </p:nvSpPr>
+        <p:spPr>
+          <a:xfrm>
+            <a:off x="2170326" y="1361660"/>
+            <a:ext cx="7838379" cy="3826565"/>
+          </a:xfrm>
+        </p:spPr>
+        <p:txBody>
+          <a:bodyPr>
+            <a:normAutofit/>
+          </a:bodyPr>
+          <a:lstStyle/>
+          <a:p>
+            <a:pPr algn="ctr"/>
+            <a:r>
+              <a:rPr lang="en-US" sz="6600" dirty="0" err="1" smtClean="0"/>
               <a:t>IFrames</a:t>
             </a:r>
-            <a:r>
-              <a:rPr lang="en-US" dirty="0" smtClean="0"/>
-              <a:t> - </a:t>
-            </a:r>
-            <a:r>
-              <a:rPr lang="en-US" dirty="0" smtClean="0">
-                <a:latin typeface="Consolas" panose="020B0609020204030204" pitchFamily="49" charset="0"/>
-              </a:rPr>
-              <a:t>&lt;iframe&gt;&lt;/iframe&gt;</a:t>
-            </a:r>
-            <a:endParaRPr lang="en-US" dirty="0">
-              <a:latin typeface="Consolas" panose="020B0609020204030204" pitchFamily="49" charset="0"/>
-            </a:endParaRPr>
-          </a:p>
-        </p:txBody>
-      </p:sp>
-      <p:sp>
-        <p:nvSpPr>
-          <p:cNvPr id="3" name="Content Placeholder 2"/>
-          <p:cNvSpPr>
-            <a:spLocks noGrp="1"/>
-          </p:cNvSpPr>
-          <p:nvPr>
-            <p:ph sz="quarter" idx="18"/>
-          </p:nvPr>
-        </p:nvSpPr>
-        <p:spPr/>
-        <p:txBody>
-          <a:bodyPr/>
-          <a:lstStyle/>
-          <a:p>
-            <a:r>
-              <a:rPr lang="en-US" dirty="0"/>
-              <a:t>The </a:t>
-            </a:r>
-            <a:r>
-              <a:rPr lang="en-US" b="1" dirty="0" smtClean="0"/>
-              <a:t>Inline </a:t>
-            </a:r>
-            <a:r>
-              <a:rPr lang="en-US" b="1" dirty="0"/>
-              <a:t>Frame</a:t>
-            </a:r>
-            <a:r>
-              <a:rPr lang="en-US" dirty="0"/>
-              <a:t> element </a:t>
-            </a:r>
-            <a:r>
-              <a:rPr lang="en-US" dirty="0" smtClean="0"/>
-              <a:t>represents </a:t>
-            </a:r>
-            <a:r>
-              <a:rPr lang="en-US" dirty="0"/>
-              <a:t>a nested browsing context, embedding another HTML page into the current </a:t>
-            </a:r>
-            <a:r>
-              <a:rPr lang="en-US" dirty="0" smtClean="0"/>
-              <a:t>one</a:t>
-            </a:r>
-          </a:p>
-          <a:p>
-            <a:r>
-              <a:rPr lang="en-US" dirty="0" smtClean="0"/>
-              <a:t>You can use iframes to display anything on the web, or on your computer, within your webpage!</a:t>
-            </a:r>
-          </a:p>
-          <a:p>
-            <a:r>
-              <a:rPr lang="en-US" dirty="0" err="1" smtClean="0"/>
-              <a:t>IFrames</a:t>
-            </a:r>
-            <a:r>
-              <a:rPr lang="en-US" dirty="0" smtClean="0"/>
-              <a:t> use the </a:t>
-            </a:r>
-            <a:r>
-              <a:rPr lang="en-US" dirty="0" err="1" smtClean="0">
-                <a:solidFill>
-                  <a:schemeClr val="bg2">
-                    <a:lumMod val="50000"/>
-                  </a:schemeClr>
-                </a:solidFill>
-                <a:latin typeface="Consolas" panose="020B0609020204030204" pitchFamily="49" charset="0"/>
-              </a:rPr>
-              <a:t>src</a:t>
-            </a:r>
-            <a:r>
-              <a:rPr lang="en-US" dirty="0" smtClean="0"/>
-              <a:t> attribute to determine which website to display</a:t>
-            </a:r>
-            <a:endParaRPr lang="en-US" dirty="0"/>
-          </a:p>
-          <a:p>
-            <a:r>
-              <a:rPr lang="en-US" dirty="0"/>
-              <a:t>You can use </a:t>
-            </a:r>
-            <a:r>
-              <a:rPr lang="en-US" dirty="0" smtClean="0"/>
-              <a:t>the </a:t>
-            </a:r>
-            <a:r>
-              <a:rPr lang="en-US" dirty="0" smtClean="0">
-                <a:solidFill>
-                  <a:schemeClr val="bg2">
-                    <a:lumMod val="50000"/>
-                  </a:schemeClr>
-                </a:solidFill>
-                <a:latin typeface="Consolas" panose="020B0609020204030204" pitchFamily="49" charset="0"/>
-              </a:rPr>
-              <a:t>height</a:t>
-            </a:r>
-            <a:r>
-              <a:rPr lang="en-US" dirty="0" smtClean="0"/>
-              <a:t> and </a:t>
-            </a:r>
-            <a:r>
-              <a:rPr lang="en-US" dirty="0" smtClean="0">
-                <a:solidFill>
-                  <a:schemeClr val="bg2">
-                    <a:lumMod val="50000"/>
-                  </a:schemeClr>
-                </a:solidFill>
-                <a:latin typeface="Consolas" panose="020B0609020204030204" pitchFamily="49" charset="0"/>
-              </a:rPr>
-              <a:t>width</a:t>
-            </a:r>
-            <a:r>
-              <a:rPr lang="en-US" dirty="0" smtClean="0"/>
-              <a:t> attributes to adjust the size of the iframe</a:t>
-            </a:r>
-            <a:endParaRPr lang="en-US" dirty="0"/>
-          </a:p>
-          <a:p>
-            <a:endParaRPr lang="en-US" dirty="0">
-              <a:solidFill>
-                <a:schemeClr val="bg2">
-                  <a:lumMod val="50000"/>
-                </a:schemeClr>
-              </a:solidFill>
-              <a:latin typeface="Consolas" panose="020B0609020204030204" pitchFamily="49" charset="0"/>
-            </a:endParaRPr>
+            <a:endParaRPr lang="en-US" sz="6600" dirty="0"/>
           </a:p>
         </p:txBody>
       </p:sp>
     </p:spTree>
     <p:extLst>
       <p:ext uri="{BB962C8B-B14F-4D97-AF65-F5344CB8AC3E}">
-        <p14:creationId xmlns:p14="http://schemas.microsoft.com/office/powerpoint/2010/main" val="2921826353"/>
+        <p14:creationId xmlns:p14="http://schemas.microsoft.com/office/powerpoint/2010/main" val="424862080"/>
       </p:ext>
     </p:extLst>
   </p:cSld>
@@ -6200,379 +6699,157 @@
           <a:p>
             <a:r>
               <a:rPr lang="en-US" dirty="0" err="1" smtClean="0"/>
-              <a:t>IFrame</a:t>
+              <a:t>IFrames</a:t>
             </a:r>
             <a:r>
               <a:rPr lang="en-US" dirty="0" smtClean="0"/>
-              <a:t> Example</a:t>
+              <a:t> - </a:t>
+            </a:r>
+            <a:r>
+              <a:rPr lang="en-US" dirty="0" smtClean="0">
+                <a:latin typeface="Consolas" panose="020B0609020204030204" pitchFamily="49" charset="0"/>
+              </a:rPr>
+              <a:t>&lt;iframe&gt;&lt;/iframe&gt;</a:t>
+            </a:r>
+            <a:endParaRPr lang="en-US" dirty="0">
+              <a:latin typeface="Consolas" panose="020B0609020204030204" pitchFamily="49" charset="0"/>
+            </a:endParaRPr>
+          </a:p>
+        </p:txBody>
+      </p:sp>
+      <p:sp>
+        <p:nvSpPr>
+          <p:cNvPr id="3" name="Content Placeholder 2"/>
+          <p:cNvSpPr>
+            <a:spLocks noGrp="1"/>
+          </p:cNvSpPr>
+          <p:nvPr>
+            <p:ph sz="quarter" idx="18"/>
+          </p:nvPr>
+        </p:nvSpPr>
+        <p:spPr/>
+        <p:txBody>
+          <a:bodyPr/>
+          <a:lstStyle/>
+          <a:p>
+            <a:r>
+              <a:rPr lang="en-US" dirty="0"/>
+              <a:t>The </a:t>
+            </a:r>
+            <a:r>
+              <a:rPr lang="en-US" b="1" dirty="0" smtClean="0"/>
+              <a:t>Inline </a:t>
+            </a:r>
+            <a:r>
+              <a:rPr lang="en-US" b="1" dirty="0"/>
+              <a:t>Frame</a:t>
+            </a:r>
+            <a:r>
+              <a:rPr lang="en-US" dirty="0"/>
+              <a:t> element </a:t>
+            </a:r>
+            <a:r>
+              <a:rPr lang="en-US" dirty="0" smtClean="0"/>
+              <a:t>represents </a:t>
+            </a:r>
+            <a:r>
+              <a:rPr lang="en-US" dirty="0"/>
+              <a:t>a nested browsing context, embedding another HTML page into the current </a:t>
+            </a:r>
+            <a:r>
+              <a:rPr lang="en-US" dirty="0" smtClean="0"/>
+              <a:t>one</a:t>
+            </a:r>
+          </a:p>
+          <a:p>
+            <a:r>
+              <a:rPr lang="en-US" dirty="0" smtClean="0"/>
+              <a:t>You can use iframes to display anything on the web, or on your computer, within your webpage!</a:t>
+            </a:r>
+          </a:p>
+          <a:p>
+            <a:r>
+              <a:rPr lang="en-US" dirty="0" err="1" smtClean="0"/>
+              <a:t>IFrames</a:t>
+            </a:r>
+            <a:r>
+              <a:rPr lang="en-US" dirty="0" smtClean="0"/>
+              <a:t> use the </a:t>
+            </a:r>
+            <a:r>
+              <a:rPr lang="en-US" dirty="0" err="1" smtClean="0">
+                <a:solidFill>
+                  <a:schemeClr val="bg2">
+                    <a:lumMod val="50000"/>
+                  </a:schemeClr>
+                </a:solidFill>
+                <a:latin typeface="Consolas" panose="020B0609020204030204" pitchFamily="49" charset="0"/>
+              </a:rPr>
+              <a:t>src</a:t>
+            </a:r>
+            <a:r>
+              <a:rPr lang="en-US" dirty="0" smtClean="0"/>
+              <a:t> attribute to determine which website to display</a:t>
             </a:r>
             <a:endParaRPr lang="en-US" dirty="0"/>
           </a:p>
-        </p:txBody>
-      </p:sp>
-      <p:sp>
-        <p:nvSpPr>
-          <p:cNvPr id="3" name="Content Placeholder 2"/>
-          <p:cNvSpPr>
-            <a:spLocks noGrp="1"/>
-          </p:cNvSpPr>
-          <p:nvPr>
-            <p:ph sz="quarter" idx="18"/>
-          </p:nvPr>
-        </p:nvSpPr>
-        <p:spPr>
-          <a:xfrm>
-            <a:off x="405033" y="1201003"/>
-            <a:ext cx="9650516" cy="5513696"/>
-          </a:xfrm>
-        </p:spPr>
-        <p:txBody>
-          <a:bodyPr>
-            <a:normAutofit/>
-          </a:bodyPr>
-          <a:lstStyle/>
-          <a:p>
-            <a:pPr marL="0" indent="0">
-              <a:buNone/>
-            </a:pPr>
+          <a:p>
+            <a:r>
+              <a:rPr lang="en-US" dirty="0"/>
+              <a:t>You can use </a:t>
+            </a:r>
+            <a:r>
+              <a:rPr lang="en-US" dirty="0" smtClean="0"/>
+              <a:t>the </a:t>
+            </a:r>
             <a:r>
               <a:rPr lang="en-US" dirty="0" smtClean="0">
                 <a:solidFill>
-                  <a:srgbClr val="800000"/>
+                  <a:schemeClr val="bg2">
+                    <a:lumMod val="50000"/>
+                  </a:schemeClr>
                 </a:solidFill>
                 <a:latin typeface="Consolas" panose="020B0609020204030204" pitchFamily="49" charset="0"/>
               </a:rPr>
-              <a:t>&lt;</a:t>
-            </a:r>
-            <a:r>
-              <a:rPr lang="en-US" dirty="0">
-                <a:solidFill>
-                  <a:srgbClr val="800000"/>
-                </a:solidFill>
-                <a:latin typeface="Consolas" panose="020B0609020204030204" pitchFamily="49" charset="0"/>
-              </a:rPr>
-              <a:t>iframe</a:t>
-            </a:r>
-            <a:r>
-              <a:rPr lang="en-US" dirty="0">
-                <a:solidFill>
-                  <a:srgbClr val="000000"/>
-                </a:solidFill>
-                <a:latin typeface="Consolas" panose="020B0609020204030204" pitchFamily="49" charset="0"/>
-              </a:rPr>
-              <a:t> </a:t>
-            </a:r>
-            <a:r>
-              <a:rPr lang="en-US" dirty="0" err="1">
-                <a:solidFill>
-                  <a:srgbClr val="FF0000"/>
-                </a:solidFill>
-                <a:latin typeface="Consolas" panose="020B0609020204030204" pitchFamily="49" charset="0"/>
-              </a:rPr>
-              <a:t>src</a:t>
-            </a:r>
-            <a:r>
-              <a:rPr lang="en-US" dirty="0">
-                <a:solidFill>
-                  <a:srgbClr val="000000"/>
-                </a:solidFill>
-                <a:latin typeface="Consolas" panose="020B0609020204030204" pitchFamily="49" charset="0"/>
-              </a:rPr>
-              <a:t>=</a:t>
-            </a:r>
-            <a:r>
-              <a:rPr lang="en-US" dirty="0">
-                <a:solidFill>
-                  <a:srgbClr val="0000FF"/>
-                </a:solidFill>
-                <a:latin typeface="Consolas" panose="020B0609020204030204" pitchFamily="49" charset="0"/>
-              </a:rPr>
-              <a:t>"http://weather.gov"</a:t>
-            </a:r>
-            <a:r>
-              <a:rPr lang="en-US" dirty="0">
-                <a:solidFill>
-                  <a:srgbClr val="800000"/>
-                </a:solidFill>
-                <a:latin typeface="Consolas" panose="020B0609020204030204" pitchFamily="49" charset="0"/>
-              </a:rPr>
-              <a:t>&gt;&lt;/iframe</a:t>
+              <a:t>height</a:t>
+            </a:r>
+            <a:r>
+              <a:rPr lang="en-US" dirty="0" smtClean="0"/>
+              <a:t> and </a:t>
             </a:r>
             <a:r>
               <a:rPr lang="en-US" dirty="0" smtClean="0">
                 <a:solidFill>
-                  <a:srgbClr val="800000"/>
+                  <a:schemeClr val="bg2">
+                    <a:lumMod val="50000"/>
+                  </a:schemeClr>
                 </a:solidFill>
                 <a:latin typeface="Consolas" panose="020B0609020204030204" pitchFamily="49" charset="0"/>
               </a:rPr>
-              <a:t>&gt;</a:t>
-            </a:r>
-          </a:p>
-          <a:p>
-            <a:pPr marL="0" indent="0">
-              <a:buNone/>
-            </a:pPr>
+              <a:t>width</a:t>
+            </a:r>
+            <a:r>
+              <a:rPr lang="en-US" dirty="0" smtClean="0"/>
+              <a:t> attributes to adjust the size of the iframe</a:t>
+            </a:r>
+            <a:endParaRPr lang="en-US" dirty="0"/>
+          </a:p>
+          <a:p>
             <a:endParaRPr lang="en-US" dirty="0">
               <a:solidFill>
-                <a:srgbClr val="800000"/>
+                <a:schemeClr val="bg2">
+                  <a:lumMod val="50000"/>
+                </a:schemeClr>
               </a:solidFill>
               <a:latin typeface="Consolas" panose="020B0609020204030204" pitchFamily="49" charset="0"/>
             </a:endParaRPr>
           </a:p>
-          <a:p>
-            <a:pPr marL="0" indent="0">
-              <a:buNone/>
-            </a:pPr>
-            <a:endParaRPr lang="en-US" dirty="0" smtClean="0">
-              <a:solidFill>
-                <a:srgbClr val="000000"/>
-              </a:solidFill>
-              <a:latin typeface="Consolas" panose="020B0609020204030204" pitchFamily="49" charset="0"/>
-            </a:endParaRPr>
-          </a:p>
-          <a:p>
-            <a:pPr marL="0" indent="0">
-              <a:buNone/>
-            </a:pPr>
-            <a:r>
-              <a:rPr lang="en-US" dirty="0">
-                <a:solidFill>
-                  <a:srgbClr val="800000"/>
-                </a:solidFill>
-                <a:latin typeface="Consolas" panose="020B0609020204030204" pitchFamily="49" charset="0"/>
-              </a:rPr>
-              <a:t>&lt;</a:t>
-            </a:r>
-            <a:r>
-              <a:rPr lang="en-US" dirty="0" smtClean="0">
-                <a:solidFill>
-                  <a:srgbClr val="800000"/>
-                </a:solidFill>
-                <a:latin typeface="Consolas" panose="020B0609020204030204" pitchFamily="49" charset="0"/>
-              </a:rPr>
-              <a:t>iframe</a:t>
-            </a:r>
-            <a:endParaRPr lang="en-US" dirty="0" smtClean="0">
-              <a:solidFill>
-                <a:srgbClr val="000000"/>
-              </a:solidFill>
-              <a:latin typeface="Consolas" panose="020B0609020204030204" pitchFamily="49" charset="0"/>
-            </a:endParaRPr>
-          </a:p>
-          <a:p>
-            <a:pPr marL="0" indent="0">
-              <a:buNone/>
-            </a:pPr>
-            <a:r>
-              <a:rPr lang="en-US" dirty="0">
-                <a:solidFill>
-                  <a:srgbClr val="000000"/>
-                </a:solidFill>
-                <a:latin typeface="Consolas" panose="020B0609020204030204" pitchFamily="49" charset="0"/>
-              </a:rPr>
-              <a:t>	</a:t>
-            </a:r>
-            <a:r>
-              <a:rPr lang="en-US" dirty="0" err="1" smtClean="0">
-                <a:solidFill>
-                  <a:srgbClr val="FF0000"/>
-                </a:solidFill>
-                <a:latin typeface="Consolas" panose="020B0609020204030204" pitchFamily="49" charset="0"/>
-              </a:rPr>
-              <a:t>src</a:t>
-            </a:r>
-            <a:r>
-              <a:rPr lang="en-US" dirty="0" smtClean="0">
-                <a:solidFill>
-                  <a:srgbClr val="000000"/>
-                </a:solidFill>
-                <a:latin typeface="Consolas" panose="020B0609020204030204" pitchFamily="49" charset="0"/>
-              </a:rPr>
-              <a:t>=</a:t>
-            </a:r>
-            <a:r>
-              <a:rPr lang="en-US" dirty="0" smtClean="0">
-                <a:solidFill>
-                  <a:srgbClr val="0000FF"/>
-                </a:solidFill>
-                <a:latin typeface="Consolas" panose="020B0609020204030204" pitchFamily="49" charset="0"/>
-              </a:rPr>
-              <a:t>"http</a:t>
-            </a:r>
-            <a:r>
-              <a:rPr lang="en-US" dirty="0">
-                <a:solidFill>
-                  <a:srgbClr val="0000FF"/>
-                </a:solidFill>
-                <a:latin typeface="Consolas" panose="020B0609020204030204" pitchFamily="49" charset="0"/>
-              </a:rPr>
-              <a:t>://</a:t>
-            </a:r>
-            <a:r>
-              <a:rPr lang="en-US" dirty="0" smtClean="0">
-                <a:solidFill>
-                  <a:srgbClr val="0000FF"/>
-                </a:solidFill>
-                <a:latin typeface="Consolas" panose="020B0609020204030204" pitchFamily="49" charset="0"/>
-              </a:rPr>
-              <a:t>weather.gov"</a:t>
-            </a:r>
-            <a:endParaRPr lang="en-US" dirty="0" smtClean="0">
-              <a:solidFill>
-                <a:srgbClr val="000000"/>
-              </a:solidFill>
-              <a:latin typeface="Consolas" panose="020B0609020204030204" pitchFamily="49" charset="0"/>
-            </a:endParaRPr>
-          </a:p>
-          <a:p>
-            <a:pPr marL="0" indent="0">
-              <a:buNone/>
-            </a:pPr>
-            <a:r>
-              <a:rPr lang="en-US" dirty="0" smtClean="0">
-                <a:solidFill>
-                  <a:srgbClr val="FF0000"/>
-                </a:solidFill>
-                <a:latin typeface="Consolas" panose="020B0609020204030204" pitchFamily="49" charset="0"/>
-              </a:rPr>
-              <a:t>	height</a:t>
-            </a:r>
-            <a:r>
-              <a:rPr lang="en-US" dirty="0">
-                <a:solidFill>
-                  <a:srgbClr val="000000"/>
-                </a:solidFill>
-                <a:latin typeface="Consolas" panose="020B0609020204030204" pitchFamily="49" charset="0"/>
-              </a:rPr>
-              <a:t>=</a:t>
-            </a:r>
-            <a:r>
-              <a:rPr lang="en-US" dirty="0">
-                <a:solidFill>
-                  <a:srgbClr val="0000FF"/>
-                </a:solidFill>
-                <a:latin typeface="Consolas" panose="020B0609020204030204" pitchFamily="49" charset="0"/>
-              </a:rPr>
-              <a:t>"</a:t>
-            </a:r>
-            <a:r>
-              <a:rPr lang="en-US" dirty="0" smtClean="0">
-                <a:solidFill>
-                  <a:srgbClr val="0000FF"/>
-                </a:solidFill>
-                <a:latin typeface="Consolas" panose="020B0609020204030204" pitchFamily="49" charset="0"/>
-              </a:rPr>
-              <a:t>800"</a:t>
-            </a:r>
-            <a:endParaRPr lang="en-US" dirty="0" smtClean="0">
-              <a:solidFill>
-                <a:srgbClr val="000000"/>
-              </a:solidFill>
-              <a:latin typeface="Consolas" panose="020B0609020204030204" pitchFamily="49" charset="0"/>
-            </a:endParaRPr>
-          </a:p>
-          <a:p>
-            <a:pPr marL="0" indent="0">
-              <a:buNone/>
-            </a:pPr>
-            <a:r>
-              <a:rPr lang="en-US" dirty="0">
-                <a:solidFill>
-                  <a:srgbClr val="000000"/>
-                </a:solidFill>
-                <a:latin typeface="Consolas" panose="020B0609020204030204" pitchFamily="49" charset="0"/>
-              </a:rPr>
-              <a:t>	</a:t>
-            </a:r>
-            <a:r>
-              <a:rPr lang="en-US" dirty="0" smtClean="0">
-                <a:solidFill>
-                  <a:srgbClr val="FF0000"/>
-                </a:solidFill>
-                <a:latin typeface="Consolas" panose="020B0609020204030204" pitchFamily="49" charset="0"/>
-              </a:rPr>
-              <a:t>width</a:t>
-            </a:r>
-            <a:r>
-              <a:rPr lang="en-US" dirty="0">
-                <a:solidFill>
-                  <a:srgbClr val="000000"/>
-                </a:solidFill>
-                <a:latin typeface="Consolas" panose="020B0609020204030204" pitchFamily="49" charset="0"/>
-              </a:rPr>
-              <a:t>=</a:t>
-            </a:r>
-            <a:r>
-              <a:rPr lang="en-US" dirty="0">
-                <a:solidFill>
-                  <a:srgbClr val="0000FF"/>
-                </a:solidFill>
-                <a:latin typeface="Consolas" panose="020B0609020204030204" pitchFamily="49" charset="0"/>
-              </a:rPr>
-              <a:t>"1000</a:t>
-            </a:r>
-            <a:r>
-              <a:rPr lang="en-US" dirty="0" smtClean="0">
-                <a:solidFill>
-                  <a:srgbClr val="0000FF"/>
-                </a:solidFill>
-                <a:latin typeface="Consolas" panose="020B0609020204030204" pitchFamily="49" charset="0"/>
-              </a:rPr>
-              <a:t>"</a:t>
-            </a:r>
-            <a:r>
-              <a:rPr lang="en-US" dirty="0" smtClean="0">
-                <a:solidFill>
-                  <a:srgbClr val="800000"/>
-                </a:solidFill>
-                <a:latin typeface="Consolas" panose="020B0609020204030204" pitchFamily="49" charset="0"/>
-              </a:rPr>
-              <a:t>&gt;</a:t>
-            </a:r>
-          </a:p>
-          <a:p>
-            <a:pPr marL="0" indent="0">
-              <a:buNone/>
-            </a:pPr>
-            <a:r>
-              <a:rPr lang="en-US" dirty="0" smtClean="0">
-                <a:solidFill>
-                  <a:srgbClr val="800000"/>
-                </a:solidFill>
-                <a:latin typeface="Consolas" panose="020B0609020204030204" pitchFamily="49" charset="0"/>
-              </a:rPr>
-              <a:t>&lt;/</a:t>
-            </a:r>
-            <a:r>
-              <a:rPr lang="en-US" dirty="0">
-                <a:solidFill>
-                  <a:srgbClr val="800000"/>
-                </a:solidFill>
-                <a:latin typeface="Consolas" panose="020B0609020204030204" pitchFamily="49" charset="0"/>
-              </a:rPr>
-              <a:t>iframe&gt;</a:t>
-            </a:r>
-            <a:endParaRPr lang="en-US" dirty="0">
-              <a:solidFill>
-                <a:srgbClr val="000000"/>
-              </a:solidFill>
-              <a:latin typeface="Consolas" panose="020B0609020204030204" pitchFamily="49" charset="0"/>
-            </a:endParaRPr>
-          </a:p>
-          <a:p>
-            <a:pPr marL="0" indent="0">
-              <a:buNone/>
-            </a:pPr>
-            <a:endParaRPr lang="en-US" dirty="0" smtClean="0">
-              <a:latin typeface="Consolas" panose="020B0609020204030204" pitchFamily="49" charset="0"/>
-            </a:endParaRPr>
-          </a:p>
         </p:txBody>
       </p:sp>
     </p:spTree>
     <p:extLst>
       <p:ext uri="{BB962C8B-B14F-4D97-AF65-F5344CB8AC3E}">
-        <p14:creationId xmlns:p14="http://schemas.microsoft.com/office/powerpoint/2010/main" val="2552192741"/>
+        <p14:creationId xmlns:p14="http://schemas.microsoft.com/office/powerpoint/2010/main" val="2921826353"/>
       </p:ext>
     </p:extLst>
   </p:cSld>

</xml_diff>

<commit_message>
remove thead and tbody
</commit_message>
<xml_diff>
--- a/Week04/TablesAndIFrames.pptx
+++ b/Week04/TablesAndIFrames.pptx
@@ -216,7 +216,7 @@
           <a:p>
             <a:fld id="{19104133-B5B0-4351-8158-4F0E5EB1E2BF}" type="datetimeFigureOut">
               <a:rPr lang="en-US" smtClean="0"/>
-              <a:t>3/20/2020</a:t>
+              <a:t>6/24/2021</a:t>
             </a:fld>
             <a:endParaRPr lang="en-US"/>
           </a:p>
@@ -280,38 +280,37 @@
           <a:p>
             <a:pPr lvl="0"/>
             <a:r>
-              <a:rPr lang="en-US" smtClean="0"/>
+              <a:rPr lang="en-US"/>
               <a:t>Edit Master text styles</a:t>
             </a:r>
           </a:p>
           <a:p>
             <a:pPr lvl="1"/>
             <a:r>
-              <a:rPr lang="en-US" smtClean="0"/>
+              <a:rPr lang="en-US"/>
               <a:t>Second level</a:t>
             </a:r>
           </a:p>
           <a:p>
             <a:pPr lvl="2"/>
             <a:r>
-              <a:rPr lang="en-US" smtClean="0"/>
+              <a:rPr lang="en-US"/>
               <a:t>Third level</a:t>
             </a:r>
           </a:p>
           <a:p>
             <a:pPr lvl="3"/>
             <a:r>
-              <a:rPr lang="en-US" smtClean="0"/>
+              <a:rPr lang="en-US"/>
               <a:t>Fourth level</a:t>
             </a:r>
           </a:p>
           <a:p>
             <a:pPr lvl="4"/>
             <a:r>
-              <a:rPr lang="en-US" smtClean="0"/>
+              <a:rPr lang="en-US"/>
               <a:t>Fifth level</a:t>
             </a:r>
-            <a:endParaRPr lang="en-US"/>
           </a:p>
         </p:txBody>
       </p:sp>
@@ -529,21 +528,38 @@
           <a:lstStyle/>
           <a:p>
             <a:r>
-              <a:rPr lang="en-US" dirty="0" smtClean="0"/>
+              <a:rPr lang="en-US" dirty="0"/>
               <a:t>Ask the students</a:t>
             </a:r>
             <a:r>
-              <a:rPr lang="en-US" baseline="0" dirty="0" smtClean="0"/>
-              <a:t> for examples of tabular data.</a:t>
+              <a:rPr lang="en-US" baseline="0" dirty="0"/>
+              <a:t> for examples of tabular data. Lots of times there are things like stats (for sports, </a:t>
+            </a:r>
+            <a:r>
+              <a:rPr lang="en-US" baseline="0" dirty="0" err="1"/>
+              <a:t>etc</a:t>
+            </a:r>
+            <a:r>
+              <a:rPr lang="en-US" baseline="0" dirty="0"/>
+              <a:t>) or other information about people.</a:t>
             </a:r>
           </a:p>
           <a:p>
-            <a:endParaRPr lang="en-US" baseline="0" dirty="0" smtClean="0"/>
+            <a:endParaRPr lang="en-US" baseline="0" dirty="0"/>
           </a:p>
           <a:p>
             <a:r>
-              <a:rPr lang="en-US" baseline="0" dirty="0" smtClean="0"/>
-              <a:t>One example is a table about birds</a:t>
+              <a:rPr lang="en-US" baseline="0" dirty="0"/>
+              <a:t>Show an example of this table, and ask the students what they think it is about.</a:t>
+            </a:r>
+          </a:p>
+          <a:p>
+            <a:endParaRPr lang="en-US" baseline="0" dirty="0"/>
+          </a:p>
+          <a:p>
+            <a:r>
+              <a:rPr lang="en-US" baseline="0" dirty="0"/>
+              <a:t>It’s about birds.</a:t>
             </a:r>
             <a:endParaRPr lang="en-US" dirty="0"/>
           </a:p>
@@ -630,33 +646,21 @@
           <a:lstStyle/>
           <a:p>
             <a:r>
-              <a:rPr lang="en-US" dirty="0" smtClean="0"/>
+              <a:rPr lang="en-US" dirty="0"/>
               <a:t>Explain each</a:t>
             </a:r>
             <a:r>
-              <a:rPr lang="en-US" baseline="0" dirty="0" smtClean="0"/>
+              <a:rPr lang="en-US" baseline="0" dirty="0"/>
               <a:t> element that goes into a table. These will make more sense once we see the tables in action.</a:t>
             </a:r>
           </a:p>
           <a:p>
-            <a:endParaRPr lang="en-US" baseline="0" dirty="0" smtClean="0"/>
+            <a:endParaRPr lang="en-US" baseline="0" dirty="0"/>
           </a:p>
           <a:p>
             <a:r>
-              <a:rPr lang="en-US" baseline="0" dirty="0" smtClean="0"/>
-              <a:t>The </a:t>
-            </a:r>
-            <a:r>
-              <a:rPr lang="en-US" baseline="0" dirty="0" err="1" smtClean="0"/>
-              <a:t>Repl</a:t>
-            </a:r>
-            <a:r>
-              <a:rPr lang="en-US" baseline="0" dirty="0" smtClean="0"/>
-              <a:t> contains an actual full </a:t>
-            </a:r>
-            <a:r>
-              <a:rPr lang="en-US" baseline="0" smtClean="0"/>
-              <a:t>table in HTML</a:t>
+              <a:rPr lang="en-US" baseline="0" dirty="0"/>
+              <a:t>The Repl contains an actual full table in HTML.</a:t>
             </a:r>
             <a:endParaRPr lang="en-US" dirty="0"/>
           </a:p>
@@ -743,55 +747,55 @@
           <a:lstStyle/>
           <a:p>
             <a:r>
-              <a:rPr lang="en-US" dirty="0" smtClean="0"/>
+              <a:rPr lang="en-US" dirty="0"/>
               <a:t>For the </a:t>
             </a:r>
             <a:r>
-              <a:rPr lang="en-US" dirty="0" err="1" smtClean="0"/>
+              <a:rPr lang="en-US" dirty="0" err="1"/>
               <a:t>Repl</a:t>
             </a:r>
             <a:r>
-              <a:rPr lang="en-US" dirty="0" smtClean="0"/>
+              <a:rPr lang="en-US" dirty="0"/>
               <a:t>,</a:t>
             </a:r>
             <a:r>
-              <a:rPr lang="en-US" baseline="0" dirty="0" smtClean="0"/>
+              <a:rPr lang="en-US" baseline="0" dirty="0"/>
               <a:t> emphasize the relationships between each table element. Ask students which elements are parents/children/</a:t>
             </a:r>
             <a:r>
-              <a:rPr lang="en-US" baseline="0" dirty="0" err="1" smtClean="0"/>
+              <a:rPr lang="en-US" baseline="0" dirty="0" err="1"/>
               <a:t>sibilings</a:t>
             </a:r>
             <a:r>
-              <a:rPr lang="en-US" baseline="0" dirty="0" smtClean="0"/>
+              <a:rPr lang="en-US" baseline="0" dirty="0"/>
               <a:t>/etc.</a:t>
             </a:r>
           </a:p>
           <a:p>
-            <a:endParaRPr lang="en-US" baseline="0" dirty="0" smtClean="0"/>
+            <a:endParaRPr lang="en-US" baseline="0" dirty="0"/>
           </a:p>
           <a:p>
             <a:r>
-              <a:rPr lang="en-US" baseline="0" dirty="0" smtClean="0"/>
+              <a:rPr lang="en-US" baseline="0" dirty="0"/>
               <a:t>Additionally, show the </a:t>
             </a:r>
             <a:r>
-              <a:rPr lang="en-US" b="1" baseline="0" dirty="0" smtClean="0"/>
+              <a:rPr lang="en-US" b="1" baseline="0" dirty="0"/>
               <a:t>border</a:t>
             </a:r>
             <a:r>
-              <a:rPr lang="en-US" b="0" baseline="0" dirty="0" smtClean="0"/>
+              <a:rPr lang="en-US" b="0" baseline="0" dirty="0"/>
               <a:t> attribute in this </a:t>
             </a:r>
             <a:r>
-              <a:rPr lang="en-US" b="0" baseline="0" dirty="0" err="1" smtClean="0"/>
+              <a:rPr lang="en-US" b="0" baseline="0" dirty="0" err="1"/>
               <a:t>Repl</a:t>
             </a:r>
             <a:r>
-              <a:rPr lang="en-US" b="0" baseline="0" dirty="0" smtClean="0"/>
+              <a:rPr lang="en-US" b="0" baseline="0" dirty="0"/>
               <a:t> – it starts as 0, so change it to 1 to see the border.</a:t>
             </a:r>
-            <a:endParaRPr lang="en-US" baseline="0" dirty="0" smtClean="0"/>
+            <a:endParaRPr lang="en-US" baseline="0" dirty="0"/>
           </a:p>
         </p:txBody>
       </p:sp>
@@ -876,10 +880,9 @@
           <a:lstStyle/>
           <a:p>
             <a:r>
-              <a:rPr lang="en-US" dirty="0" smtClean="0"/>
+              <a:rPr lang="en-US" dirty="0"/>
               <a:t>Explain iframes</a:t>
             </a:r>
-            <a:endParaRPr lang="en-US" dirty="0"/>
           </a:p>
         </p:txBody>
       </p:sp>
@@ -964,19 +967,19 @@
           <a:lstStyle/>
           <a:p>
             <a:r>
-              <a:rPr lang="en-US" dirty="0" smtClean="0"/>
+              <a:rPr lang="en-US" dirty="0"/>
               <a:t>For the </a:t>
             </a:r>
             <a:r>
-              <a:rPr lang="en-US" dirty="0" err="1" smtClean="0"/>
+              <a:rPr lang="en-US" dirty="0" err="1"/>
               <a:t>Repl</a:t>
             </a:r>
             <a:r>
-              <a:rPr lang="en-US" dirty="0" smtClean="0"/>
+              <a:rPr lang="en-US" dirty="0"/>
               <a:t>,</a:t>
             </a:r>
             <a:r>
-              <a:rPr lang="en-US" baseline="0" dirty="0" smtClean="0"/>
+              <a:rPr lang="en-US" baseline="0" dirty="0"/>
               <a:t> emphasize the use of attributes. Add an attribute for width, change the height attribute. Also show embedding a YouTube video for fun</a:t>
             </a:r>
           </a:p>
@@ -1158,15 +1161,7 @@
           <a:p>
             <a:r>
               <a:rPr lang="en-US" dirty="0"/>
-              <a:t>Click to edit Master </a:t>
-            </a:r>
-            <a:r>
-              <a:rPr lang="en-US" dirty="0" smtClean="0"/>
-              <a:t>subtitle </a:t>
-            </a:r>
-            <a:r>
-              <a:rPr lang="en-US" dirty="0"/>
-              <a:t>style</a:t>
+              <a:t>Click to edit Master subtitle style</a:t>
             </a:r>
           </a:p>
         </p:txBody>
@@ -1208,7 +1203,7 @@
             <a:fld id="{1C2D31DE-C454-491C-B5C3-F097855E3DF7}" type="datetime4">
               <a:rPr lang="en-US" smtClean="0"/>
               <a:pPr/>
-              <a:t>March 20, 2020</a:t>
+              <a:t>June 24, 2021</a:t>
             </a:fld>
             <a:endParaRPr lang="en-US" dirty="0"/>
           </a:p>
@@ -4282,17 +4277,16 @@
           <a:p>
             <a:pPr lvl="0"/>
             <a:r>
-              <a:rPr lang="en-US" dirty="0" smtClean="0"/>
+              <a:rPr lang="en-US" dirty="0"/>
               <a:t>Presenter Name</a:t>
             </a:r>
             <a:br>
-              <a:rPr lang="en-US" dirty="0" smtClean="0"/>
+              <a:rPr lang="en-US" dirty="0"/>
             </a:br>
             <a:r>
-              <a:rPr lang="en-US" dirty="0" smtClean="0"/>
+              <a:rPr lang="en-US" dirty="0"/>
               <a:t>Presenter Title</a:t>
             </a:r>
-            <a:endParaRPr lang="en-US" dirty="0"/>
           </a:p>
         </p:txBody>
       </p:sp>
@@ -4309,13 +4303,6 @@
   <p:transition>
     <p:fade/>
   </p:transition>
-  <p:timing>
-    <p:tnLst>
-      <p:par>
-        <p:cTn id="1" dur="indefinite" restart="never" nodeType="tmRoot"/>
-      </p:par>
-    </p:tnLst>
-  </p:timing>
   <p:hf sldNum="0" hdr="0" ftr="0"/>
 </p:sldLayout>
 </file>
@@ -4608,7 +4595,7 @@
           <a:p>
             <a:fld id="{5958763E-B898-436D-883D-03711491D54A}" type="datetimeFigureOut">
               <a:rPr lang="en-US" smtClean="0"/>
-              <a:t>3/20/2020</a:t>
+              <a:t>6/24/2021</a:t>
             </a:fld>
             <a:endParaRPr lang="en-US"/>
           </a:p>
@@ -4681,13 +4668,6 @@
   <p:transition>
     <p:fade/>
   </p:transition>
-  <p:timing>
-    <p:tnLst>
-      <p:par>
-        <p:cTn id="1" dur="indefinite" restart="never" nodeType="tmRoot"/>
-      </p:par>
-    </p:tnLst>
-  </p:timing>
 </p:sldLayout>
 </file>
 
@@ -4736,10 +4716,9 @@
           </a:lstStyle>
           <a:p>
             <a:r>
-              <a:rPr lang="en-US" dirty="0" smtClean="0"/>
+              <a:rPr lang="en-US" dirty="0"/>
               <a:t>Click icon to add picture</a:t>
             </a:r>
-            <a:endParaRPr lang="en-US" dirty="0"/>
           </a:p>
         </p:txBody>
       </p:sp>
@@ -4809,7 +4788,7 @@
           <a:p>
             <a:fld id="{5958763E-B898-436D-883D-03711491D54A}" type="datetimeFigureOut">
               <a:rPr lang="en-US" smtClean="0"/>
-              <a:t>3/20/2020</a:t>
+              <a:t>6/24/2021</a:t>
             </a:fld>
             <a:endParaRPr lang="en-US"/>
           </a:p>
@@ -4882,13 +4861,6 @@
   <p:transition>
     <p:fade/>
   </p:transition>
-  <p:timing>
-    <p:tnLst>
-      <p:par>
-        <p:cTn id="1" dur="indefinite" restart="never" nodeType="tmRoot"/>
-      </p:par>
-    </p:tnLst>
-  </p:timing>
 </p:sldLayout>
 </file>
 
@@ -5066,7 +5038,7 @@
           <a:p>
             <a:fld id="{5958763E-B898-436D-883D-03711491D54A}" type="datetimeFigureOut">
               <a:rPr lang="en-US" smtClean="0"/>
-              <a:t>3/20/2020</a:t>
+              <a:t>6/24/2021</a:t>
             </a:fld>
             <a:endParaRPr lang="en-US"/>
           </a:p>
@@ -5139,13 +5111,6 @@
   <p:transition>
     <p:fade/>
   </p:transition>
-  <p:timing>
-    <p:tnLst>
-      <p:par>
-        <p:cTn id="1" dur="indefinite" restart="never" nodeType="tmRoot"/>
-      </p:par>
-    </p:tnLst>
-  </p:timing>
 </p:sldLayout>
 </file>
 
@@ -5421,7 +5386,7 @@
           <a:p>
             <a:fld id="{5958763E-B898-436D-883D-03711491D54A}" type="datetimeFigureOut">
               <a:rPr lang="en-US" smtClean="0"/>
-              <a:t>3/20/2020</a:t>
+              <a:t>6/24/2021</a:t>
             </a:fld>
             <a:endParaRPr lang="en-US"/>
           </a:p>
@@ -5482,13 +5447,6 @@
   <p:transition>
     <p:fade/>
   </p:transition>
-  <p:timing>
-    <p:tnLst>
-      <p:par>
-        <p:cTn id="1" dur="indefinite" restart="never" nodeType="tmRoot"/>
-      </p:par>
-    </p:tnLst>
-  </p:timing>
 </p:sldLayout>
 </file>
 
@@ -5844,7 +5802,7 @@
           <a:p>
             <a:fld id="{5958763E-B898-436D-883D-03711491D54A}" type="datetimeFigureOut">
               <a:rPr lang="en-US" smtClean="0"/>
-              <a:t>3/20/2020</a:t>
+              <a:t>6/24/2021</a:t>
             </a:fld>
             <a:endParaRPr lang="en-US"/>
           </a:p>
@@ -5905,13 +5863,6 @@
   <p:transition>
     <p:fade/>
   </p:transition>
-  <p:timing>
-    <p:tnLst>
-      <p:par>
-        <p:cTn id="1" dur="indefinite" restart="never" nodeType="tmRoot"/>
-      </p:par>
-    </p:tnLst>
-  </p:timing>
 </p:sldLayout>
 </file>
 
@@ -6352,7 +6303,7 @@
           <a:p>
             <a:fld id="{5958763E-B898-436D-883D-03711491D54A}" type="datetimeFigureOut">
               <a:rPr lang="en-US" smtClean="0"/>
-              <a:t>3/20/2020</a:t>
+              <a:t>6/24/2021</a:t>
             </a:fld>
             <a:endParaRPr lang="en-US"/>
           </a:p>
@@ -6413,13 +6364,6 @@
   <p:transition>
     <p:fade/>
   </p:transition>
-  <p:timing>
-    <p:tnLst>
-      <p:par>
-        <p:cTn id="1" dur="indefinite" restart="never" nodeType="tmRoot"/>
-      </p:par>
-    </p:tnLst>
-  </p:timing>
 </p:sldLayout>
 </file>
 
@@ -6810,7 +6754,7 @@
           <a:p>
             <a:fld id="{5958763E-B898-436D-883D-03711491D54A}" type="datetimeFigureOut">
               <a:rPr lang="en-US" smtClean="0"/>
-              <a:t>3/20/2020</a:t>
+              <a:t>6/24/2021</a:t>
             </a:fld>
             <a:endParaRPr lang="en-US"/>
           </a:p>
@@ -6871,13 +6815,6 @@
   <p:transition>
     <p:fade/>
   </p:transition>
-  <p:timing>
-    <p:tnLst>
-      <p:par>
-        <p:cTn id="1" dur="indefinite" restart="never" nodeType="tmRoot"/>
-      </p:par>
-    </p:tnLst>
-  </p:timing>
 </p:sldLayout>
 </file>
 
@@ -7428,7 +7365,7 @@
           <a:p>
             <a:fld id="{5958763E-B898-436D-883D-03711491D54A}" type="datetimeFigureOut">
               <a:rPr lang="en-US" smtClean="0"/>
-              <a:t>3/20/2020</a:t>
+              <a:t>6/24/2021</a:t>
             </a:fld>
             <a:endParaRPr lang="en-US"/>
           </a:p>
@@ -7489,13 +7426,6 @@
   <p:transition>
     <p:fade/>
   </p:transition>
-  <p:timing>
-    <p:tnLst>
-      <p:par>
-        <p:cTn id="1" dur="indefinite" restart="never" nodeType="tmRoot"/>
-      </p:par>
-    </p:tnLst>
-  </p:timing>
 </p:sldLayout>
 </file>
 
@@ -8206,7 +8136,7 @@
           <a:p>
             <a:fld id="{5958763E-B898-436D-883D-03711491D54A}" type="datetimeFigureOut">
               <a:rPr lang="en-US" smtClean="0"/>
-              <a:t>3/20/2020</a:t>
+              <a:t>6/24/2021</a:t>
             </a:fld>
             <a:endParaRPr lang="en-US"/>
           </a:p>
@@ -8267,13 +8197,6 @@
   <p:transition>
     <p:fade/>
   </p:transition>
-  <p:timing>
-    <p:tnLst>
-      <p:par>
-        <p:cTn id="1" dur="indefinite" restart="never" nodeType="tmRoot"/>
-      </p:par>
-    </p:tnLst>
-  </p:timing>
 </p:sldLayout>
 </file>
 
@@ -8317,7 +8240,7 @@
           <a:p>
             <a:fld id="{5958763E-B898-436D-883D-03711491D54A}" type="datetimeFigureOut">
               <a:rPr lang="en-US" smtClean="0"/>
-              <a:t>3/20/2020</a:t>
+              <a:t>6/24/2021</a:t>
             </a:fld>
             <a:endParaRPr lang="en-US"/>
           </a:p>
@@ -8390,13 +8313,6 @@
   <p:transition>
     <p:fade/>
   </p:transition>
-  <p:timing>
-    <p:tnLst>
-      <p:par>
-        <p:cTn id="1" dur="indefinite" restart="never" nodeType="tmRoot"/>
-      </p:par>
-    </p:tnLst>
-  </p:timing>
 </p:sldLayout>
 </file>
 
@@ -8476,7 +8392,7 @@
                 <a:spcPct val="0"/>
               </a:spcAft>
             </a:pPr>
-            <a:endParaRPr lang="en-US" sz="2400" dirty="0" err="1" smtClean="0">
+            <a:endParaRPr lang="en-US" sz="2400" dirty="0" err="1">
               <a:gradFill>
                 <a:gsLst>
                   <a:gs pos="0">
@@ -8609,15 +8525,7 @@
           <a:p>
             <a:r>
               <a:rPr lang="en-US" dirty="0"/>
-              <a:t>Click to edit Master </a:t>
-            </a:r>
-            <a:r>
-              <a:rPr lang="en-US" dirty="0" smtClean="0"/>
-              <a:t>subtitle </a:t>
-            </a:r>
-            <a:r>
-              <a:rPr lang="en-US" dirty="0"/>
-              <a:t>style</a:t>
+              <a:t>Click to edit Master subtitle style</a:t>
             </a:r>
           </a:p>
         </p:txBody>
@@ -8659,7 +8567,7 @@
             <a:fld id="{1C2D31DE-C454-491C-B5C3-F097855E3DF7}" type="datetime4">
               <a:rPr lang="en-US" smtClean="0"/>
               <a:pPr/>
-              <a:t>March 20, 2020</a:t>
+              <a:t>June 24, 2021</a:t>
             </a:fld>
             <a:endParaRPr lang="en-US" dirty="0"/>
           </a:p>
@@ -11733,17 +11641,16 @@
           <a:p>
             <a:pPr lvl="0"/>
             <a:r>
-              <a:rPr lang="en-US" dirty="0" smtClean="0"/>
+              <a:rPr lang="en-US" dirty="0"/>
               <a:t>Presenter Name</a:t>
             </a:r>
             <a:br>
-              <a:rPr lang="en-US" dirty="0" smtClean="0"/>
+              <a:rPr lang="en-US" dirty="0"/>
             </a:br>
             <a:r>
-              <a:rPr lang="en-US" dirty="0" smtClean="0"/>
+              <a:rPr lang="en-US" dirty="0"/>
               <a:t>Presenter Title</a:t>
             </a:r>
-            <a:endParaRPr lang="en-US" dirty="0"/>
           </a:p>
         </p:txBody>
       </p:sp>
@@ -11760,13 +11667,6 @@
   <p:transition>
     <p:fade/>
   </p:transition>
-  <p:timing>
-    <p:tnLst>
-      <p:par>
-        <p:cTn id="1" dur="indefinite" restart="never" nodeType="tmRoot"/>
-      </p:par>
-    </p:tnLst>
-  </p:timing>
   <p:hf sldNum="0" hdr="0" ftr="0"/>
 </p:sldLayout>
 </file>
@@ -11819,7 +11719,7 @@
           <a:p>
             <a:fld id="{5958763E-B898-436D-883D-03711491D54A}" type="datetimeFigureOut">
               <a:rPr lang="en-US" smtClean="0"/>
-              <a:t>3/20/2020</a:t>
+              <a:t>6/24/2021</a:t>
             </a:fld>
             <a:endParaRPr lang="en-US"/>
           </a:p>
@@ -11892,13 +11792,6 @@
   <p:transition>
     <p:fade/>
   </p:transition>
-  <p:timing>
-    <p:tnLst>
-      <p:par>
-        <p:cTn id="1" dur="indefinite" restart="never" nodeType="tmRoot"/>
-      </p:par>
-    </p:tnLst>
-  </p:timing>
 </p:sldLayout>
 </file>
 
@@ -11950,7 +11843,7 @@
           <a:p>
             <a:fld id="{5958763E-B898-436D-883D-03711491D54A}" type="datetimeFigureOut">
               <a:rPr lang="en-US" smtClean="0"/>
-              <a:t>3/20/2020</a:t>
+              <a:t>6/24/2021</a:t>
             </a:fld>
             <a:endParaRPr lang="en-US"/>
           </a:p>
@@ -12023,13 +11916,6 @@
   <p:transition>
     <p:fade/>
   </p:transition>
-  <p:timing>
-    <p:tnLst>
-      <p:par>
-        <p:cTn id="1" dur="indefinite" restart="never" nodeType="tmRoot"/>
-      </p:par>
-    </p:tnLst>
-  </p:timing>
 </p:sldLayout>
 </file>
 
@@ -12081,7 +11967,7 @@
           <a:p>
             <a:fld id="{5958763E-B898-436D-883D-03711491D54A}" type="datetimeFigureOut">
               <a:rPr lang="en-US" smtClean="0"/>
-              <a:t>3/20/2020</a:t>
+              <a:t>6/24/2021</a:t>
             </a:fld>
             <a:endParaRPr lang="en-US"/>
           </a:p>
@@ -12154,13 +12040,6 @@
   <p:transition>
     <p:fade/>
   </p:transition>
-  <p:timing>
-    <p:tnLst>
-      <p:par>
-        <p:cTn id="1" dur="indefinite" restart="never" nodeType="tmRoot"/>
-      </p:par>
-    </p:tnLst>
-  </p:timing>
 </p:sldLayout>
 </file>
 
@@ -12212,7 +12091,7 @@
           <a:p>
             <a:fld id="{5958763E-B898-436D-883D-03711491D54A}" type="datetimeFigureOut">
               <a:rPr lang="en-US" smtClean="0"/>
-              <a:t>3/20/2020</a:t>
+              <a:t>6/24/2021</a:t>
             </a:fld>
             <a:endParaRPr lang="en-US"/>
           </a:p>
@@ -12285,13 +12164,6 @@
   <p:transition>
     <p:fade/>
   </p:transition>
-  <p:timing>
-    <p:tnLst>
-      <p:par>
-        <p:cTn id="1" dur="indefinite" restart="never" nodeType="tmRoot"/>
-      </p:par>
-    </p:tnLst>
-  </p:timing>
 </p:sldLayout>
 </file>
 
@@ -12343,7 +12215,7 @@
           <a:p>
             <a:fld id="{5958763E-B898-436D-883D-03711491D54A}" type="datetimeFigureOut">
               <a:rPr lang="en-US" smtClean="0"/>
-              <a:t>3/20/2020</a:t>
+              <a:t>6/24/2021</a:t>
             </a:fld>
             <a:endParaRPr lang="en-US"/>
           </a:p>
@@ -12416,13 +12288,6 @@
   <p:transition>
     <p:fade/>
   </p:transition>
-  <p:timing>
-    <p:tnLst>
-      <p:par>
-        <p:cTn id="1" dur="indefinite" restart="never" nodeType="tmRoot"/>
-      </p:par>
-    </p:tnLst>
-  </p:timing>
 </p:sldLayout>
 </file>
 
@@ -12474,7 +12339,7 @@
           <a:p>
             <a:fld id="{5958763E-B898-436D-883D-03711491D54A}" type="datetimeFigureOut">
               <a:rPr lang="en-US" smtClean="0"/>
-              <a:t>3/20/2020</a:t>
+              <a:t>6/24/2021</a:t>
             </a:fld>
             <a:endParaRPr lang="en-US"/>
           </a:p>
@@ -12547,13 +12412,6 @@
   <p:transition>
     <p:fade/>
   </p:transition>
-  <p:timing>
-    <p:tnLst>
-      <p:par>
-        <p:cTn id="1" dur="indefinite" restart="never" nodeType="tmRoot"/>
-      </p:par>
-    </p:tnLst>
-  </p:timing>
 </p:sldLayout>
 </file>
 
@@ -12605,7 +12463,7 @@
           <a:p>
             <a:fld id="{5958763E-B898-436D-883D-03711491D54A}" type="datetimeFigureOut">
               <a:rPr lang="en-US" smtClean="0"/>
-              <a:t>3/20/2020</a:t>
+              <a:t>6/24/2021</a:t>
             </a:fld>
             <a:endParaRPr lang="en-US"/>
           </a:p>
@@ -12678,13 +12536,6 @@
   <p:transition>
     <p:fade/>
   </p:transition>
-  <p:timing>
-    <p:tnLst>
-      <p:par>
-        <p:cTn id="1" dur="indefinite" restart="never" nodeType="tmRoot"/>
-      </p:par>
-    </p:tnLst>
-  </p:timing>
 </p:sldLayout>
 </file>
 
@@ -12736,7 +12587,7 @@
           <a:p>
             <a:fld id="{5958763E-B898-436D-883D-03711491D54A}" type="datetimeFigureOut">
               <a:rPr lang="en-US" smtClean="0"/>
-              <a:t>3/20/2020</a:t>
+              <a:t>6/24/2021</a:t>
             </a:fld>
             <a:endParaRPr lang="en-US"/>
           </a:p>
@@ -12809,13 +12660,6 @@
   <p:transition>
     <p:fade/>
   </p:transition>
-  <p:timing>
-    <p:tnLst>
-      <p:par>
-        <p:cTn id="1" dur="indefinite" restart="never" nodeType="tmRoot"/>
-      </p:par>
-    </p:tnLst>
-  </p:timing>
 </p:sldLayout>
 </file>
 
@@ -12876,7 +12720,7 @@
           <a:p>
             <a:fld id="{5958763E-B898-436D-883D-03711491D54A}" type="datetimeFigureOut">
               <a:rPr lang="en-US" smtClean="0"/>
-              <a:t>3/20/2020</a:t>
+              <a:t>6/24/2021</a:t>
             </a:fld>
             <a:endParaRPr lang="en-US"/>
           </a:p>
@@ -12949,13 +12793,6 @@
   <p:transition>
     <p:fade/>
   </p:transition>
-  <p:timing>
-    <p:tnLst>
-      <p:par>
-        <p:cTn id="1" dur="indefinite" restart="never" nodeType="tmRoot"/>
-      </p:par>
-    </p:tnLst>
-  </p:timing>
 </p:sldLayout>
 </file>
 
@@ -15957,13 +15794,6 @@
   <p:transition>
     <p:fade/>
   </p:transition>
-  <p:timing>
-    <p:tnLst>
-      <p:par>
-        <p:cTn id="1" dur="indefinite" restart="never" nodeType="tmRoot"/>
-      </p:par>
-    </p:tnLst>
-  </p:timing>
 </p:sldLayout>
 </file>
 
@@ -16051,7 +15881,7 @@
                 <a:spcPct val="0"/>
               </a:spcAft>
             </a:pPr>
-            <a:endParaRPr lang="en-US" sz="2400" dirty="0" err="1" smtClean="0">
+            <a:endParaRPr lang="en-US" sz="2400" dirty="0" err="1">
               <a:gradFill>
                 <a:gsLst>
                   <a:gs pos="0">
@@ -16187,15 +16017,7 @@
           <a:p>
             <a:r>
               <a:rPr lang="en-US" dirty="0"/>
-              <a:t>Click to edit Master </a:t>
-            </a:r>
-            <a:r>
-              <a:rPr lang="en-US" dirty="0" smtClean="0"/>
-              <a:t>subtitle </a:t>
-            </a:r>
-            <a:r>
-              <a:rPr lang="en-US" dirty="0"/>
-              <a:t>style</a:t>
+              <a:t>Click to edit Master subtitle style</a:t>
             </a:r>
           </a:p>
         </p:txBody>
@@ -16237,7 +16059,7 @@
             <a:fld id="{1C2D31DE-C454-491C-B5C3-F097855E3DF7}" type="datetime4">
               <a:rPr lang="en-US" smtClean="0"/>
               <a:pPr/>
-              <a:t>March 20, 2020</a:t>
+              <a:t>June 24, 2021</a:t>
             </a:fld>
             <a:endParaRPr lang="en-US" dirty="0"/>
           </a:p>
@@ -19319,17 +19141,16 @@
           <a:p>
             <a:pPr lvl="0"/>
             <a:r>
-              <a:rPr lang="en-US" dirty="0" smtClean="0"/>
+              <a:rPr lang="en-US" dirty="0"/>
               <a:t>Presenter Name</a:t>
             </a:r>
             <a:br>
-              <a:rPr lang="en-US" dirty="0" smtClean="0"/>
+              <a:rPr lang="en-US" dirty="0"/>
             </a:br>
             <a:r>
-              <a:rPr lang="en-US" dirty="0" smtClean="0"/>
+              <a:rPr lang="en-US" dirty="0"/>
               <a:t>Presenter Title</a:t>
             </a:r>
-            <a:endParaRPr lang="en-US" dirty="0"/>
           </a:p>
         </p:txBody>
       </p:sp>
@@ -19346,13 +19167,6 @@
   <p:transition>
     <p:fade/>
   </p:transition>
-  <p:timing>
-    <p:tnLst>
-      <p:par>
-        <p:cTn id="1" dur="indefinite" restart="never" nodeType="tmRoot"/>
-      </p:par>
-    </p:tnLst>
-  </p:timing>
   <p:hf sldNum="0" hdr="0" ftr="0"/>
 </p:sldLayout>
 </file>
@@ -26862,10 +26676,9 @@
           <a:p>
             <a:pPr lvl="0"/>
             <a:r>
-              <a:rPr lang="en-US" dirty="0" smtClean="0"/>
+              <a:rPr lang="en-US" dirty="0"/>
               <a:t>&lt;Call to action&gt;</a:t>
             </a:r>
-            <a:endParaRPr lang="en-US" dirty="0"/>
           </a:p>
         </p:txBody>
       </p:sp>
@@ -28482,7 +28295,7 @@
           <a:p>
             <a:fld id="{5958763E-B898-436D-883D-03711491D54A}" type="datetimeFigureOut">
               <a:rPr lang="en-US" smtClean="0"/>
-              <a:t>3/20/2020</a:t>
+              <a:t>6/24/2021</a:t>
             </a:fld>
             <a:endParaRPr lang="en-US"/>
           </a:p>
@@ -28609,7 +28422,7 @@
                 <a:spcPct val="0"/>
               </a:spcAft>
             </a:pPr>
-            <a:endParaRPr lang="en-US" sz="2400" dirty="0" err="1" smtClean="0">
+            <a:endParaRPr lang="en-US" sz="2400" dirty="0" err="1">
               <a:gradFill>
                 <a:gsLst>
                   <a:gs pos="0">
@@ -28640,13 +28453,6 @@
   <p:transition>
     <p:fade/>
   </p:transition>
-  <p:timing>
-    <p:tnLst>
-      <p:par>
-        <p:cTn id="1" dur="indefinite" restart="never" nodeType="tmRoot"/>
-      </p:par>
-    </p:tnLst>
-  </p:timing>
 </p:sldLayout>
 </file>
 
@@ -28891,7 +28697,7 @@
           <a:p>
             <a:fld id="{5958763E-B898-436D-883D-03711491D54A}" type="datetimeFigureOut">
               <a:rPr lang="en-US" smtClean="0"/>
-              <a:t>3/20/2020</a:t>
+              <a:t>6/24/2021</a:t>
             </a:fld>
             <a:endParaRPr lang="en-US"/>
           </a:p>
@@ -28964,13 +28770,6 @@
   <p:transition>
     <p:fade/>
   </p:transition>
-  <p:timing>
-    <p:tnLst>
-      <p:par>
-        <p:cTn id="1" dur="indefinite" restart="never" nodeType="tmRoot"/>
-      </p:par>
-    </p:tnLst>
-  </p:timing>
 </p:sldLayout>
 </file>
 
@@ -29192,7 +28991,7 @@
           <a:p>
             <a:fld id="{5958763E-B898-436D-883D-03711491D54A}" type="datetimeFigureOut">
               <a:rPr lang="en-US" smtClean="0"/>
-              <a:t>3/20/2020</a:t>
+              <a:t>6/24/2021</a:t>
             </a:fld>
             <a:endParaRPr lang="en-US"/>
           </a:p>
@@ -29265,13 +29064,6 @@
   <p:transition>
     <p:fade/>
   </p:transition>
-  <p:timing>
-    <p:tnLst>
-      <p:par>
-        <p:cTn id="1" dur="indefinite" restart="never" nodeType="tmRoot"/>
-      </p:par>
-    </p:tnLst>
-  </p:timing>
 </p:sldLayout>
 </file>
 
@@ -29400,7 +29192,7 @@
           <a:p>
             <a:fld id="{5958763E-B898-436D-883D-03711491D54A}" type="datetimeFigureOut">
               <a:rPr lang="en-US" smtClean="0"/>
-              <a:t>3/20/2020</a:t>
+              <a:t>6/24/2021</a:t>
             </a:fld>
             <a:endParaRPr lang="en-US"/>
           </a:p>
@@ -29523,13 +29315,6 @@
   <p:transition>
     <p:fade/>
   </p:transition>
-  <p:timing>
-    <p:tnLst>
-      <p:par>
-        <p:cTn id="1" dur="indefinite" restart="never" nodeType="tmRoot"/>
-      </p:par>
-    </p:tnLst>
-  </p:timing>
 </p:sldLayout>
 </file>
 
@@ -29668,7 +29453,7 @@
           <a:p>
             <a:fld id="{5958763E-B898-436D-883D-03711491D54A}" type="datetimeFigureOut">
               <a:rPr lang="en-US" smtClean="0"/>
-              <a:t>3/20/2020</a:t>
+              <a:t>6/24/2021</a:t>
             </a:fld>
             <a:endParaRPr lang="en-US"/>
           </a:p>
@@ -29795,13 +29580,6 @@
   <p:transition>
     <p:fade/>
   </p:transition>
-  <p:timing>
-    <p:tnLst>
-      <p:par>
-        <p:cTn id="1" dur="indefinite" restart="never" nodeType="tmRoot"/>
-      </p:par>
-    </p:tnLst>
-  </p:timing>
 </p:sldLayout>
 </file>
 
@@ -29963,7 +29741,7 @@
                 <a:spcPct val="0"/>
               </a:spcAft>
             </a:pPr>
-            <a:endParaRPr lang="en-US" sz="2400" dirty="0" err="1" smtClean="0">
+            <a:endParaRPr lang="en-US" sz="2400" dirty="0" err="1">
               <a:gradFill>
                 <a:gsLst>
                   <a:gs pos="0">
@@ -30014,10 +29792,9 @@
           </a:lstStyle>
           <a:p>
             <a:r>
-              <a:rPr lang="en-US" dirty="0" smtClean="0"/>
+              <a:rPr lang="en-US" dirty="0"/>
               <a:t>Type “Agenda”</a:t>
             </a:r>
-            <a:endParaRPr lang="en-US" dirty="0"/>
           </a:p>
         </p:txBody>
       </p:sp>
@@ -30141,24 +29918,23 @@
           <a:p>
             <a:pPr lvl="0"/>
             <a:r>
-              <a:rPr lang="en-US" dirty="0" smtClean="0"/>
+              <a:rPr lang="en-US" dirty="0"/>
               <a:t>Item 1</a:t>
             </a:r>
           </a:p>
           <a:p>
             <a:pPr lvl="0"/>
             <a:r>
-              <a:rPr lang="en-US" dirty="0" smtClean="0"/>
+              <a:rPr lang="en-US" dirty="0"/>
               <a:t>Item 2</a:t>
             </a:r>
           </a:p>
           <a:p>
             <a:pPr lvl="0"/>
             <a:r>
-              <a:rPr lang="en-US" dirty="0" smtClean="0"/>
+              <a:rPr lang="en-US" dirty="0"/>
               <a:t>Item 3</a:t>
             </a:r>
-            <a:endParaRPr lang="en-US" dirty="0"/>
           </a:p>
         </p:txBody>
       </p:sp>
@@ -30185,7 +29961,7 @@
           <a:p>
             <a:fld id="{5958763E-B898-436D-883D-03711491D54A}" type="datetimeFigureOut">
               <a:rPr lang="en-US" smtClean="0"/>
-              <a:t>3/20/2020</a:t>
+              <a:t>6/24/2021</a:t>
             </a:fld>
             <a:endParaRPr lang="en-US"/>
           </a:p>
@@ -30292,13 +30068,6 @@
   <p:transition>
     <p:fade/>
   </p:transition>
-  <p:timing>
-    <p:tnLst>
-      <p:par>
-        <p:cTn id="1" dur="indefinite" restart="never" nodeType="tmRoot"/>
-      </p:par>
-    </p:tnLst>
-  </p:timing>
 </p:sldLayout>
 </file>
 
@@ -30460,7 +30229,7 @@
                 <a:spcPct val="0"/>
               </a:spcAft>
             </a:pPr>
-            <a:endParaRPr lang="en-US" sz="2400" dirty="0" err="1" smtClean="0">
+            <a:endParaRPr lang="en-US" sz="2400" dirty="0" err="1">
               <a:gradFill>
                 <a:gsLst>
                   <a:gs pos="0">
@@ -30513,10 +30282,9 @@
           </a:lstStyle>
           <a:p>
             <a:r>
-              <a:rPr lang="en-US" dirty="0" smtClean="0"/>
+              <a:rPr lang="en-US" dirty="0"/>
               <a:t>Notable Quote</a:t>
             </a:r>
-            <a:endParaRPr lang="en-US" dirty="0"/>
           </a:p>
         </p:txBody>
       </p:sp>
@@ -30643,10 +30411,9 @@
           <a:p>
             <a:pPr lvl="0"/>
             <a:r>
-              <a:rPr lang="en-US" dirty="0" smtClean="0"/>
+              <a:rPr lang="en-US" dirty="0"/>
               <a:t>– Attribution</a:t>
             </a:r>
-            <a:endParaRPr lang="en-US" dirty="0"/>
           </a:p>
         </p:txBody>
       </p:sp>
@@ -30673,7 +30440,7 @@
           <a:p>
             <a:fld id="{5958763E-B898-436D-883D-03711491D54A}" type="datetimeFigureOut">
               <a:rPr lang="en-US" smtClean="0"/>
-              <a:t>3/20/2020</a:t>
+              <a:t>6/24/2021</a:t>
             </a:fld>
             <a:endParaRPr lang="en-US"/>
           </a:p>
@@ -31421,13 +31188,6 @@
   <p:transition>
     <p:fade/>
   </p:transition>
-  <p:timing>
-    <p:tnLst>
-      <p:par>
-        <p:cTn id="1" dur="indefinite" restart="never" nodeType="tmRoot"/>
-      </p:par>
-    </p:tnLst>
-  </p:timing>
 </p:sldLayout>
 </file>
 
@@ -31499,7 +31259,7 @@
           <a:p>
             <a:fld id="{5958763E-B898-436D-883D-03711491D54A}" type="datetimeFigureOut">
               <a:rPr lang="en-US" smtClean="0"/>
-              <a:t>3/20/2020</a:t>
+              <a:t>6/24/2021</a:t>
             </a:fld>
             <a:endParaRPr lang="en-US"/>
           </a:p>
@@ -31572,13 +31332,6 @@
   <p:transition>
     <p:fade/>
   </p:transition>
-  <p:timing>
-    <p:tnLst>
-      <p:par>
-        <p:cTn id="1" dur="indefinite" restart="never" nodeType="tmRoot"/>
-      </p:par>
-    </p:tnLst>
-  </p:timing>
 </p:sldLayout>
 </file>
 
@@ -31707,7 +31460,7 @@
           <a:p>
             <a:fld id="{5958763E-B898-436D-883D-03711491D54A}" type="datetimeFigureOut">
               <a:rPr lang="en-US" smtClean="0"/>
-              <a:t>3/20/2020</a:t>
+              <a:t>6/24/2021</a:t>
             </a:fld>
             <a:endParaRPr lang="en-US"/>
           </a:p>
@@ -31830,13 +31583,6 @@
   <p:transition>
     <p:fade/>
   </p:transition>
-  <p:timing>
-    <p:tnLst>
-      <p:par>
-        <p:cTn id="1" dur="indefinite" restart="never" nodeType="tmRoot"/>
-      </p:par>
-    </p:tnLst>
-  </p:timing>
 </p:sldLayout>
 </file>
 
@@ -32049,7 +31795,7 @@
           <a:p>
             <a:fld id="{5958763E-B898-436D-883D-03711491D54A}" type="datetimeFigureOut">
               <a:rPr lang="en-US" smtClean="0"/>
-              <a:t>3/20/2020</a:t>
+              <a:t>6/24/2021</a:t>
             </a:fld>
             <a:endParaRPr lang="en-US"/>
           </a:p>
@@ -32122,13 +31868,6 @@
   <p:transition>
     <p:fade/>
   </p:transition>
-  <p:timing>
-    <p:tnLst>
-      <p:par>
-        <p:cTn id="1" dur="indefinite" restart="never" nodeType="tmRoot"/>
-      </p:par>
-    </p:tnLst>
-  </p:timing>
 </p:sldLayout>
 </file>
 
@@ -32286,7 +32025,7 @@
           <a:p>
             <a:fld id="{5958763E-B898-436D-883D-03711491D54A}" type="datetimeFigureOut">
               <a:rPr lang="en-US" smtClean="0"/>
-              <a:t>3/20/2020</a:t>
+              <a:t>6/24/2021</a:t>
             </a:fld>
             <a:endParaRPr lang="en-US"/>
           </a:p>
@@ -32359,13 +32098,6 @@
   <p:transition>
     <p:fade/>
   </p:transition>
-  <p:timing>
-    <p:tnLst>
-      <p:par>
-        <p:cTn id="1" dur="indefinite" restart="never" nodeType="tmRoot"/>
-      </p:par>
-    </p:tnLst>
-  </p:timing>
 </p:sldLayout>
 </file>
 
@@ -32537,7 +32269,7 @@
           <a:p>
             <a:fld id="{5958763E-B898-436D-883D-03711491D54A}" type="datetimeFigureOut">
               <a:rPr lang="en-US" smtClean="0"/>
-              <a:t>3/20/2020</a:t>
+              <a:t>6/24/2021</a:t>
             </a:fld>
             <a:endParaRPr lang="en-US"/>
           </a:p>
@@ -32683,13 +32415,6 @@
   <p:transition>
     <p:fade/>
   </p:transition>
-  <p:timing>
-    <p:tnLst>
-      <p:par>
-        <p:cTn id="1" dur="indefinite" restart="never" nodeType="tmRoot"/>
-      </p:par>
-    </p:tnLst>
-  </p:timing>
   <p:txStyles>
     <p:titleStyle>
       <a:lvl1pPr algn="l" defTabSz="914400" rtl="0" eaLnBrk="1" latinLnBrk="0" hangingPunct="1">
@@ -32994,7 +32719,7 @@
       </a:lvl9pPr>
     </p:otherStyle>
   </p:txStyles>
-  <p:extLst mod="1">
+  <p:extLst>
     <p:ext uri="{27BBF7A9-308A-43DC-89C8-2F10F3537804}">
       <p15:sldGuideLst xmlns:p15="http://schemas.microsoft.com/office/powerpoint/2012/main">
         <p15:guide id="1" orient="horz" pos="2160" userDrawn="1">
@@ -33073,11 +32798,11 @@
           <a:lstStyle/>
           <a:p>
             <a:r>
-              <a:rPr lang="en-US" sz="6600" dirty="0" smtClean="0"/>
+              <a:rPr lang="en-US" sz="6600" dirty="0"/>
               <a:t>Tables &amp; </a:t>
             </a:r>
             <a:r>
-              <a:rPr lang="en-US" sz="6600" dirty="0" err="1" smtClean="0"/>
+              <a:rPr lang="en-US" sz="6600" dirty="0" err="1"/>
               <a:t>IFrames</a:t>
             </a:r>
             <a:endParaRPr lang="en-US" sz="6600" dirty="0"/>
@@ -33105,10 +32830,9 @@
           <a:lstStyle/>
           <a:p>
             <a:r>
-              <a:rPr lang="en-US" dirty="0" smtClean="0"/>
+              <a:rPr lang="en-US" dirty="0"/>
               <a:t>Hy-Tech Club: Web 101</a:t>
             </a:r>
-            <a:endParaRPr lang="en-US" dirty="0"/>
           </a:p>
         </p:txBody>
       </p:sp>
@@ -36093,13 +35817,6 @@
   <p:transition>
     <p:fade/>
   </p:transition>
-  <p:timing>
-    <p:tnLst>
-      <p:par>
-        <p:cTn id="1" dur="indefinite" restart="never" nodeType="tmRoot"/>
-      </p:par>
-    </p:tnLst>
-  </p:timing>
 </p:sld>
 </file>
 
@@ -36137,10 +35854,9 @@
           <a:p>
             <a:pPr algn="r"/>
             <a:r>
-              <a:rPr lang="en-US" dirty="0" smtClean="0"/>
+              <a:rPr lang="en-US" dirty="0"/>
               <a:t>Tables</a:t>
             </a:r>
-            <a:endParaRPr lang="en-US" dirty="0"/>
           </a:p>
         </p:txBody>
       </p:sp>
@@ -36196,13 +35912,6 @@
   <p:transition>
     <p:fade/>
   </p:transition>
-  <p:timing>
-    <p:tnLst>
-      <p:par>
-        <p:cTn id="1" dur="indefinite" restart="never" nodeType="tmRoot"/>
-      </p:par>
-    </p:tnLst>
-  </p:timing>
 </p:sld>
 </file>
 
@@ -36239,10 +35948,9 @@
           <a:lstStyle/>
           <a:p>
             <a:r>
-              <a:rPr lang="en-US" dirty="0" smtClean="0"/>
+              <a:rPr lang="en-US" dirty="0"/>
               <a:t>HTML Tables</a:t>
             </a:r>
-            <a:endParaRPr lang="en-US" dirty="0"/>
           </a:p>
         </p:txBody>
       </p:sp>
@@ -36267,7 +35975,7 @@
           <a:lstStyle/>
           <a:p>
             <a:r>
-              <a:rPr lang="en-US" dirty="0" smtClean="0"/>
+              <a:rPr lang="en-US" dirty="0"/>
               <a:t>What type of data could be displayed in a table?</a:t>
             </a:r>
           </a:p>
@@ -36347,7 +36055,7 @@
                 <a:spcPts val="600"/>
               </a:spcAft>
             </a:pPr>
-            <a:endParaRPr lang="en-US" sz="2400" dirty="0" err="1" smtClean="0">
+            <a:endParaRPr lang="en-US" sz="2400" dirty="0" err="1">
               <a:gradFill>
                 <a:gsLst>
                   <a:gs pos="2917">
@@ -36431,15 +36139,33 @@
                                   </p:childTnLst>
                                 </p:cTn>
                               </p:par>
+                            </p:childTnLst>
+                          </p:cTn>
+                        </p:par>
+                      </p:childTnLst>
+                    </p:cTn>
+                  </p:par>
+                  <p:par>
+                    <p:cTn id="8" fill="hold">
+                      <p:stCondLst>
+                        <p:cond delay="indefinite"/>
+                      </p:stCondLst>
+                      <p:childTnLst>
+                        <p:par>
+                          <p:cTn id="9" fill="hold">
+                            <p:stCondLst>
+                              <p:cond delay="0"/>
+                            </p:stCondLst>
+                            <p:childTnLst>
                               <p:par>
-                                <p:cTn id="8" presetID="10" presetClass="entr" presetSubtype="0" fill="hold" grpId="0" nodeType="withEffect">
+                                <p:cTn id="10" presetID="10" presetClass="entr" presetSubtype="0" fill="hold" grpId="0" nodeType="clickEffect">
                                   <p:stCondLst>
                                     <p:cond delay="0"/>
                                   </p:stCondLst>
                                   <p:childTnLst>
                                     <p:set>
                                       <p:cBhvr>
-                                        <p:cTn id="9" dur="1" fill="hold">
+                                        <p:cTn id="11" dur="1" fill="hold">
                                           <p:stCondLst>
                                             <p:cond delay="0"/>
                                           </p:stCondLst>
@@ -36457,7 +36183,7 @@
                                     </p:set>
                                     <p:animEffect transition="in" filter="fade">
                                       <p:cBhvr>
-                                        <p:cTn id="10" dur="500"/>
+                                        <p:cTn id="12" dur="500"/>
                                         <p:tgtEl>
                                           <p:spTgt spid="6"/>
                                         </p:tgtEl>
@@ -36533,10 +36259,9 @@
           <a:lstStyle/>
           <a:p>
             <a:r>
-              <a:rPr lang="en-US" dirty="0" smtClean="0"/>
+              <a:rPr lang="en-US" dirty="0"/>
               <a:t>Table elements</a:t>
             </a:r>
-            <a:endParaRPr lang="en-US" dirty="0"/>
           </a:p>
         </p:txBody>
       </p:sp>
@@ -36550,25 +36275,32 @@
             <p:ph idx="1"/>
           </p:nvPr>
         </p:nvSpPr>
-        <p:spPr/>
+        <p:spPr>
+          <a:xfrm>
+            <a:off x="381000" y="1143000"/>
+            <a:ext cx="11430000" cy="3086100"/>
+          </a:xfrm>
+        </p:spPr>
         <p:txBody>
-          <a:bodyPr/>
+          <a:bodyPr>
+            <a:normAutofit/>
+          </a:bodyPr>
           <a:lstStyle/>
           <a:p>
+            <a:pPr marL="57150" indent="0">
+              <a:buNone/>
+            </a:pPr>
             <a:r>
-              <a:rPr lang="en-US" dirty="0" smtClean="0"/>
+              <a:rPr lang="en-US" i="1" dirty="0"/>
               <a:t>HTML Tables consist of several nested elements:</a:t>
             </a:r>
-          </a:p>
-          <a:p>
-            <a:endParaRPr lang="en-US" dirty="0"/>
           </a:p>
           <a:p>
             <a:pPr marL="57150" indent="0">
               <a:buNone/>
             </a:pPr>
             <a:r>
-              <a:rPr lang="en-US" sz="3200" b="1" dirty="0" smtClean="0">
+              <a:rPr lang="en-US" sz="3200" b="1" dirty="0">
                 <a:solidFill>
                   <a:schemeClr val="accent2">
                     <a:lumMod val="75000"/>
@@ -36579,7 +36311,7 @@
               <a:t>table</a:t>
             </a:r>
             <a:r>
-              <a:rPr lang="en-US" dirty="0" smtClean="0"/>
+              <a:rPr lang="en-US" dirty="0"/>
               <a:t>: the primary element in a table, contains all other elements</a:t>
             </a:r>
           </a:p>
@@ -36588,81 +36320,9 @@
               <a:buNone/>
             </a:pPr>
             <a:r>
-              <a:rPr lang="en-US" sz="3200" b="1" dirty="0" err="1" smtClean="0">
+              <a:rPr lang="en-US" sz="3200" b="1" dirty="0">
                 <a:solidFill>
-                  <a:schemeClr val="accent2">
-                    <a:lumMod val="75000"/>
-                  </a:schemeClr>
-                </a:solidFill>
-                <a:latin typeface="Consolas" panose="020B0609020204030204" pitchFamily="49" charset="0"/>
-              </a:rPr>
-              <a:t>thead</a:t>
-            </a:r>
-            <a:r>
-              <a:rPr lang="en-US" dirty="0" smtClean="0"/>
-              <a:t>: contains the </a:t>
-            </a:r>
-            <a:r>
-              <a:rPr lang="en-US" i="1" dirty="0" smtClean="0"/>
-              <a:t>header</a:t>
-            </a:r>
-            <a:r>
-              <a:rPr lang="en-US" dirty="0" smtClean="0"/>
-              <a:t> portion of the table</a:t>
-            </a:r>
-            <a:endParaRPr lang="en-US" b="1" dirty="0">
-              <a:solidFill>
-                <a:schemeClr val="accent2">
-                  <a:lumMod val="75000"/>
-                </a:schemeClr>
-              </a:solidFill>
-              <a:latin typeface="Consolas" panose="020B0609020204030204" pitchFamily="49" charset="0"/>
-            </a:endParaRPr>
-          </a:p>
-          <a:p>
-            <a:pPr marL="57150" indent="0">
-              <a:buNone/>
-            </a:pPr>
-            <a:r>
-              <a:rPr lang="en-US" sz="3200" b="1" dirty="0" err="1" smtClean="0">
-                <a:solidFill>
-                  <a:schemeClr val="accent2">
-                    <a:lumMod val="75000"/>
-                  </a:schemeClr>
-                </a:solidFill>
-                <a:latin typeface="Consolas" panose="020B0609020204030204" pitchFamily="49" charset="0"/>
-              </a:rPr>
-              <a:t>tbody</a:t>
-            </a:r>
-            <a:r>
-              <a:rPr lang="en-US" dirty="0" smtClean="0"/>
-              <a:t>: contains the </a:t>
-            </a:r>
-            <a:r>
-              <a:rPr lang="en-US" i="1" dirty="0" smtClean="0"/>
-              <a:t>data</a:t>
-            </a:r>
-            <a:r>
-              <a:rPr lang="en-US" dirty="0" smtClean="0"/>
-              <a:t> portion of the table</a:t>
-            </a:r>
-            <a:endParaRPr lang="en-US" b="1" dirty="0">
-              <a:solidFill>
-                <a:schemeClr val="accent2">
-                  <a:lumMod val="75000"/>
-                </a:schemeClr>
-              </a:solidFill>
-              <a:latin typeface="Consolas" panose="020B0609020204030204" pitchFamily="49" charset="0"/>
-            </a:endParaRPr>
-          </a:p>
-          <a:p>
-            <a:pPr marL="57150" indent="0">
-              <a:buNone/>
-            </a:pPr>
-            <a:r>
-              <a:rPr lang="en-US" sz="3200" b="1" dirty="0" err="1" smtClean="0">
-                <a:solidFill>
-                  <a:schemeClr val="accent2">
+                  <a:schemeClr val="accent1">
                     <a:lumMod val="75000"/>
                   </a:schemeClr>
                 </a:solidFill>
@@ -36671,15 +36331,15 @@
               <a:t>tr</a:t>
             </a:r>
             <a:r>
-              <a:rPr lang="en-US" dirty="0" smtClean="0"/>
+              <a:rPr lang="en-US" dirty="0"/>
               <a:t>: a </a:t>
             </a:r>
             <a:r>
-              <a:rPr lang="en-US" i="1" dirty="0" smtClean="0"/>
+              <a:rPr lang="en-US" i="1" dirty="0"/>
               <a:t>row</a:t>
             </a:r>
             <a:r>
-              <a:rPr lang="en-US" dirty="0" smtClean="0"/>
+              <a:rPr lang="en-US" dirty="0"/>
               <a:t> in the table</a:t>
             </a:r>
             <a:endParaRPr lang="en-US" b="1" dirty="0">
@@ -36696,26 +36356,24 @@
               <a:buNone/>
             </a:pPr>
             <a:r>
-              <a:rPr lang="en-US" sz="3200" b="1" dirty="0" err="1" smtClean="0">
+              <a:rPr lang="en-US" sz="3200" b="1" dirty="0" err="1">
                 <a:solidFill>
-                  <a:schemeClr val="accent2">
-                    <a:lumMod val="75000"/>
-                  </a:schemeClr>
+                  <a:srgbClr val="FF8300"/>
                 </a:solidFill>
                 <a:latin typeface="Consolas" panose="020B0609020204030204" pitchFamily="49" charset="0"/>
               </a:rPr>
               <a:t>th</a:t>
             </a:r>
             <a:r>
-              <a:rPr lang="en-US" dirty="0" smtClean="0"/>
+              <a:rPr lang="en-US" dirty="0"/>
               <a:t>: a </a:t>
             </a:r>
             <a:r>
-              <a:rPr lang="en-US" i="1" dirty="0" smtClean="0"/>
+              <a:rPr lang="en-US" i="1" dirty="0"/>
               <a:t>header cell</a:t>
             </a:r>
             <a:r>
-              <a:rPr lang="en-US" dirty="0" smtClean="0"/>
+              <a:rPr lang="en-US" dirty="0"/>
               <a:t> in the table</a:t>
             </a:r>
             <a:endParaRPr lang="en-US" b="1" dirty="0">
@@ -36732,29 +36390,27 @@
               <a:buNone/>
             </a:pPr>
             <a:r>
-              <a:rPr lang="en-US" sz="3200" b="1" dirty="0" smtClean="0">
+              <a:rPr lang="en-US" sz="3200" b="1" dirty="0">
                 <a:solidFill>
-                  <a:schemeClr val="accent2">
-                    <a:lumMod val="75000"/>
-                  </a:schemeClr>
+                  <a:srgbClr val="E95EBE"/>
                 </a:solidFill>
                 <a:latin typeface="Consolas" panose="020B0609020204030204" pitchFamily="49" charset="0"/>
               </a:rPr>
               <a:t>td</a:t>
             </a:r>
             <a:r>
-              <a:rPr lang="en-US" dirty="0" smtClean="0"/>
+              <a:rPr lang="en-US" dirty="0"/>
               <a:t>: a </a:t>
             </a:r>
             <a:r>
-              <a:rPr lang="en-US" i="1" dirty="0" smtClean="0"/>
-              <a:t>cell</a:t>
+              <a:rPr lang="en-US" i="1" dirty="0"/>
+              <a:t>normal cell</a:t>
             </a:r>
             <a:r>
-              <a:rPr lang="en-US" dirty="0" smtClean="0"/>
+              <a:rPr lang="en-US" dirty="0"/>
               <a:t> in the table</a:t>
             </a:r>
-            <a:endParaRPr lang="en-US" b="1" dirty="0" smtClean="0">
+            <a:endParaRPr lang="en-US" b="1" dirty="0">
               <a:solidFill>
                 <a:schemeClr val="accent2">
                   <a:lumMod val="75000"/>
@@ -36763,14 +36419,366 @@
               <a:latin typeface="Consolas" panose="020B0609020204030204" pitchFamily="49" charset="0"/>
             </a:endParaRPr>
           </a:p>
+        </p:txBody>
+      </p:sp>
+      <p:pic>
+        <p:nvPicPr>
+          <p:cNvPr id="5" name="Picture 4">
+            <a:extLst>
+              <a:ext uri="{FF2B5EF4-FFF2-40B4-BE49-F238E27FC236}">
+                <a16:creationId xmlns:a16="http://schemas.microsoft.com/office/drawing/2014/main" id="{5A97C71E-A23A-42B9-9137-B0C6F092A1E7}"/>
+              </a:ext>
+            </a:extLst>
+          </p:cNvPr>
+          <p:cNvPicPr>
+            <a:picLocks noChangeAspect="1"/>
+          </p:cNvPicPr>
+          <p:nvPr/>
+        </p:nvPicPr>
+        <p:blipFill>
+          <a:blip r:embed="rId3"/>
+          <a:stretch>
+            <a:fillRect/>
+          </a:stretch>
+        </p:blipFill>
+        <p:spPr>
+          <a:xfrm>
+            <a:off x="609600" y="4397542"/>
+            <a:ext cx="10583752" cy="2381582"/>
+          </a:xfrm>
+          <a:prstGeom prst="rect">
+            <a:avLst/>
+          </a:prstGeom>
+        </p:spPr>
+      </p:pic>
+      <p:sp>
+        <p:nvSpPr>
+          <p:cNvPr id="6" name="Rectangle 5">
+            <a:extLst>
+              <a:ext uri="{FF2B5EF4-FFF2-40B4-BE49-F238E27FC236}">
+                <a16:creationId xmlns:a16="http://schemas.microsoft.com/office/drawing/2014/main" id="{22865F2E-D2A2-4655-9BD6-029692C741FB}"/>
+              </a:ext>
+            </a:extLst>
+          </p:cNvPr>
+          <p:cNvSpPr/>
+          <p:nvPr/>
+        </p:nvSpPr>
+        <p:spPr bwMode="auto">
+          <a:xfrm>
+            <a:off x="381000" y="4397542"/>
+            <a:ext cx="11430000" cy="2381582"/>
+          </a:xfrm>
+          <a:prstGeom prst="rect">
+            <a:avLst/>
+          </a:prstGeom>
+          <a:noFill/>
+          <a:ln w="50800">
+            <a:solidFill>
+              <a:schemeClr val="accent2"/>
+            </a:solidFill>
+            <a:miter lim="800000"/>
+            <a:headEnd type="none" w="med" len="med"/>
+            <a:tailEnd type="none" w="med" len="med"/>
+          </a:ln>
+          <a:effectLst/>
+        </p:spPr>
+        <p:style>
+          <a:lnRef idx="1">
+            <a:schemeClr val="accent2"/>
+          </a:lnRef>
+          <a:fillRef idx="3">
+            <a:schemeClr val="accent2"/>
+          </a:fillRef>
+          <a:effectRef idx="2">
+            <a:schemeClr val="accent2"/>
+          </a:effectRef>
+          <a:fontRef idx="minor">
+            <a:schemeClr val="lt1"/>
+          </a:fontRef>
+        </p:style>
+        <p:txBody>
+          <a:bodyPr rot="0" spcFirstLastPara="0" vertOverflow="overflow" horzOverflow="overflow" vert="horz" wrap="square" lIns="182880" tIns="146304" rIns="182880" bIns="146304" numCol="1" spcCol="0" rtlCol="0" fromWordArt="0" anchor="t" anchorCtr="0" forceAA="0" compatLnSpc="1">
+            <a:prstTxWarp prst="textNoShape">
+              <a:avLst/>
+            </a:prstTxWarp>
+            <a:noAutofit/>
+          </a:bodyPr>
+          <a:lstStyle/>
           <a:p>
-            <a:endParaRPr lang="en-US" b="1" dirty="0">
-              <a:solidFill>
-                <a:schemeClr val="accent2">
-                  <a:lumMod val="75000"/>
-                </a:schemeClr>
-              </a:solidFill>
-              <a:latin typeface="Consolas" panose="020B0609020204030204" pitchFamily="49" charset="0"/>
+            <a:pPr algn="ctr" defTabSz="932472" fontAlgn="base">
+              <a:lnSpc>
+                <a:spcPct val="90000"/>
+              </a:lnSpc>
+              <a:spcBef>
+                <a:spcPct val="0"/>
+              </a:spcBef>
+              <a:spcAft>
+                <a:spcPct val="0"/>
+              </a:spcAft>
+            </a:pPr>
+            <a:endParaRPr lang="en-US" sz="2400" dirty="0" err="1">
+              <a:gradFill>
+                <a:gsLst>
+                  <a:gs pos="0">
+                    <a:srgbClr val="FFFFFF"/>
+                  </a:gs>
+                  <a:gs pos="100000">
+                    <a:srgbClr val="FFFFFF"/>
+                  </a:gs>
+                </a:gsLst>
+                <a:lin ang="5400000" scaled="0"/>
+              </a:gradFill>
+              <a:ea typeface="Segoe UI" pitchFamily="34" charset="0"/>
+              <a:cs typeface="Segoe UI" pitchFamily="34" charset="0"/>
+            </a:endParaRPr>
+          </a:p>
+        </p:txBody>
+      </p:sp>
+      <p:sp>
+        <p:nvSpPr>
+          <p:cNvPr id="7" name="Rectangle 6">
+            <a:extLst>
+              <a:ext uri="{FF2B5EF4-FFF2-40B4-BE49-F238E27FC236}">
+                <a16:creationId xmlns:a16="http://schemas.microsoft.com/office/drawing/2014/main" id="{E7099D6C-6567-4C58-BA2F-CD078BC47DA5}"/>
+              </a:ext>
+            </a:extLst>
+          </p:cNvPr>
+          <p:cNvSpPr/>
+          <p:nvPr/>
+        </p:nvSpPr>
+        <p:spPr bwMode="auto">
+          <a:xfrm>
+            <a:off x="381000" y="4914900"/>
+            <a:ext cx="11430000" cy="457200"/>
+          </a:xfrm>
+          <a:prstGeom prst="rect">
+            <a:avLst/>
+          </a:prstGeom>
+          <a:noFill/>
+          <a:ln w="50800">
+            <a:solidFill>
+              <a:schemeClr val="accent1"/>
+            </a:solidFill>
+            <a:miter lim="800000"/>
+            <a:headEnd type="none" w="med" len="med"/>
+            <a:tailEnd type="none" w="med" len="med"/>
+          </a:ln>
+          <a:effectLst/>
+        </p:spPr>
+        <p:style>
+          <a:lnRef idx="1">
+            <a:schemeClr val="accent2"/>
+          </a:lnRef>
+          <a:fillRef idx="3">
+            <a:schemeClr val="accent2"/>
+          </a:fillRef>
+          <a:effectRef idx="2">
+            <a:schemeClr val="accent2"/>
+          </a:effectRef>
+          <a:fontRef idx="minor">
+            <a:schemeClr val="lt1"/>
+          </a:fontRef>
+        </p:style>
+        <p:txBody>
+          <a:bodyPr rot="0" spcFirstLastPara="0" vertOverflow="overflow" horzOverflow="overflow" vert="horz" wrap="square" lIns="182880" tIns="146304" rIns="182880" bIns="146304" numCol="1" spcCol="0" rtlCol="0" fromWordArt="0" anchor="t" anchorCtr="0" forceAA="0" compatLnSpc="1">
+            <a:prstTxWarp prst="textNoShape">
+              <a:avLst/>
+            </a:prstTxWarp>
+            <a:noAutofit/>
+          </a:bodyPr>
+          <a:lstStyle/>
+          <a:p>
+            <a:pPr algn="ctr" defTabSz="932472" fontAlgn="base">
+              <a:lnSpc>
+                <a:spcPct val="90000"/>
+              </a:lnSpc>
+              <a:spcBef>
+                <a:spcPct val="0"/>
+              </a:spcBef>
+              <a:spcAft>
+                <a:spcPct val="0"/>
+              </a:spcAft>
+            </a:pPr>
+            <a:endParaRPr lang="en-US" sz="2400" dirty="0" err="1">
+              <a:gradFill>
+                <a:gsLst>
+                  <a:gs pos="0">
+                    <a:srgbClr val="FFFFFF"/>
+                  </a:gs>
+                  <a:gs pos="100000">
+                    <a:srgbClr val="FFFFFF"/>
+                  </a:gs>
+                </a:gsLst>
+                <a:lin ang="5400000" scaled="0"/>
+              </a:gradFill>
+              <a:ea typeface="Segoe UI" pitchFamily="34" charset="0"/>
+              <a:cs typeface="Segoe UI" pitchFamily="34" charset="0"/>
+            </a:endParaRPr>
+          </a:p>
+        </p:txBody>
+      </p:sp>
+      <p:sp>
+        <p:nvSpPr>
+          <p:cNvPr id="8" name="Rectangle 7">
+            <a:extLst>
+              <a:ext uri="{FF2B5EF4-FFF2-40B4-BE49-F238E27FC236}">
+                <a16:creationId xmlns:a16="http://schemas.microsoft.com/office/drawing/2014/main" id="{AA5A7812-F97B-4EC5-BB1A-32ADEDE81F25}"/>
+              </a:ext>
+            </a:extLst>
+          </p:cNvPr>
+          <p:cNvSpPr/>
+          <p:nvPr/>
+        </p:nvSpPr>
+        <p:spPr bwMode="auto">
+          <a:xfrm>
+            <a:off x="3238500" y="4457700"/>
+            <a:ext cx="2857500" cy="457200"/>
+          </a:xfrm>
+          <a:prstGeom prst="rect">
+            <a:avLst/>
+          </a:prstGeom>
+          <a:noFill/>
+          <a:ln w="50800">
+            <a:solidFill>
+              <a:srgbClr val="FFC000"/>
+            </a:solidFill>
+            <a:miter lim="800000"/>
+            <a:headEnd type="none" w="med" len="med"/>
+            <a:tailEnd type="none" w="med" len="med"/>
+          </a:ln>
+          <a:effectLst/>
+        </p:spPr>
+        <p:style>
+          <a:lnRef idx="1">
+            <a:schemeClr val="accent2"/>
+          </a:lnRef>
+          <a:fillRef idx="3">
+            <a:schemeClr val="accent2"/>
+          </a:fillRef>
+          <a:effectRef idx="2">
+            <a:schemeClr val="accent2"/>
+          </a:effectRef>
+          <a:fontRef idx="minor">
+            <a:schemeClr val="lt1"/>
+          </a:fontRef>
+        </p:style>
+        <p:txBody>
+          <a:bodyPr rot="0" spcFirstLastPara="0" vertOverflow="overflow" horzOverflow="overflow" vert="horz" wrap="square" lIns="182880" tIns="146304" rIns="182880" bIns="146304" numCol="1" spcCol="0" rtlCol="0" fromWordArt="0" anchor="t" anchorCtr="0" forceAA="0" compatLnSpc="1">
+            <a:prstTxWarp prst="textNoShape">
+              <a:avLst/>
+            </a:prstTxWarp>
+            <a:noAutofit/>
+          </a:bodyPr>
+          <a:lstStyle/>
+          <a:p>
+            <a:pPr algn="ctr" defTabSz="932472" fontAlgn="base">
+              <a:lnSpc>
+                <a:spcPct val="90000"/>
+              </a:lnSpc>
+              <a:spcBef>
+                <a:spcPct val="0"/>
+              </a:spcBef>
+              <a:spcAft>
+                <a:spcPct val="0"/>
+              </a:spcAft>
+            </a:pPr>
+            <a:endParaRPr lang="en-US" sz="2400" dirty="0" err="1">
+              <a:gradFill>
+                <a:gsLst>
+                  <a:gs pos="0">
+                    <a:srgbClr val="FFFFFF"/>
+                  </a:gs>
+                  <a:gs pos="100000">
+                    <a:srgbClr val="FFFFFF"/>
+                  </a:gs>
+                </a:gsLst>
+                <a:lin ang="5400000" scaled="0"/>
+              </a:gradFill>
+              <a:ea typeface="Segoe UI" pitchFamily="34" charset="0"/>
+              <a:cs typeface="Segoe UI" pitchFamily="34" charset="0"/>
+            </a:endParaRPr>
+          </a:p>
+        </p:txBody>
+      </p:sp>
+      <p:sp>
+        <p:nvSpPr>
+          <p:cNvPr id="9" name="Rectangle 8">
+            <a:extLst>
+              <a:ext uri="{FF2B5EF4-FFF2-40B4-BE49-F238E27FC236}">
+                <a16:creationId xmlns:a16="http://schemas.microsoft.com/office/drawing/2014/main" id="{616B92A4-996F-42D6-BE6F-29427DA51581}"/>
+              </a:ext>
+            </a:extLst>
+          </p:cNvPr>
+          <p:cNvSpPr/>
+          <p:nvPr/>
+        </p:nvSpPr>
+        <p:spPr bwMode="auto">
+          <a:xfrm>
+            <a:off x="8421624" y="5425739"/>
+            <a:ext cx="571500" cy="325188"/>
+          </a:xfrm>
+          <a:prstGeom prst="rect">
+            <a:avLst/>
+          </a:prstGeom>
+          <a:noFill/>
+          <a:ln w="50800">
+            <a:solidFill>
+              <a:srgbClr val="E95EBE"/>
+            </a:solidFill>
+            <a:miter lim="800000"/>
+            <a:headEnd type="none" w="med" len="med"/>
+            <a:tailEnd type="none" w="med" len="med"/>
+          </a:ln>
+          <a:effectLst/>
+        </p:spPr>
+        <p:style>
+          <a:lnRef idx="1">
+            <a:schemeClr val="accent2"/>
+          </a:lnRef>
+          <a:fillRef idx="3">
+            <a:schemeClr val="accent2"/>
+          </a:fillRef>
+          <a:effectRef idx="2">
+            <a:schemeClr val="accent2"/>
+          </a:effectRef>
+          <a:fontRef idx="minor">
+            <a:schemeClr val="lt1"/>
+          </a:fontRef>
+        </p:style>
+        <p:txBody>
+          <a:bodyPr rot="0" spcFirstLastPara="0" vertOverflow="overflow" horzOverflow="overflow" vert="horz" wrap="square" lIns="182880" tIns="146304" rIns="182880" bIns="146304" numCol="1" spcCol="0" rtlCol="0" fromWordArt="0" anchor="t" anchorCtr="0" forceAA="0" compatLnSpc="1">
+            <a:prstTxWarp prst="textNoShape">
+              <a:avLst/>
+            </a:prstTxWarp>
+            <a:noAutofit/>
+          </a:bodyPr>
+          <a:lstStyle/>
+          <a:p>
+            <a:pPr algn="ctr" defTabSz="932472" fontAlgn="base">
+              <a:lnSpc>
+                <a:spcPct val="90000"/>
+              </a:lnSpc>
+              <a:spcBef>
+                <a:spcPct val="0"/>
+              </a:spcBef>
+              <a:spcAft>
+                <a:spcPct val="0"/>
+              </a:spcAft>
+            </a:pPr>
+            <a:endParaRPr lang="en-US" sz="2400" dirty="0" err="1">
+              <a:gradFill>
+                <a:gsLst>
+                  <a:gs pos="0">
+                    <a:srgbClr val="FFFFFF"/>
+                  </a:gs>
+                  <a:gs pos="100000">
+                    <a:srgbClr val="FFFFFF"/>
+                  </a:gs>
+                </a:gsLst>
+                <a:lin ang="5400000" scaled="0"/>
+              </a:gradFill>
+              <a:ea typeface="Segoe UI" pitchFamily="34" charset="0"/>
+              <a:cs typeface="Segoe UI" pitchFamily="34" charset="0"/>
             </a:endParaRPr>
           </a:p>
         </p:txBody>
@@ -36885,7 +36893,7 @@
                                         <p:tgtEl>
                                           <p:spTgt spid="3">
                                             <p:txEl>
-                                              <p:pRg st="2" end="2"/>
+                                              <p:pRg st="1" end="1"/>
                                             </p:txEl>
                                           </p:spTgt>
                                         </p:tgtEl>
@@ -36903,9 +36911,44 @@
                                         <p:tgtEl>
                                           <p:spTgt spid="3">
                                             <p:txEl>
-                                              <p:pRg st="2" end="2"/>
+                                              <p:pRg st="1" end="1"/>
                                             </p:txEl>
                                           </p:spTgt>
+                                        </p:tgtEl>
+                                      </p:cBhvr>
+                                    </p:animEffect>
+                                  </p:childTnLst>
+                                </p:cTn>
+                              </p:par>
+                              <p:par>
+                                <p:cTn id="13" presetID="10" presetClass="entr" presetSubtype="0" fill="hold" grpId="0" nodeType="withEffect">
+                                  <p:stCondLst>
+                                    <p:cond delay="0"/>
+                                  </p:stCondLst>
+                                  <p:childTnLst>
+                                    <p:set>
+                                      <p:cBhvr>
+                                        <p:cTn id="14" dur="1" fill="hold">
+                                          <p:stCondLst>
+                                            <p:cond delay="0"/>
+                                          </p:stCondLst>
+                                        </p:cTn>
+                                        <p:tgtEl>
+                                          <p:spTgt spid="6"/>
+                                        </p:tgtEl>
+                                        <p:attrNameLst>
+                                          <p:attrName>style.visibility</p:attrName>
+                                        </p:attrNameLst>
+                                      </p:cBhvr>
+                                      <p:to>
+                                        <p:strVal val="visible"/>
+                                      </p:to>
+                                    </p:set>
+                                    <p:animEffect transition="in" filter="fade">
+                                      <p:cBhvr>
+                                        <p:cTn id="15" dur="500"/>
+                                        <p:tgtEl>
+                                          <p:spTgt spid="6"/>
                                         </p:tgtEl>
                                       </p:cBhvr>
                                     </p:animEffect>
@@ -36919,26 +36962,122 @@
                     </p:cTn>
                   </p:par>
                   <p:par>
-                    <p:cTn id="13" fill="hold">
+                    <p:cTn id="16" fill="hold">
                       <p:stCondLst>
                         <p:cond delay="indefinite"/>
                       </p:stCondLst>
                       <p:childTnLst>
                         <p:par>
-                          <p:cTn id="14" fill="hold">
+                          <p:cTn id="17" fill="hold">
                             <p:stCondLst>
                               <p:cond delay="0"/>
                             </p:stCondLst>
                             <p:childTnLst>
                               <p:par>
-                                <p:cTn id="15" presetID="10" presetClass="entr" presetSubtype="0" fill="hold" grpId="0" nodeType="clickEffect">
+                                <p:cTn id="18" presetID="10" presetClass="entr" presetSubtype="0" fill="hold" grpId="0" nodeType="clickEffect">
                                   <p:stCondLst>
                                     <p:cond delay="0"/>
                                   </p:stCondLst>
                                   <p:childTnLst>
                                     <p:set>
                                       <p:cBhvr>
-                                        <p:cTn id="16" dur="1" fill="hold">
+                                        <p:cTn id="19" dur="1" fill="hold">
+                                          <p:stCondLst>
+                                            <p:cond delay="0"/>
+                                          </p:stCondLst>
+                                        </p:cTn>
+                                        <p:tgtEl>
+                                          <p:spTgt spid="3">
+                                            <p:txEl>
+                                              <p:pRg st="2" end="2"/>
+                                            </p:txEl>
+                                          </p:spTgt>
+                                        </p:tgtEl>
+                                        <p:attrNameLst>
+                                          <p:attrName>style.visibility</p:attrName>
+                                        </p:attrNameLst>
+                                      </p:cBhvr>
+                                      <p:to>
+                                        <p:strVal val="visible"/>
+                                      </p:to>
+                                    </p:set>
+                                    <p:animEffect transition="in" filter="fade">
+                                      <p:cBhvr>
+                                        <p:cTn id="20" dur="500"/>
+                                        <p:tgtEl>
+                                          <p:spTgt spid="3">
+                                            <p:txEl>
+                                              <p:pRg st="2" end="2"/>
+                                            </p:txEl>
+                                          </p:spTgt>
+                                        </p:tgtEl>
+                                      </p:cBhvr>
+                                    </p:animEffect>
+                                  </p:childTnLst>
+                                </p:cTn>
+                              </p:par>
+                              <p:par>
+                                <p:cTn id="21" presetID="10" presetClass="entr" presetSubtype="0" fill="hold" grpId="0" nodeType="withEffect">
+                                  <p:stCondLst>
+                                    <p:cond delay="0"/>
+                                  </p:stCondLst>
+                                  <p:childTnLst>
+                                    <p:set>
+                                      <p:cBhvr>
+                                        <p:cTn id="22" dur="1" fill="hold">
+                                          <p:stCondLst>
+                                            <p:cond delay="0"/>
+                                          </p:stCondLst>
+                                        </p:cTn>
+                                        <p:tgtEl>
+                                          <p:spTgt spid="7"/>
+                                        </p:tgtEl>
+                                        <p:attrNameLst>
+                                          <p:attrName>style.visibility</p:attrName>
+                                        </p:attrNameLst>
+                                      </p:cBhvr>
+                                      <p:to>
+                                        <p:strVal val="visible"/>
+                                      </p:to>
+                                    </p:set>
+                                    <p:animEffect transition="in" filter="fade">
+                                      <p:cBhvr>
+                                        <p:cTn id="23" dur="500"/>
+                                        <p:tgtEl>
+                                          <p:spTgt spid="7"/>
+                                        </p:tgtEl>
+                                      </p:cBhvr>
+                                    </p:animEffect>
+                                  </p:childTnLst>
+                                </p:cTn>
+                              </p:par>
+                            </p:childTnLst>
+                          </p:cTn>
+                        </p:par>
+                      </p:childTnLst>
+                    </p:cTn>
+                  </p:par>
+                  <p:par>
+                    <p:cTn id="24" fill="hold">
+                      <p:stCondLst>
+                        <p:cond delay="indefinite"/>
+                      </p:stCondLst>
+                      <p:childTnLst>
+                        <p:par>
+                          <p:cTn id="25" fill="hold">
+                            <p:stCondLst>
+                              <p:cond delay="0"/>
+                            </p:stCondLst>
+                            <p:childTnLst>
+                              <p:par>
+                                <p:cTn id="26" presetID="10" presetClass="entr" presetSubtype="0" fill="hold" grpId="0" nodeType="clickEffect">
+                                  <p:stCondLst>
+                                    <p:cond delay="0"/>
+                                  </p:stCondLst>
+                                  <p:childTnLst>
+                                    <p:set>
+                                      <p:cBhvr>
+                                        <p:cTn id="27" dur="1" fill="hold">
                                           <p:stCondLst>
                                             <p:cond delay="0"/>
                                           </p:stCondLst>
@@ -36960,13 +37099,48 @@
                                     </p:set>
                                     <p:animEffect transition="in" filter="fade">
                                       <p:cBhvr>
-                                        <p:cTn id="17" dur="500"/>
+                                        <p:cTn id="28" dur="500"/>
                                         <p:tgtEl>
                                           <p:spTgt spid="3">
                                             <p:txEl>
                                               <p:pRg st="3" end="3"/>
                                             </p:txEl>
                                           </p:spTgt>
+                                        </p:tgtEl>
+                                      </p:cBhvr>
+                                    </p:animEffect>
+                                  </p:childTnLst>
+                                </p:cTn>
+                              </p:par>
+                              <p:par>
+                                <p:cTn id="29" presetID="10" presetClass="entr" presetSubtype="0" fill="hold" grpId="0" nodeType="withEffect">
+                                  <p:stCondLst>
+                                    <p:cond delay="0"/>
+                                  </p:stCondLst>
+                                  <p:childTnLst>
+                                    <p:set>
+                                      <p:cBhvr>
+                                        <p:cTn id="30" dur="1" fill="hold">
+                                          <p:stCondLst>
+                                            <p:cond delay="0"/>
+                                          </p:stCondLst>
+                                        </p:cTn>
+                                        <p:tgtEl>
+                                          <p:spTgt spid="8"/>
+                                        </p:tgtEl>
+                                        <p:attrNameLst>
+                                          <p:attrName>style.visibility</p:attrName>
+                                        </p:attrNameLst>
+                                      </p:cBhvr>
+                                      <p:to>
+                                        <p:strVal val="visible"/>
+                                      </p:to>
+                                    </p:set>
+                                    <p:animEffect transition="in" filter="fade">
+                                      <p:cBhvr>
+                                        <p:cTn id="31" dur="500"/>
+                                        <p:tgtEl>
+                                          <p:spTgt spid="8"/>
                                         </p:tgtEl>
                                       </p:cBhvr>
                                     </p:animEffect>
@@ -36980,26 +37154,26 @@
                     </p:cTn>
                   </p:par>
                   <p:par>
-                    <p:cTn id="18" fill="hold">
+                    <p:cTn id="32" fill="hold">
                       <p:stCondLst>
                         <p:cond delay="indefinite"/>
                       </p:stCondLst>
                       <p:childTnLst>
                         <p:par>
-                          <p:cTn id="19" fill="hold">
+                          <p:cTn id="33" fill="hold">
                             <p:stCondLst>
                               <p:cond delay="0"/>
                             </p:stCondLst>
                             <p:childTnLst>
                               <p:par>
-                                <p:cTn id="20" presetID="10" presetClass="entr" presetSubtype="0" fill="hold" grpId="0" nodeType="clickEffect">
+                                <p:cTn id="34" presetID="10" presetClass="entr" presetSubtype="0" fill="hold" grpId="0" nodeType="clickEffect">
                                   <p:stCondLst>
                                     <p:cond delay="0"/>
                                   </p:stCondLst>
                                   <p:childTnLst>
                                     <p:set>
                                       <p:cBhvr>
-                                        <p:cTn id="21" dur="1" fill="hold">
+                                        <p:cTn id="35" dur="1" fill="hold">
                                           <p:stCondLst>
                                             <p:cond delay="0"/>
                                           </p:stCondLst>
@@ -37021,7 +37195,7 @@
                                     </p:set>
                                     <p:animEffect transition="in" filter="fade">
                                       <p:cBhvr>
-                                        <p:cTn id="22" dur="500"/>
+                                        <p:cTn id="36" dur="500"/>
                                         <p:tgtEl>
                                           <p:spTgt spid="3">
                                             <p:txEl>
@@ -37034,43 +37208,21 @@
                                   </p:childTnLst>
                                 </p:cTn>
                               </p:par>
-                            </p:childTnLst>
-                          </p:cTn>
-                        </p:par>
-                      </p:childTnLst>
-                    </p:cTn>
-                  </p:par>
-                  <p:par>
-                    <p:cTn id="23" fill="hold">
-                      <p:stCondLst>
-                        <p:cond delay="indefinite"/>
-                      </p:stCondLst>
-                      <p:childTnLst>
-                        <p:par>
-                          <p:cTn id="24" fill="hold">
-                            <p:stCondLst>
-                              <p:cond delay="0"/>
-                            </p:stCondLst>
-                            <p:childTnLst>
                               <p:par>
-                                <p:cTn id="25" presetID="10" presetClass="entr" presetSubtype="0" fill="hold" grpId="0" nodeType="clickEffect">
+                                <p:cTn id="37" presetID="10" presetClass="entr" presetSubtype="0" fill="hold" grpId="0" nodeType="withEffect">
                                   <p:stCondLst>
                                     <p:cond delay="0"/>
                                   </p:stCondLst>
                                   <p:childTnLst>
                                     <p:set>
                                       <p:cBhvr>
-                                        <p:cTn id="26" dur="1" fill="hold">
+                                        <p:cTn id="38" dur="1" fill="hold">
                                           <p:stCondLst>
                                             <p:cond delay="0"/>
                                           </p:stCondLst>
                                         </p:cTn>
                                         <p:tgtEl>
-                                          <p:spTgt spid="3">
-                                            <p:txEl>
-                                              <p:pRg st="5" end="5"/>
-                                            </p:txEl>
-                                          </p:spTgt>
+                                          <p:spTgt spid="9"/>
                                         </p:tgtEl>
                                         <p:attrNameLst>
                                           <p:attrName>style.visibility</p:attrName>
@@ -37082,135 +37234,9 @@
                                     </p:set>
                                     <p:animEffect transition="in" filter="fade">
                                       <p:cBhvr>
-                                        <p:cTn id="27" dur="500"/>
+                                        <p:cTn id="39" dur="500"/>
                                         <p:tgtEl>
-                                          <p:spTgt spid="3">
-                                            <p:txEl>
-                                              <p:pRg st="5" end="5"/>
-                                            </p:txEl>
-                                          </p:spTgt>
-                                        </p:tgtEl>
-                                      </p:cBhvr>
-                                    </p:animEffect>
-                                  </p:childTnLst>
-                                </p:cTn>
-                              </p:par>
-                            </p:childTnLst>
-                          </p:cTn>
-                        </p:par>
-                      </p:childTnLst>
-                    </p:cTn>
-                  </p:par>
-                  <p:par>
-                    <p:cTn id="28" fill="hold">
-                      <p:stCondLst>
-                        <p:cond delay="indefinite"/>
-                      </p:stCondLst>
-                      <p:childTnLst>
-                        <p:par>
-                          <p:cTn id="29" fill="hold">
-                            <p:stCondLst>
-                              <p:cond delay="0"/>
-                            </p:stCondLst>
-                            <p:childTnLst>
-                              <p:par>
-                                <p:cTn id="30" presetID="10" presetClass="entr" presetSubtype="0" fill="hold" grpId="0" nodeType="clickEffect">
-                                  <p:stCondLst>
-                                    <p:cond delay="0"/>
-                                  </p:stCondLst>
-                                  <p:childTnLst>
-                                    <p:set>
-                                      <p:cBhvr>
-                                        <p:cTn id="31" dur="1" fill="hold">
-                                          <p:stCondLst>
-                                            <p:cond delay="0"/>
-                                          </p:stCondLst>
-                                        </p:cTn>
-                                        <p:tgtEl>
-                                          <p:spTgt spid="3">
-                                            <p:txEl>
-                                              <p:pRg st="6" end="6"/>
-                                            </p:txEl>
-                                          </p:spTgt>
-                                        </p:tgtEl>
-                                        <p:attrNameLst>
-                                          <p:attrName>style.visibility</p:attrName>
-                                        </p:attrNameLst>
-                                      </p:cBhvr>
-                                      <p:to>
-                                        <p:strVal val="visible"/>
-                                      </p:to>
-                                    </p:set>
-                                    <p:animEffect transition="in" filter="fade">
-                                      <p:cBhvr>
-                                        <p:cTn id="32" dur="500"/>
-                                        <p:tgtEl>
-                                          <p:spTgt spid="3">
-                                            <p:txEl>
-                                              <p:pRg st="6" end="6"/>
-                                            </p:txEl>
-                                          </p:spTgt>
-                                        </p:tgtEl>
-                                      </p:cBhvr>
-                                    </p:animEffect>
-                                  </p:childTnLst>
-                                </p:cTn>
-                              </p:par>
-                            </p:childTnLst>
-                          </p:cTn>
-                        </p:par>
-                      </p:childTnLst>
-                    </p:cTn>
-                  </p:par>
-                  <p:par>
-                    <p:cTn id="33" fill="hold">
-                      <p:stCondLst>
-                        <p:cond delay="indefinite"/>
-                      </p:stCondLst>
-                      <p:childTnLst>
-                        <p:par>
-                          <p:cTn id="34" fill="hold">
-                            <p:stCondLst>
-                              <p:cond delay="0"/>
-                            </p:stCondLst>
-                            <p:childTnLst>
-                              <p:par>
-                                <p:cTn id="35" presetID="10" presetClass="entr" presetSubtype="0" fill="hold" grpId="0" nodeType="clickEffect">
-                                  <p:stCondLst>
-                                    <p:cond delay="0"/>
-                                  </p:stCondLst>
-                                  <p:childTnLst>
-                                    <p:set>
-                                      <p:cBhvr>
-                                        <p:cTn id="36" dur="1" fill="hold">
-                                          <p:stCondLst>
-                                            <p:cond delay="0"/>
-                                          </p:stCondLst>
-                                        </p:cTn>
-                                        <p:tgtEl>
-                                          <p:spTgt spid="3">
-                                            <p:txEl>
-                                              <p:pRg st="7" end="7"/>
-                                            </p:txEl>
-                                          </p:spTgt>
-                                        </p:tgtEl>
-                                        <p:attrNameLst>
-                                          <p:attrName>style.visibility</p:attrName>
-                                        </p:attrNameLst>
-                                      </p:cBhvr>
-                                      <p:to>
-                                        <p:strVal val="visible"/>
-                                      </p:to>
-                                    </p:set>
-                                    <p:animEffect transition="in" filter="fade">
-                                      <p:cBhvr>
-                                        <p:cTn id="37" dur="500"/>
-                                        <p:tgtEl>
-                                          <p:spTgt spid="3">
-                                            <p:txEl>
-                                              <p:pRg st="7" end="7"/>
-                                            </p:txEl>
-                                          </p:spTgt>
+                                          <p:spTgt spid="9"/>
                                         </p:tgtEl>
                                       </p:cBhvr>
                                     </p:animEffect>
@@ -37245,7 +37271,11 @@
       </p:par>
     </p:tnLst>
     <p:bldLst>
-      <p:bldP spid="3" grpId="0" build="p"/>
+      <p:bldP spid="3" grpId="0" uiExpand="1" build="p"/>
+      <p:bldP spid="6" grpId="0" animBg="1"/>
+      <p:bldP spid="7" grpId="0" animBg="1"/>
+      <p:bldP spid="8" grpId="0" animBg="1"/>
+      <p:bldP spid="9" grpId="0" animBg="1"/>
     </p:bldLst>
   </p:timing>
 </p:sld>
@@ -37294,10 +37324,9 @@
           <a:lstStyle/>
           <a:p>
             <a:r>
-              <a:rPr lang="en-US" dirty="0" smtClean="0"/>
+              <a:rPr lang="en-US" dirty="0"/>
               <a:t>Table example</a:t>
             </a:r>
-            <a:endParaRPr lang="en-US" dirty="0"/>
           </a:p>
         </p:txBody>
       </p:sp>
@@ -37325,7 +37354,7 @@
               <a:rPr lang="en-US" sz="11500" dirty="0">
                 <a:hlinkClick r:id="rId3"/>
               </a:rPr>
-              <a:t>https://repl.it/repls/MistyroseFrayedUnix</a:t>
+              <a:t>https://repl.it/@JosephMaxwell/TableExample</a:t>
             </a:r>
             <a:endParaRPr lang="en-US" sz="11500" dirty="0"/>
           </a:p>
@@ -37344,13 +37373,6 @@
   <p:transition>
     <p:fade/>
   </p:transition>
-  <p:timing>
-    <p:tnLst>
-      <p:par>
-        <p:cTn id="1" dur="indefinite" restart="never" nodeType="tmRoot"/>
-      </p:par>
-    </p:tnLst>
-  </p:timing>
 </p:sld>
 </file>
 
@@ -37387,11 +37409,11 @@
           <a:lstStyle/>
           <a:p>
             <a:r>
-              <a:rPr lang="en-US" dirty="0" smtClean="0"/>
+              <a:rPr lang="en-US" dirty="0"/>
               <a:t>The </a:t>
             </a:r>
             <a:r>
-              <a:rPr lang="en-US" sz="4000" cap="none" dirty="0" smtClean="0">
+              <a:rPr lang="en-US" sz="4000" cap="none" dirty="0">
                 <a:solidFill>
                   <a:schemeClr val="accent1">
                     <a:lumMod val="50000"/>
@@ -37402,7 +37424,7 @@
               <a:t>border</a:t>
             </a:r>
             <a:r>
-              <a:rPr lang="en-US" dirty="0" smtClean="0"/>
+              <a:rPr lang="en-US" dirty="0"/>
               <a:t> attribute</a:t>
             </a:r>
             <a:endParaRPr lang="en-US" dirty="0">
@@ -37484,19 +37506,10 @@
                 </a:solidFill>
                 <a:latin typeface="Consolas" panose="020B0609020204030204" pitchFamily="49" charset="0"/>
               </a:rPr>
-              <a:t>"1</a:t>
+              <a:t>"1"</a:t>
             </a:r>
             <a:r>
-              <a:rPr lang="en-US" sz="7200" dirty="0" smtClean="0">
-                <a:solidFill>
-                  <a:srgbClr val="0000FF"/>
-                </a:solidFill>
-                <a:latin typeface="Consolas" panose="020B0609020204030204" pitchFamily="49" charset="0"/>
-              </a:rPr>
-              <a:t>"</a:t>
-            </a:r>
-            <a:r>
-              <a:rPr lang="en-US" sz="7200" dirty="0" smtClean="0">
+              <a:rPr lang="en-US" sz="7200" dirty="0">
                 <a:solidFill>
                   <a:srgbClr val="800000"/>
                 </a:solidFill>
@@ -37517,11 +37530,11 @@
           </a:p>
           <a:p>
             <a:r>
-              <a:rPr lang="en-US" sz="4400" dirty="0" smtClean="0"/>
+              <a:rPr lang="en-US" sz="4400" dirty="0"/>
               <a:t>Set the </a:t>
             </a:r>
             <a:r>
-              <a:rPr lang="en-US" sz="4400" b="1" dirty="0" smtClean="0">
+              <a:rPr lang="en-US" sz="4400" b="1" dirty="0">
                 <a:solidFill>
                   <a:schemeClr val="accent1">
                     <a:lumMod val="50000"/>
@@ -37532,11 +37545,11 @@
               <a:t>border</a:t>
             </a:r>
             <a:r>
-              <a:rPr lang="en-US" sz="4400" dirty="0" smtClean="0"/>
+              <a:rPr lang="en-US" sz="4400" dirty="0"/>
               <a:t> attribute to </a:t>
             </a:r>
             <a:r>
-              <a:rPr lang="en-US" sz="4400" b="1" dirty="0" smtClean="0">
+              <a:rPr lang="en-US" sz="4400" b="1" dirty="0">
                 <a:solidFill>
                   <a:schemeClr val="accent1">
                     <a:lumMod val="50000"/>
@@ -37547,10 +37560,10 @@
               <a:t>1</a:t>
             </a:r>
             <a:r>
-              <a:rPr lang="en-US" sz="4400" dirty="0" smtClean="0"/>
+              <a:rPr lang="en-US" sz="4400" dirty="0"/>
               <a:t> to add a border</a:t>
             </a:r>
-            <a:endParaRPr lang="en-US" sz="4800" dirty="0" smtClean="0">
+            <a:endParaRPr lang="en-US" sz="4800" dirty="0">
               <a:solidFill>
                 <a:srgbClr val="800000"/>
               </a:solidFill>
@@ -37715,10 +37728,9 @@
           <a:p>
             <a:pPr algn="r"/>
             <a:r>
-              <a:rPr lang="en-US" dirty="0" smtClean="0"/>
+              <a:rPr lang="en-US" dirty="0"/>
               <a:t>Iframes</a:t>
             </a:r>
-            <a:endParaRPr lang="en-US" dirty="0"/>
           </a:p>
         </p:txBody>
       </p:sp>
@@ -37776,13 +37788,6 @@
   <p:transition>
     <p:fade/>
   </p:transition>
-  <p:timing>
-    <p:tnLst>
-      <p:par>
-        <p:cTn id="1" dur="indefinite" restart="never" nodeType="tmRoot"/>
-      </p:par>
-    </p:tnLst>
-  </p:timing>
 </p:sld>
 </file>
 
@@ -37819,11 +37824,11 @@
           <a:lstStyle/>
           <a:p>
             <a:r>
-              <a:rPr lang="en-US" dirty="0" smtClean="0"/>
+              <a:rPr lang="en-US" dirty="0"/>
               <a:t>The </a:t>
             </a:r>
             <a:r>
-              <a:rPr lang="en-US" sz="4000" cap="none" dirty="0" smtClean="0">
+              <a:rPr lang="en-US" sz="4000" cap="none" dirty="0">
                 <a:solidFill>
                   <a:srgbClr val="54C8E8">
                     <a:lumMod val="50000"/>
@@ -37834,10 +37839,9 @@
               <a:t>iframe</a:t>
             </a:r>
             <a:r>
-              <a:rPr lang="en-US" dirty="0" smtClean="0"/>
+              <a:rPr lang="en-US" dirty="0"/>
               <a:t> element</a:t>
             </a:r>
-            <a:endParaRPr lang="en-US" dirty="0"/>
           </a:p>
         </p:txBody>
       </p:sp>
@@ -37868,11 +37872,7 @@
             </a:r>
             <a:r>
               <a:rPr lang="en-US" dirty="0"/>
-              <a:t> element represents a nested browsing context, embedding another HTML page into the current </a:t>
-            </a:r>
-            <a:r>
-              <a:rPr lang="en-US" dirty="0" smtClean="0"/>
-              <a:t>one</a:t>
+              <a:t> element represents a nested browsing context, embedding another HTML page into the current one</a:t>
             </a:r>
           </a:p>
           <a:p>
@@ -37880,15 +37880,15 @@
           </a:p>
           <a:p>
             <a:r>
-              <a:rPr lang="en-US" dirty="0" smtClean="0"/>
+              <a:rPr lang="en-US" dirty="0"/>
               <a:t>Basically, you can display other webpages </a:t>
             </a:r>
             <a:r>
-              <a:rPr lang="en-US" i="1" dirty="0" smtClean="0"/>
+              <a:rPr lang="en-US" i="1" dirty="0"/>
               <a:t>within</a:t>
             </a:r>
             <a:r>
-              <a:rPr lang="en-US" dirty="0" smtClean="0"/>
+              <a:rPr lang="en-US" dirty="0"/>
               <a:t> your webpage</a:t>
             </a:r>
           </a:p>
@@ -37897,15 +37897,15 @@
           </a:p>
           <a:p>
             <a:r>
-              <a:rPr lang="en-US" dirty="0" err="1" smtClean="0"/>
+              <a:rPr lang="en-US" dirty="0" err="1"/>
               <a:t>IFrames</a:t>
             </a:r>
             <a:r>
-              <a:rPr lang="en-US" dirty="0" smtClean="0"/>
+              <a:rPr lang="en-US" dirty="0"/>
               <a:t> use the </a:t>
             </a:r>
             <a:r>
-              <a:rPr lang="en-US" b="1" dirty="0" err="1" smtClean="0">
+              <a:rPr lang="en-US" b="1" dirty="0" err="1">
                 <a:solidFill>
                   <a:schemeClr val="accent2">
                     <a:lumMod val="75000"/>
@@ -37916,18 +37916,18 @@
               <a:t>src</a:t>
             </a:r>
             <a:r>
-              <a:rPr lang="en-US" dirty="0" smtClean="0"/>
+              <a:rPr lang="en-US" dirty="0"/>
               <a:t> element to determine which webpage to display</a:t>
             </a:r>
           </a:p>
           <a:p>
             <a:pPr lvl="1"/>
             <a:r>
-              <a:rPr lang="en-US" dirty="0" smtClean="0"/>
+              <a:rPr lang="en-US" dirty="0"/>
               <a:t>There are also </a:t>
             </a:r>
             <a:r>
-              <a:rPr lang="en-US" b="1" dirty="0" smtClean="0">
+              <a:rPr lang="en-US" b="1" dirty="0">
                 <a:solidFill>
                   <a:schemeClr val="accent2">
                     <a:lumMod val="75000"/>
@@ -37938,11 +37938,11 @@
               <a:t>height</a:t>
             </a:r>
             <a:r>
-              <a:rPr lang="en-US" dirty="0" smtClean="0"/>
+              <a:rPr lang="en-US" dirty="0"/>
               <a:t> and </a:t>
             </a:r>
             <a:r>
-              <a:rPr lang="en-US" b="1" dirty="0" smtClean="0">
+              <a:rPr lang="en-US" b="1" dirty="0">
                 <a:solidFill>
                   <a:schemeClr val="accent2">
                     <a:lumMod val="75000"/>
@@ -37953,7 +37953,7 @@
               <a:t>width</a:t>
             </a:r>
             <a:r>
-              <a:rPr lang="en-US" dirty="0" smtClean="0"/>
+              <a:rPr lang="en-US" dirty="0"/>
               <a:t> attributes</a:t>
             </a:r>
           </a:p>
@@ -38007,25 +38007,7 @@
                 </a:solidFill>
                 <a:latin typeface="Consolas" panose="020B0609020204030204" pitchFamily="49" charset="0"/>
               </a:rPr>
-              <a:t>"https://</a:t>
-            </a:r>
-            <a:r>
-              <a:rPr lang="en-US" sz="3200" dirty="0" smtClean="0">
-                <a:solidFill>
-                  <a:srgbClr val="0000FF"/>
-                </a:solidFill>
-                <a:latin typeface="Consolas" panose="020B0609020204030204" pitchFamily="49" charset="0"/>
-              </a:rPr>
-              <a:t>www.w3schools.com"</a:t>
-            </a:r>
-            <a:r>
-              <a:rPr lang="en-US" sz="3200" dirty="0" smtClean="0">
-                <a:solidFill>
-                  <a:srgbClr val="800000"/>
-                </a:solidFill>
-                <a:latin typeface="Consolas" panose="020B0609020204030204" pitchFamily="49" charset="0"/>
-              </a:rPr>
-              <a:t>&gt;&lt;/iframe</a:t>
+              <a:t>"https://www.w3schools.com"</a:t>
             </a:r>
             <a:r>
               <a:rPr lang="en-US" sz="3200" dirty="0">
@@ -38034,7 +38016,7 @@
                 </a:solidFill>
                 <a:latin typeface="Consolas" panose="020B0609020204030204" pitchFamily="49" charset="0"/>
               </a:rPr>
-              <a:t>&gt;</a:t>
+              <a:t>&gt;&lt;/iframe&gt;</a:t>
             </a:r>
             <a:endParaRPr lang="en-US" sz="3200" dirty="0">
               <a:solidFill>
@@ -38044,7 +38026,7 @@
             </a:endParaRPr>
           </a:p>
           <a:p>
-            <a:endParaRPr lang="en-US" dirty="0" smtClean="0"/>
+            <a:endParaRPr lang="en-US" dirty="0"/>
           </a:p>
         </p:txBody>
       </p:sp>
@@ -38061,13 +38043,6 @@
   <p:transition>
     <p:fade/>
   </p:transition>
-  <p:timing>
-    <p:tnLst>
-      <p:par>
-        <p:cTn id="1" dur="indefinite" restart="never" nodeType="tmRoot"/>
-      </p:par>
-    </p:tnLst>
-  </p:timing>
 </p:sld>
 </file>
 
@@ -38114,10 +38089,9 @@
           <a:lstStyle/>
           <a:p>
             <a:r>
-              <a:rPr lang="en-US" dirty="0" smtClean="0"/>
+              <a:rPr lang="en-US" dirty="0"/>
               <a:t>iframe example</a:t>
             </a:r>
-            <a:endParaRPr lang="en-US" dirty="0"/>
           </a:p>
         </p:txBody>
       </p:sp>
@@ -38145,7 +38119,7 @@
               <a:rPr lang="en-US" sz="11500" dirty="0">
                 <a:hlinkClick r:id="rId3"/>
               </a:rPr>
-              <a:t>https://repl.it/repls/LemonchiffonQualifiedNumbers</a:t>
+              <a:t>https://repl.it/@JosephMaxwell/IFrameExample</a:t>
             </a:r>
             <a:endParaRPr lang="en-US" sz="16600" dirty="0"/>
           </a:p>
@@ -38164,13 +38138,6 @@
   <p:transition>
     <p:fade/>
   </p:transition>
-  <p:timing>
-    <p:tnLst>
-      <p:par>
-        <p:cTn id="1" dur="indefinite" restart="never" nodeType="tmRoot"/>
-      </p:par>
-    </p:tnLst>
-  </p:timing>
 </p:sld>
 </file>
 

</xml_diff>

<commit_message>
Update gitbook 2021-06-24 17:36:48
</commit_message>
<xml_diff>
--- a/Week04/TablesAndIFrames.pptx
+++ b/Week04/TablesAndIFrames.pptx
@@ -216,7 +216,7 @@
           <a:p>
             <a:fld id="{19104133-B5B0-4351-8158-4F0E5EB1E2BF}" type="datetimeFigureOut">
               <a:rPr lang="en-US" smtClean="0"/>
-              <a:t>3/20/2020</a:t>
+              <a:t>6/24/2021</a:t>
             </a:fld>
             <a:endParaRPr lang="en-US"/>
           </a:p>
@@ -280,38 +280,37 @@
           <a:p>
             <a:pPr lvl="0"/>
             <a:r>
-              <a:rPr lang="en-US" smtClean="0"/>
+              <a:rPr lang="en-US"/>
               <a:t>Edit Master text styles</a:t>
             </a:r>
           </a:p>
           <a:p>
             <a:pPr lvl="1"/>
             <a:r>
-              <a:rPr lang="en-US" smtClean="0"/>
+              <a:rPr lang="en-US"/>
               <a:t>Second level</a:t>
             </a:r>
           </a:p>
           <a:p>
             <a:pPr lvl="2"/>
             <a:r>
-              <a:rPr lang="en-US" smtClean="0"/>
+              <a:rPr lang="en-US"/>
               <a:t>Third level</a:t>
             </a:r>
           </a:p>
           <a:p>
             <a:pPr lvl="3"/>
             <a:r>
-              <a:rPr lang="en-US" smtClean="0"/>
+              <a:rPr lang="en-US"/>
               <a:t>Fourth level</a:t>
             </a:r>
           </a:p>
           <a:p>
             <a:pPr lvl="4"/>
             <a:r>
-              <a:rPr lang="en-US" smtClean="0"/>
+              <a:rPr lang="en-US"/>
               <a:t>Fifth level</a:t>
             </a:r>
-            <a:endParaRPr lang="en-US"/>
           </a:p>
         </p:txBody>
       </p:sp>
@@ -529,21 +528,38 @@
           <a:lstStyle/>
           <a:p>
             <a:r>
-              <a:rPr lang="en-US" dirty="0" smtClean="0"/>
+              <a:rPr lang="en-US" dirty="0"/>
               <a:t>Ask the students</a:t>
             </a:r>
             <a:r>
-              <a:rPr lang="en-US" baseline="0" dirty="0" smtClean="0"/>
-              <a:t> for examples of tabular data.</a:t>
+              <a:rPr lang="en-US" baseline="0" dirty="0"/>
+              <a:t> for examples of tabular data. Lots of times there are things like stats (for sports, </a:t>
+            </a:r>
+            <a:r>
+              <a:rPr lang="en-US" baseline="0" dirty="0" err="1"/>
+              <a:t>etc</a:t>
+            </a:r>
+            <a:r>
+              <a:rPr lang="en-US" baseline="0" dirty="0"/>
+              <a:t>) or other information about people.</a:t>
             </a:r>
           </a:p>
           <a:p>
-            <a:endParaRPr lang="en-US" baseline="0" dirty="0" smtClean="0"/>
+            <a:endParaRPr lang="en-US" baseline="0" dirty="0"/>
           </a:p>
           <a:p>
             <a:r>
-              <a:rPr lang="en-US" baseline="0" dirty="0" smtClean="0"/>
-              <a:t>One example is a table about birds</a:t>
+              <a:rPr lang="en-US" baseline="0" dirty="0"/>
+              <a:t>Show an example of this table, and ask the students what they think it is about.</a:t>
+            </a:r>
+          </a:p>
+          <a:p>
+            <a:endParaRPr lang="en-US" baseline="0" dirty="0"/>
+          </a:p>
+          <a:p>
+            <a:r>
+              <a:rPr lang="en-US" baseline="0" dirty="0"/>
+              <a:t>It’s about birds.</a:t>
             </a:r>
             <a:endParaRPr lang="en-US" dirty="0"/>
           </a:p>
@@ -630,33 +646,21 @@
           <a:lstStyle/>
           <a:p>
             <a:r>
-              <a:rPr lang="en-US" dirty="0" smtClean="0"/>
+              <a:rPr lang="en-US" dirty="0"/>
               <a:t>Explain each</a:t>
             </a:r>
             <a:r>
-              <a:rPr lang="en-US" baseline="0" dirty="0" smtClean="0"/>
+              <a:rPr lang="en-US" baseline="0" dirty="0"/>
               <a:t> element that goes into a table. These will make more sense once we see the tables in action.</a:t>
             </a:r>
           </a:p>
           <a:p>
-            <a:endParaRPr lang="en-US" baseline="0" dirty="0" smtClean="0"/>
+            <a:endParaRPr lang="en-US" baseline="0" dirty="0"/>
           </a:p>
           <a:p>
             <a:r>
-              <a:rPr lang="en-US" baseline="0" dirty="0" smtClean="0"/>
-              <a:t>The </a:t>
-            </a:r>
-            <a:r>
-              <a:rPr lang="en-US" baseline="0" dirty="0" err="1" smtClean="0"/>
-              <a:t>Repl</a:t>
-            </a:r>
-            <a:r>
-              <a:rPr lang="en-US" baseline="0" dirty="0" smtClean="0"/>
-              <a:t> contains an actual full </a:t>
-            </a:r>
-            <a:r>
-              <a:rPr lang="en-US" baseline="0" smtClean="0"/>
-              <a:t>table in HTML</a:t>
+              <a:rPr lang="en-US" baseline="0" dirty="0"/>
+              <a:t>The Repl contains an actual full table in HTML.</a:t>
             </a:r>
             <a:endParaRPr lang="en-US" dirty="0"/>
           </a:p>
@@ -743,55 +747,55 @@
           <a:lstStyle/>
           <a:p>
             <a:r>
-              <a:rPr lang="en-US" dirty="0" smtClean="0"/>
+              <a:rPr lang="en-US" dirty="0"/>
               <a:t>For the </a:t>
             </a:r>
             <a:r>
-              <a:rPr lang="en-US" dirty="0" err="1" smtClean="0"/>
+              <a:rPr lang="en-US" dirty="0" err="1"/>
               <a:t>Repl</a:t>
             </a:r>
             <a:r>
-              <a:rPr lang="en-US" dirty="0" smtClean="0"/>
+              <a:rPr lang="en-US" dirty="0"/>
               <a:t>,</a:t>
             </a:r>
             <a:r>
-              <a:rPr lang="en-US" baseline="0" dirty="0" smtClean="0"/>
+              <a:rPr lang="en-US" baseline="0" dirty="0"/>
               <a:t> emphasize the relationships between each table element. Ask students which elements are parents/children/</a:t>
             </a:r>
             <a:r>
-              <a:rPr lang="en-US" baseline="0" dirty="0" err="1" smtClean="0"/>
+              <a:rPr lang="en-US" baseline="0" dirty="0" err="1"/>
               <a:t>sibilings</a:t>
             </a:r>
             <a:r>
-              <a:rPr lang="en-US" baseline="0" dirty="0" smtClean="0"/>
+              <a:rPr lang="en-US" baseline="0" dirty="0"/>
               <a:t>/etc.</a:t>
             </a:r>
           </a:p>
           <a:p>
-            <a:endParaRPr lang="en-US" baseline="0" dirty="0" smtClean="0"/>
+            <a:endParaRPr lang="en-US" baseline="0" dirty="0"/>
           </a:p>
           <a:p>
             <a:r>
-              <a:rPr lang="en-US" baseline="0" dirty="0" smtClean="0"/>
+              <a:rPr lang="en-US" baseline="0" dirty="0"/>
               <a:t>Additionally, show the </a:t>
             </a:r>
             <a:r>
-              <a:rPr lang="en-US" b="1" baseline="0" dirty="0" smtClean="0"/>
+              <a:rPr lang="en-US" b="1" baseline="0" dirty="0"/>
               <a:t>border</a:t>
             </a:r>
             <a:r>
-              <a:rPr lang="en-US" b="0" baseline="0" dirty="0" smtClean="0"/>
+              <a:rPr lang="en-US" b="0" baseline="0" dirty="0"/>
               <a:t> attribute in this </a:t>
             </a:r>
             <a:r>
-              <a:rPr lang="en-US" b="0" baseline="0" dirty="0" err="1" smtClean="0"/>
+              <a:rPr lang="en-US" b="0" baseline="0" dirty="0" err="1"/>
               <a:t>Repl</a:t>
             </a:r>
             <a:r>
-              <a:rPr lang="en-US" b="0" baseline="0" dirty="0" smtClean="0"/>
+              <a:rPr lang="en-US" b="0" baseline="0" dirty="0"/>
               <a:t> – it starts as 0, so change it to 1 to see the border.</a:t>
             </a:r>
-            <a:endParaRPr lang="en-US" baseline="0" dirty="0" smtClean="0"/>
+            <a:endParaRPr lang="en-US" baseline="0" dirty="0"/>
           </a:p>
         </p:txBody>
       </p:sp>
@@ -876,10 +880,9 @@
           <a:lstStyle/>
           <a:p>
             <a:r>
-              <a:rPr lang="en-US" dirty="0" smtClean="0"/>
+              <a:rPr lang="en-US" dirty="0"/>
               <a:t>Explain iframes</a:t>
             </a:r>
-            <a:endParaRPr lang="en-US" dirty="0"/>
           </a:p>
         </p:txBody>
       </p:sp>
@@ -964,19 +967,19 @@
           <a:lstStyle/>
           <a:p>
             <a:r>
-              <a:rPr lang="en-US" dirty="0" smtClean="0"/>
+              <a:rPr lang="en-US" dirty="0"/>
               <a:t>For the </a:t>
             </a:r>
             <a:r>
-              <a:rPr lang="en-US" dirty="0" err="1" smtClean="0"/>
+              <a:rPr lang="en-US" dirty="0" err="1"/>
               <a:t>Repl</a:t>
             </a:r>
             <a:r>
-              <a:rPr lang="en-US" dirty="0" smtClean="0"/>
+              <a:rPr lang="en-US" dirty="0"/>
               <a:t>,</a:t>
             </a:r>
             <a:r>
-              <a:rPr lang="en-US" baseline="0" dirty="0" smtClean="0"/>
+              <a:rPr lang="en-US" baseline="0" dirty="0"/>
               <a:t> emphasize the use of attributes. Add an attribute for width, change the height attribute. Also show embedding a YouTube video for fun</a:t>
             </a:r>
           </a:p>
@@ -1158,15 +1161,7 @@
           <a:p>
             <a:r>
               <a:rPr lang="en-US" dirty="0"/>
-              <a:t>Click to edit Master </a:t>
-            </a:r>
-            <a:r>
-              <a:rPr lang="en-US" dirty="0" smtClean="0"/>
-              <a:t>subtitle </a:t>
-            </a:r>
-            <a:r>
-              <a:rPr lang="en-US" dirty="0"/>
-              <a:t>style</a:t>
+              <a:t>Click to edit Master subtitle style</a:t>
             </a:r>
           </a:p>
         </p:txBody>
@@ -1208,7 +1203,7 @@
             <a:fld id="{1C2D31DE-C454-491C-B5C3-F097855E3DF7}" type="datetime4">
               <a:rPr lang="en-US" smtClean="0"/>
               <a:pPr/>
-              <a:t>March 20, 2020</a:t>
+              <a:t>June 24, 2021</a:t>
             </a:fld>
             <a:endParaRPr lang="en-US" dirty="0"/>
           </a:p>
@@ -4282,17 +4277,16 @@
           <a:p>
             <a:pPr lvl="0"/>
             <a:r>
-              <a:rPr lang="en-US" dirty="0" smtClean="0"/>
+              <a:rPr lang="en-US" dirty="0"/>
               <a:t>Presenter Name</a:t>
             </a:r>
             <a:br>
-              <a:rPr lang="en-US" dirty="0" smtClean="0"/>
+              <a:rPr lang="en-US" dirty="0"/>
             </a:br>
             <a:r>
-              <a:rPr lang="en-US" dirty="0" smtClean="0"/>
+              <a:rPr lang="en-US" dirty="0"/>
               <a:t>Presenter Title</a:t>
             </a:r>
-            <a:endParaRPr lang="en-US" dirty="0"/>
           </a:p>
         </p:txBody>
       </p:sp>
@@ -4309,13 +4303,6 @@
   <p:transition>
     <p:fade/>
   </p:transition>
-  <p:timing>
-    <p:tnLst>
-      <p:par>
-        <p:cTn id="1" dur="indefinite" restart="never" nodeType="tmRoot"/>
-      </p:par>
-    </p:tnLst>
-  </p:timing>
   <p:hf sldNum="0" hdr="0" ftr="0"/>
 </p:sldLayout>
 </file>
@@ -4608,7 +4595,7 @@
           <a:p>
             <a:fld id="{5958763E-B898-436D-883D-03711491D54A}" type="datetimeFigureOut">
               <a:rPr lang="en-US" smtClean="0"/>
-              <a:t>3/20/2020</a:t>
+              <a:t>6/24/2021</a:t>
             </a:fld>
             <a:endParaRPr lang="en-US"/>
           </a:p>
@@ -4681,13 +4668,6 @@
   <p:transition>
     <p:fade/>
   </p:transition>
-  <p:timing>
-    <p:tnLst>
-      <p:par>
-        <p:cTn id="1" dur="indefinite" restart="never" nodeType="tmRoot"/>
-      </p:par>
-    </p:tnLst>
-  </p:timing>
 </p:sldLayout>
 </file>
 
@@ -4736,10 +4716,9 @@
           </a:lstStyle>
           <a:p>
             <a:r>
-              <a:rPr lang="en-US" dirty="0" smtClean="0"/>
+              <a:rPr lang="en-US" dirty="0"/>
               <a:t>Click icon to add picture</a:t>
             </a:r>
-            <a:endParaRPr lang="en-US" dirty="0"/>
           </a:p>
         </p:txBody>
       </p:sp>
@@ -4809,7 +4788,7 @@
           <a:p>
             <a:fld id="{5958763E-B898-436D-883D-03711491D54A}" type="datetimeFigureOut">
               <a:rPr lang="en-US" smtClean="0"/>
-              <a:t>3/20/2020</a:t>
+              <a:t>6/24/2021</a:t>
             </a:fld>
             <a:endParaRPr lang="en-US"/>
           </a:p>
@@ -4882,13 +4861,6 @@
   <p:transition>
     <p:fade/>
   </p:transition>
-  <p:timing>
-    <p:tnLst>
-      <p:par>
-        <p:cTn id="1" dur="indefinite" restart="never" nodeType="tmRoot"/>
-      </p:par>
-    </p:tnLst>
-  </p:timing>
 </p:sldLayout>
 </file>
 
@@ -5066,7 +5038,7 @@
           <a:p>
             <a:fld id="{5958763E-B898-436D-883D-03711491D54A}" type="datetimeFigureOut">
               <a:rPr lang="en-US" smtClean="0"/>
-              <a:t>3/20/2020</a:t>
+              <a:t>6/24/2021</a:t>
             </a:fld>
             <a:endParaRPr lang="en-US"/>
           </a:p>
@@ -5139,13 +5111,6 @@
   <p:transition>
     <p:fade/>
   </p:transition>
-  <p:timing>
-    <p:tnLst>
-      <p:par>
-        <p:cTn id="1" dur="indefinite" restart="never" nodeType="tmRoot"/>
-      </p:par>
-    </p:tnLst>
-  </p:timing>
 </p:sldLayout>
 </file>
 
@@ -5421,7 +5386,7 @@
           <a:p>
             <a:fld id="{5958763E-B898-436D-883D-03711491D54A}" type="datetimeFigureOut">
               <a:rPr lang="en-US" smtClean="0"/>
-              <a:t>3/20/2020</a:t>
+              <a:t>6/24/2021</a:t>
             </a:fld>
             <a:endParaRPr lang="en-US"/>
           </a:p>
@@ -5482,13 +5447,6 @@
   <p:transition>
     <p:fade/>
   </p:transition>
-  <p:timing>
-    <p:tnLst>
-      <p:par>
-        <p:cTn id="1" dur="indefinite" restart="never" nodeType="tmRoot"/>
-      </p:par>
-    </p:tnLst>
-  </p:timing>
 </p:sldLayout>
 </file>
 
@@ -5844,7 +5802,7 @@
           <a:p>
             <a:fld id="{5958763E-B898-436D-883D-03711491D54A}" type="datetimeFigureOut">
               <a:rPr lang="en-US" smtClean="0"/>
-              <a:t>3/20/2020</a:t>
+              <a:t>6/24/2021</a:t>
             </a:fld>
             <a:endParaRPr lang="en-US"/>
           </a:p>
@@ -5905,13 +5863,6 @@
   <p:transition>
     <p:fade/>
   </p:transition>
-  <p:timing>
-    <p:tnLst>
-      <p:par>
-        <p:cTn id="1" dur="indefinite" restart="never" nodeType="tmRoot"/>
-      </p:par>
-    </p:tnLst>
-  </p:timing>
 </p:sldLayout>
 </file>
 
@@ -6352,7 +6303,7 @@
           <a:p>
             <a:fld id="{5958763E-B898-436D-883D-03711491D54A}" type="datetimeFigureOut">
               <a:rPr lang="en-US" smtClean="0"/>
-              <a:t>3/20/2020</a:t>
+              <a:t>6/24/2021</a:t>
             </a:fld>
             <a:endParaRPr lang="en-US"/>
           </a:p>
@@ -6413,13 +6364,6 @@
   <p:transition>
     <p:fade/>
   </p:transition>
-  <p:timing>
-    <p:tnLst>
-      <p:par>
-        <p:cTn id="1" dur="indefinite" restart="never" nodeType="tmRoot"/>
-      </p:par>
-    </p:tnLst>
-  </p:timing>
 </p:sldLayout>
 </file>
 
@@ -6810,7 +6754,7 @@
           <a:p>
             <a:fld id="{5958763E-B898-436D-883D-03711491D54A}" type="datetimeFigureOut">
               <a:rPr lang="en-US" smtClean="0"/>
-              <a:t>3/20/2020</a:t>
+              <a:t>6/24/2021</a:t>
             </a:fld>
             <a:endParaRPr lang="en-US"/>
           </a:p>
@@ -6871,13 +6815,6 @@
   <p:transition>
     <p:fade/>
   </p:transition>
-  <p:timing>
-    <p:tnLst>
-      <p:par>
-        <p:cTn id="1" dur="indefinite" restart="never" nodeType="tmRoot"/>
-      </p:par>
-    </p:tnLst>
-  </p:timing>
 </p:sldLayout>
 </file>
 
@@ -7428,7 +7365,7 @@
           <a:p>
             <a:fld id="{5958763E-B898-436D-883D-03711491D54A}" type="datetimeFigureOut">
               <a:rPr lang="en-US" smtClean="0"/>
-              <a:t>3/20/2020</a:t>
+              <a:t>6/24/2021</a:t>
             </a:fld>
             <a:endParaRPr lang="en-US"/>
           </a:p>
@@ -7489,13 +7426,6 @@
   <p:transition>
     <p:fade/>
   </p:transition>
-  <p:timing>
-    <p:tnLst>
-      <p:par>
-        <p:cTn id="1" dur="indefinite" restart="never" nodeType="tmRoot"/>
-      </p:par>
-    </p:tnLst>
-  </p:timing>
 </p:sldLayout>
 </file>
 
@@ -8206,7 +8136,7 @@
           <a:p>
             <a:fld id="{5958763E-B898-436D-883D-03711491D54A}" type="datetimeFigureOut">
               <a:rPr lang="en-US" smtClean="0"/>
-              <a:t>3/20/2020</a:t>
+              <a:t>6/24/2021</a:t>
             </a:fld>
             <a:endParaRPr lang="en-US"/>
           </a:p>
@@ -8267,13 +8197,6 @@
   <p:transition>
     <p:fade/>
   </p:transition>
-  <p:timing>
-    <p:tnLst>
-      <p:par>
-        <p:cTn id="1" dur="indefinite" restart="never" nodeType="tmRoot"/>
-      </p:par>
-    </p:tnLst>
-  </p:timing>
 </p:sldLayout>
 </file>
 
@@ -8317,7 +8240,7 @@
           <a:p>
             <a:fld id="{5958763E-B898-436D-883D-03711491D54A}" type="datetimeFigureOut">
               <a:rPr lang="en-US" smtClean="0"/>
-              <a:t>3/20/2020</a:t>
+              <a:t>6/24/2021</a:t>
             </a:fld>
             <a:endParaRPr lang="en-US"/>
           </a:p>
@@ -8390,13 +8313,6 @@
   <p:transition>
     <p:fade/>
   </p:transition>
-  <p:timing>
-    <p:tnLst>
-      <p:par>
-        <p:cTn id="1" dur="indefinite" restart="never" nodeType="tmRoot"/>
-      </p:par>
-    </p:tnLst>
-  </p:timing>
 </p:sldLayout>
 </file>
 
@@ -8476,7 +8392,7 @@
                 <a:spcPct val="0"/>
               </a:spcAft>
             </a:pPr>
-            <a:endParaRPr lang="en-US" sz="2400" dirty="0" err="1" smtClean="0">
+            <a:endParaRPr lang="en-US" sz="2400" dirty="0" err="1">
               <a:gradFill>
                 <a:gsLst>
                   <a:gs pos="0">
@@ -8609,15 +8525,7 @@
           <a:p>
             <a:r>
               <a:rPr lang="en-US" dirty="0"/>
-              <a:t>Click to edit Master </a:t>
-            </a:r>
-            <a:r>
-              <a:rPr lang="en-US" dirty="0" smtClean="0"/>
-              <a:t>subtitle </a:t>
-            </a:r>
-            <a:r>
-              <a:rPr lang="en-US" dirty="0"/>
-              <a:t>style</a:t>
+              <a:t>Click to edit Master subtitle style</a:t>
             </a:r>
           </a:p>
         </p:txBody>
@@ -8659,7 +8567,7 @@
             <a:fld id="{1C2D31DE-C454-491C-B5C3-F097855E3DF7}" type="datetime4">
               <a:rPr lang="en-US" smtClean="0"/>
               <a:pPr/>
-              <a:t>March 20, 2020</a:t>
+              <a:t>June 24, 2021</a:t>
             </a:fld>
             <a:endParaRPr lang="en-US" dirty="0"/>
           </a:p>
@@ -11733,17 +11641,16 @@
           <a:p>
             <a:pPr lvl="0"/>
             <a:r>
-              <a:rPr lang="en-US" dirty="0" smtClean="0"/>
+              <a:rPr lang="en-US" dirty="0"/>
               <a:t>Presenter Name</a:t>
             </a:r>
             <a:br>
-              <a:rPr lang="en-US" dirty="0" smtClean="0"/>
+              <a:rPr lang="en-US" dirty="0"/>
             </a:br>
             <a:r>
-              <a:rPr lang="en-US" dirty="0" smtClean="0"/>
+              <a:rPr lang="en-US" dirty="0"/>
               <a:t>Presenter Title</a:t>
             </a:r>
-            <a:endParaRPr lang="en-US" dirty="0"/>
           </a:p>
         </p:txBody>
       </p:sp>
@@ -11760,13 +11667,6 @@
   <p:transition>
     <p:fade/>
   </p:transition>
-  <p:timing>
-    <p:tnLst>
-      <p:par>
-        <p:cTn id="1" dur="indefinite" restart="never" nodeType="tmRoot"/>
-      </p:par>
-    </p:tnLst>
-  </p:timing>
   <p:hf sldNum="0" hdr="0" ftr="0"/>
 </p:sldLayout>
 </file>
@@ -11819,7 +11719,7 @@
           <a:p>
             <a:fld id="{5958763E-B898-436D-883D-03711491D54A}" type="datetimeFigureOut">
               <a:rPr lang="en-US" smtClean="0"/>
-              <a:t>3/20/2020</a:t>
+              <a:t>6/24/2021</a:t>
             </a:fld>
             <a:endParaRPr lang="en-US"/>
           </a:p>
@@ -11892,13 +11792,6 @@
   <p:transition>
     <p:fade/>
   </p:transition>
-  <p:timing>
-    <p:tnLst>
-      <p:par>
-        <p:cTn id="1" dur="indefinite" restart="never" nodeType="tmRoot"/>
-      </p:par>
-    </p:tnLst>
-  </p:timing>
 </p:sldLayout>
 </file>
 
@@ -11950,7 +11843,7 @@
           <a:p>
             <a:fld id="{5958763E-B898-436D-883D-03711491D54A}" type="datetimeFigureOut">
               <a:rPr lang="en-US" smtClean="0"/>
-              <a:t>3/20/2020</a:t>
+              <a:t>6/24/2021</a:t>
             </a:fld>
             <a:endParaRPr lang="en-US"/>
           </a:p>
@@ -12023,13 +11916,6 @@
   <p:transition>
     <p:fade/>
   </p:transition>
-  <p:timing>
-    <p:tnLst>
-      <p:par>
-        <p:cTn id="1" dur="indefinite" restart="never" nodeType="tmRoot"/>
-      </p:par>
-    </p:tnLst>
-  </p:timing>
 </p:sldLayout>
 </file>
 
@@ -12081,7 +11967,7 @@
           <a:p>
             <a:fld id="{5958763E-B898-436D-883D-03711491D54A}" type="datetimeFigureOut">
               <a:rPr lang="en-US" smtClean="0"/>
-              <a:t>3/20/2020</a:t>
+              <a:t>6/24/2021</a:t>
             </a:fld>
             <a:endParaRPr lang="en-US"/>
           </a:p>
@@ -12154,13 +12040,6 @@
   <p:transition>
     <p:fade/>
   </p:transition>
-  <p:timing>
-    <p:tnLst>
-      <p:par>
-        <p:cTn id="1" dur="indefinite" restart="never" nodeType="tmRoot"/>
-      </p:par>
-    </p:tnLst>
-  </p:timing>
 </p:sldLayout>
 </file>
 
@@ -12212,7 +12091,7 @@
           <a:p>
             <a:fld id="{5958763E-B898-436D-883D-03711491D54A}" type="datetimeFigureOut">
               <a:rPr lang="en-US" smtClean="0"/>
-              <a:t>3/20/2020</a:t>
+              <a:t>6/24/2021</a:t>
             </a:fld>
             <a:endParaRPr lang="en-US"/>
           </a:p>
@@ -12285,13 +12164,6 @@
   <p:transition>
     <p:fade/>
   </p:transition>
-  <p:timing>
-    <p:tnLst>
-      <p:par>
-        <p:cTn id="1" dur="indefinite" restart="never" nodeType="tmRoot"/>
-      </p:par>
-    </p:tnLst>
-  </p:timing>
 </p:sldLayout>
 </file>
 
@@ -12343,7 +12215,7 @@
           <a:p>
             <a:fld id="{5958763E-B898-436D-883D-03711491D54A}" type="datetimeFigureOut">
               <a:rPr lang="en-US" smtClean="0"/>
-              <a:t>3/20/2020</a:t>
+              <a:t>6/24/2021</a:t>
             </a:fld>
             <a:endParaRPr lang="en-US"/>
           </a:p>
@@ -12416,13 +12288,6 @@
   <p:transition>
     <p:fade/>
   </p:transition>
-  <p:timing>
-    <p:tnLst>
-      <p:par>
-        <p:cTn id="1" dur="indefinite" restart="never" nodeType="tmRoot"/>
-      </p:par>
-    </p:tnLst>
-  </p:timing>
 </p:sldLayout>
 </file>
 
@@ -12474,7 +12339,7 @@
           <a:p>
             <a:fld id="{5958763E-B898-436D-883D-03711491D54A}" type="datetimeFigureOut">
               <a:rPr lang="en-US" smtClean="0"/>
-              <a:t>3/20/2020</a:t>
+              <a:t>6/24/2021</a:t>
             </a:fld>
             <a:endParaRPr lang="en-US"/>
           </a:p>
@@ -12547,13 +12412,6 @@
   <p:transition>
     <p:fade/>
   </p:transition>
-  <p:timing>
-    <p:tnLst>
-      <p:par>
-        <p:cTn id="1" dur="indefinite" restart="never" nodeType="tmRoot"/>
-      </p:par>
-    </p:tnLst>
-  </p:timing>
 </p:sldLayout>
 </file>
 
@@ -12605,7 +12463,7 @@
           <a:p>
             <a:fld id="{5958763E-B898-436D-883D-03711491D54A}" type="datetimeFigureOut">
               <a:rPr lang="en-US" smtClean="0"/>
-              <a:t>3/20/2020</a:t>
+              <a:t>6/24/2021</a:t>
             </a:fld>
             <a:endParaRPr lang="en-US"/>
           </a:p>
@@ -12678,13 +12536,6 @@
   <p:transition>
     <p:fade/>
   </p:transition>
-  <p:timing>
-    <p:tnLst>
-      <p:par>
-        <p:cTn id="1" dur="indefinite" restart="never" nodeType="tmRoot"/>
-      </p:par>
-    </p:tnLst>
-  </p:timing>
 </p:sldLayout>
 </file>
 
@@ -12736,7 +12587,7 @@
           <a:p>
             <a:fld id="{5958763E-B898-436D-883D-03711491D54A}" type="datetimeFigureOut">
               <a:rPr lang="en-US" smtClean="0"/>
-              <a:t>3/20/2020</a:t>
+              <a:t>6/24/2021</a:t>
             </a:fld>
             <a:endParaRPr lang="en-US"/>
           </a:p>
@@ -12809,13 +12660,6 @@
   <p:transition>
     <p:fade/>
   </p:transition>
-  <p:timing>
-    <p:tnLst>
-      <p:par>
-        <p:cTn id="1" dur="indefinite" restart="never" nodeType="tmRoot"/>
-      </p:par>
-    </p:tnLst>
-  </p:timing>
 </p:sldLayout>
 </file>
 
@@ -12876,7 +12720,7 @@
           <a:p>
             <a:fld id="{5958763E-B898-436D-883D-03711491D54A}" type="datetimeFigureOut">
               <a:rPr lang="en-US" smtClean="0"/>
-              <a:t>3/20/2020</a:t>
+              <a:t>6/24/2021</a:t>
             </a:fld>
             <a:endParaRPr lang="en-US"/>
           </a:p>
@@ -12949,13 +12793,6 @@
   <p:transition>
     <p:fade/>
   </p:transition>
-  <p:timing>
-    <p:tnLst>
-      <p:par>
-        <p:cTn id="1" dur="indefinite" restart="never" nodeType="tmRoot"/>
-      </p:par>
-    </p:tnLst>
-  </p:timing>
 </p:sldLayout>
 </file>
 
@@ -15957,13 +15794,6 @@
   <p:transition>
     <p:fade/>
   </p:transition>
-  <p:timing>
-    <p:tnLst>
-      <p:par>
-        <p:cTn id="1" dur="indefinite" restart="never" nodeType="tmRoot"/>
-      </p:par>
-    </p:tnLst>
-  </p:timing>
 </p:sldLayout>
 </file>
 
@@ -16051,7 +15881,7 @@
                 <a:spcPct val="0"/>
               </a:spcAft>
             </a:pPr>
-            <a:endParaRPr lang="en-US" sz="2400" dirty="0" err="1" smtClean="0">
+            <a:endParaRPr lang="en-US" sz="2400" dirty="0" err="1">
               <a:gradFill>
                 <a:gsLst>
                   <a:gs pos="0">
@@ -16187,15 +16017,7 @@
           <a:p>
             <a:r>
               <a:rPr lang="en-US" dirty="0"/>
-              <a:t>Click to edit Master </a:t>
-            </a:r>
-            <a:r>
-              <a:rPr lang="en-US" dirty="0" smtClean="0"/>
-              <a:t>subtitle </a:t>
-            </a:r>
-            <a:r>
-              <a:rPr lang="en-US" dirty="0"/>
-              <a:t>style</a:t>
+              <a:t>Click to edit Master subtitle style</a:t>
             </a:r>
           </a:p>
         </p:txBody>
@@ -16237,7 +16059,7 @@
             <a:fld id="{1C2D31DE-C454-491C-B5C3-F097855E3DF7}" type="datetime4">
               <a:rPr lang="en-US" smtClean="0"/>
               <a:pPr/>
-              <a:t>March 20, 2020</a:t>
+              <a:t>June 24, 2021</a:t>
             </a:fld>
             <a:endParaRPr lang="en-US" dirty="0"/>
           </a:p>
@@ -19319,17 +19141,16 @@
           <a:p>
             <a:pPr lvl="0"/>
             <a:r>
-              <a:rPr lang="en-US" dirty="0" smtClean="0"/>
+              <a:rPr lang="en-US" dirty="0"/>
               <a:t>Presenter Name</a:t>
             </a:r>
             <a:br>
-              <a:rPr lang="en-US" dirty="0" smtClean="0"/>
+              <a:rPr lang="en-US" dirty="0"/>
             </a:br>
             <a:r>
-              <a:rPr lang="en-US" dirty="0" smtClean="0"/>
+              <a:rPr lang="en-US" dirty="0"/>
               <a:t>Presenter Title</a:t>
             </a:r>
-            <a:endParaRPr lang="en-US" dirty="0"/>
           </a:p>
         </p:txBody>
       </p:sp>
@@ -19346,13 +19167,6 @@
   <p:transition>
     <p:fade/>
   </p:transition>
-  <p:timing>
-    <p:tnLst>
-      <p:par>
-        <p:cTn id="1" dur="indefinite" restart="never" nodeType="tmRoot"/>
-      </p:par>
-    </p:tnLst>
-  </p:timing>
   <p:hf sldNum="0" hdr="0" ftr="0"/>
 </p:sldLayout>
 </file>
@@ -26862,10 +26676,9 @@
           <a:p>
             <a:pPr lvl="0"/>
             <a:r>
-              <a:rPr lang="en-US" dirty="0" smtClean="0"/>
+              <a:rPr lang="en-US" dirty="0"/>
               <a:t>&lt;Call to action&gt;</a:t>
             </a:r>
-            <a:endParaRPr lang="en-US" dirty="0"/>
           </a:p>
         </p:txBody>
       </p:sp>
@@ -28482,7 +28295,7 @@
           <a:p>
             <a:fld id="{5958763E-B898-436D-883D-03711491D54A}" type="datetimeFigureOut">
               <a:rPr lang="en-US" smtClean="0"/>
-              <a:t>3/20/2020</a:t>
+              <a:t>6/24/2021</a:t>
             </a:fld>
             <a:endParaRPr lang="en-US"/>
           </a:p>
@@ -28609,7 +28422,7 @@
                 <a:spcPct val="0"/>
               </a:spcAft>
             </a:pPr>
-            <a:endParaRPr lang="en-US" sz="2400" dirty="0" err="1" smtClean="0">
+            <a:endParaRPr lang="en-US" sz="2400" dirty="0" err="1">
               <a:gradFill>
                 <a:gsLst>
                   <a:gs pos="0">
@@ -28640,13 +28453,6 @@
   <p:transition>
     <p:fade/>
   </p:transition>
-  <p:timing>
-    <p:tnLst>
-      <p:par>
-        <p:cTn id="1" dur="indefinite" restart="never" nodeType="tmRoot"/>
-      </p:par>
-    </p:tnLst>
-  </p:timing>
 </p:sldLayout>
 </file>
 
@@ -28891,7 +28697,7 @@
           <a:p>
             <a:fld id="{5958763E-B898-436D-883D-03711491D54A}" type="datetimeFigureOut">
               <a:rPr lang="en-US" smtClean="0"/>
-              <a:t>3/20/2020</a:t>
+              <a:t>6/24/2021</a:t>
             </a:fld>
             <a:endParaRPr lang="en-US"/>
           </a:p>
@@ -28964,13 +28770,6 @@
   <p:transition>
     <p:fade/>
   </p:transition>
-  <p:timing>
-    <p:tnLst>
-      <p:par>
-        <p:cTn id="1" dur="indefinite" restart="never" nodeType="tmRoot"/>
-      </p:par>
-    </p:tnLst>
-  </p:timing>
 </p:sldLayout>
 </file>
 
@@ -29192,7 +28991,7 @@
           <a:p>
             <a:fld id="{5958763E-B898-436D-883D-03711491D54A}" type="datetimeFigureOut">
               <a:rPr lang="en-US" smtClean="0"/>
-              <a:t>3/20/2020</a:t>
+              <a:t>6/24/2021</a:t>
             </a:fld>
             <a:endParaRPr lang="en-US"/>
           </a:p>
@@ -29265,13 +29064,6 @@
   <p:transition>
     <p:fade/>
   </p:transition>
-  <p:timing>
-    <p:tnLst>
-      <p:par>
-        <p:cTn id="1" dur="indefinite" restart="never" nodeType="tmRoot"/>
-      </p:par>
-    </p:tnLst>
-  </p:timing>
 </p:sldLayout>
 </file>
 
@@ -29400,7 +29192,7 @@
           <a:p>
             <a:fld id="{5958763E-B898-436D-883D-03711491D54A}" type="datetimeFigureOut">
               <a:rPr lang="en-US" smtClean="0"/>
-              <a:t>3/20/2020</a:t>
+              <a:t>6/24/2021</a:t>
             </a:fld>
             <a:endParaRPr lang="en-US"/>
           </a:p>
@@ -29523,13 +29315,6 @@
   <p:transition>
     <p:fade/>
   </p:transition>
-  <p:timing>
-    <p:tnLst>
-      <p:par>
-        <p:cTn id="1" dur="indefinite" restart="never" nodeType="tmRoot"/>
-      </p:par>
-    </p:tnLst>
-  </p:timing>
 </p:sldLayout>
 </file>
 
@@ -29668,7 +29453,7 @@
           <a:p>
             <a:fld id="{5958763E-B898-436D-883D-03711491D54A}" type="datetimeFigureOut">
               <a:rPr lang="en-US" smtClean="0"/>
-              <a:t>3/20/2020</a:t>
+              <a:t>6/24/2021</a:t>
             </a:fld>
             <a:endParaRPr lang="en-US"/>
           </a:p>
@@ -29795,13 +29580,6 @@
   <p:transition>
     <p:fade/>
   </p:transition>
-  <p:timing>
-    <p:tnLst>
-      <p:par>
-        <p:cTn id="1" dur="indefinite" restart="never" nodeType="tmRoot"/>
-      </p:par>
-    </p:tnLst>
-  </p:timing>
 </p:sldLayout>
 </file>
 
@@ -29963,7 +29741,7 @@
                 <a:spcPct val="0"/>
               </a:spcAft>
             </a:pPr>
-            <a:endParaRPr lang="en-US" sz="2400" dirty="0" err="1" smtClean="0">
+            <a:endParaRPr lang="en-US" sz="2400" dirty="0" err="1">
               <a:gradFill>
                 <a:gsLst>
                   <a:gs pos="0">
@@ -30014,10 +29792,9 @@
           </a:lstStyle>
           <a:p>
             <a:r>
-              <a:rPr lang="en-US" dirty="0" smtClean="0"/>
+              <a:rPr lang="en-US" dirty="0"/>
               <a:t>Type “Agenda”</a:t>
             </a:r>
-            <a:endParaRPr lang="en-US" dirty="0"/>
           </a:p>
         </p:txBody>
       </p:sp>
@@ -30141,24 +29918,23 @@
           <a:p>
             <a:pPr lvl="0"/>
             <a:r>
-              <a:rPr lang="en-US" dirty="0" smtClean="0"/>
+              <a:rPr lang="en-US" dirty="0"/>
               <a:t>Item 1</a:t>
             </a:r>
           </a:p>
           <a:p>
             <a:pPr lvl="0"/>
             <a:r>
-              <a:rPr lang="en-US" dirty="0" smtClean="0"/>
+              <a:rPr lang="en-US" dirty="0"/>
               <a:t>Item 2</a:t>
             </a:r>
           </a:p>
           <a:p>
             <a:pPr lvl="0"/>
             <a:r>
-              <a:rPr lang="en-US" dirty="0" smtClean="0"/>
+              <a:rPr lang="en-US" dirty="0"/>
               <a:t>Item 3</a:t>
             </a:r>
-            <a:endParaRPr lang="en-US" dirty="0"/>
           </a:p>
         </p:txBody>
       </p:sp>
@@ -30185,7 +29961,7 @@
           <a:p>
             <a:fld id="{5958763E-B898-436D-883D-03711491D54A}" type="datetimeFigureOut">
               <a:rPr lang="en-US" smtClean="0"/>
-              <a:t>3/20/2020</a:t>
+              <a:t>6/24/2021</a:t>
             </a:fld>
             <a:endParaRPr lang="en-US"/>
           </a:p>
@@ -30292,13 +30068,6 @@
   <p:transition>
     <p:fade/>
   </p:transition>
-  <p:timing>
-    <p:tnLst>
-      <p:par>
-        <p:cTn id="1" dur="indefinite" restart="never" nodeType="tmRoot"/>
-      </p:par>
-    </p:tnLst>
-  </p:timing>
 </p:sldLayout>
 </file>
 
@@ -30460,7 +30229,7 @@
                 <a:spcPct val="0"/>
               </a:spcAft>
             </a:pPr>
-            <a:endParaRPr lang="en-US" sz="2400" dirty="0" err="1" smtClean="0">
+            <a:endParaRPr lang="en-US" sz="2400" dirty="0" err="1">
               <a:gradFill>
                 <a:gsLst>
                   <a:gs pos="0">
@@ -30513,10 +30282,9 @@
           </a:lstStyle>
           <a:p>
             <a:r>
-              <a:rPr lang="en-US" dirty="0" smtClean="0"/>
+              <a:rPr lang="en-US" dirty="0"/>
               <a:t>Notable Quote</a:t>
             </a:r>
-            <a:endParaRPr lang="en-US" dirty="0"/>
           </a:p>
         </p:txBody>
       </p:sp>
@@ -30643,10 +30411,9 @@
           <a:p>
             <a:pPr lvl="0"/>
             <a:r>
-              <a:rPr lang="en-US" dirty="0" smtClean="0"/>
+              <a:rPr lang="en-US" dirty="0"/>
               <a:t>– Attribution</a:t>
             </a:r>
-            <a:endParaRPr lang="en-US" dirty="0"/>
           </a:p>
         </p:txBody>
       </p:sp>
@@ -30673,7 +30440,7 @@
           <a:p>
             <a:fld id="{5958763E-B898-436D-883D-03711491D54A}" type="datetimeFigureOut">
               <a:rPr lang="en-US" smtClean="0"/>
-              <a:t>3/20/2020</a:t>
+              <a:t>6/24/2021</a:t>
             </a:fld>
             <a:endParaRPr lang="en-US"/>
           </a:p>
@@ -31421,13 +31188,6 @@
   <p:transition>
     <p:fade/>
   </p:transition>
-  <p:timing>
-    <p:tnLst>
-      <p:par>
-        <p:cTn id="1" dur="indefinite" restart="never" nodeType="tmRoot"/>
-      </p:par>
-    </p:tnLst>
-  </p:timing>
 </p:sldLayout>
 </file>
 
@@ -31499,7 +31259,7 @@
           <a:p>
             <a:fld id="{5958763E-B898-436D-883D-03711491D54A}" type="datetimeFigureOut">
               <a:rPr lang="en-US" smtClean="0"/>
-              <a:t>3/20/2020</a:t>
+              <a:t>6/24/2021</a:t>
             </a:fld>
             <a:endParaRPr lang="en-US"/>
           </a:p>
@@ -31572,13 +31332,6 @@
   <p:transition>
     <p:fade/>
   </p:transition>
-  <p:timing>
-    <p:tnLst>
-      <p:par>
-        <p:cTn id="1" dur="indefinite" restart="never" nodeType="tmRoot"/>
-      </p:par>
-    </p:tnLst>
-  </p:timing>
 </p:sldLayout>
 </file>
 
@@ -31707,7 +31460,7 @@
           <a:p>
             <a:fld id="{5958763E-B898-436D-883D-03711491D54A}" type="datetimeFigureOut">
               <a:rPr lang="en-US" smtClean="0"/>
-              <a:t>3/20/2020</a:t>
+              <a:t>6/24/2021</a:t>
             </a:fld>
             <a:endParaRPr lang="en-US"/>
           </a:p>
@@ -31830,13 +31583,6 @@
   <p:transition>
     <p:fade/>
   </p:transition>
-  <p:timing>
-    <p:tnLst>
-      <p:par>
-        <p:cTn id="1" dur="indefinite" restart="never" nodeType="tmRoot"/>
-      </p:par>
-    </p:tnLst>
-  </p:timing>
 </p:sldLayout>
 </file>
 
@@ -32049,7 +31795,7 @@
           <a:p>
             <a:fld id="{5958763E-B898-436D-883D-03711491D54A}" type="datetimeFigureOut">
               <a:rPr lang="en-US" smtClean="0"/>
-              <a:t>3/20/2020</a:t>
+              <a:t>6/24/2021</a:t>
             </a:fld>
             <a:endParaRPr lang="en-US"/>
           </a:p>
@@ -32122,13 +31868,6 @@
   <p:transition>
     <p:fade/>
   </p:transition>
-  <p:timing>
-    <p:tnLst>
-      <p:par>
-        <p:cTn id="1" dur="indefinite" restart="never" nodeType="tmRoot"/>
-      </p:par>
-    </p:tnLst>
-  </p:timing>
 </p:sldLayout>
 </file>
 
@@ -32286,7 +32025,7 @@
           <a:p>
             <a:fld id="{5958763E-B898-436D-883D-03711491D54A}" type="datetimeFigureOut">
               <a:rPr lang="en-US" smtClean="0"/>
-              <a:t>3/20/2020</a:t>
+              <a:t>6/24/2021</a:t>
             </a:fld>
             <a:endParaRPr lang="en-US"/>
           </a:p>
@@ -32359,13 +32098,6 @@
   <p:transition>
     <p:fade/>
   </p:transition>
-  <p:timing>
-    <p:tnLst>
-      <p:par>
-        <p:cTn id="1" dur="indefinite" restart="never" nodeType="tmRoot"/>
-      </p:par>
-    </p:tnLst>
-  </p:timing>
 </p:sldLayout>
 </file>
 
@@ -32537,7 +32269,7 @@
           <a:p>
             <a:fld id="{5958763E-B898-436D-883D-03711491D54A}" type="datetimeFigureOut">
               <a:rPr lang="en-US" smtClean="0"/>
-              <a:t>3/20/2020</a:t>
+              <a:t>6/24/2021</a:t>
             </a:fld>
             <a:endParaRPr lang="en-US"/>
           </a:p>
@@ -32683,13 +32415,6 @@
   <p:transition>
     <p:fade/>
   </p:transition>
-  <p:timing>
-    <p:tnLst>
-      <p:par>
-        <p:cTn id="1" dur="indefinite" restart="never" nodeType="tmRoot"/>
-      </p:par>
-    </p:tnLst>
-  </p:timing>
   <p:txStyles>
     <p:titleStyle>
       <a:lvl1pPr algn="l" defTabSz="914400" rtl="0" eaLnBrk="1" latinLnBrk="0" hangingPunct="1">
@@ -32994,7 +32719,7 @@
       </a:lvl9pPr>
     </p:otherStyle>
   </p:txStyles>
-  <p:extLst mod="1">
+  <p:extLst>
     <p:ext uri="{27BBF7A9-308A-43DC-89C8-2F10F3537804}">
       <p15:sldGuideLst xmlns:p15="http://schemas.microsoft.com/office/powerpoint/2012/main">
         <p15:guide id="1" orient="horz" pos="2160" userDrawn="1">
@@ -33073,11 +32798,11 @@
           <a:lstStyle/>
           <a:p>
             <a:r>
-              <a:rPr lang="en-US" sz="6600" dirty="0" smtClean="0"/>
+              <a:rPr lang="en-US" sz="6600" dirty="0"/>
               <a:t>Tables &amp; </a:t>
             </a:r>
             <a:r>
-              <a:rPr lang="en-US" sz="6600" dirty="0" err="1" smtClean="0"/>
+              <a:rPr lang="en-US" sz="6600" dirty="0" err="1"/>
               <a:t>IFrames</a:t>
             </a:r>
             <a:endParaRPr lang="en-US" sz="6600" dirty="0"/>
@@ -33105,10 +32830,9 @@
           <a:lstStyle/>
           <a:p>
             <a:r>
-              <a:rPr lang="en-US" dirty="0" smtClean="0"/>
+              <a:rPr lang="en-US" dirty="0"/>
               <a:t>Hy-Tech Club: Web 101</a:t>
             </a:r>
-            <a:endParaRPr lang="en-US" dirty="0"/>
           </a:p>
         </p:txBody>
       </p:sp>
@@ -36093,13 +35817,6 @@
   <p:transition>
     <p:fade/>
   </p:transition>
-  <p:timing>
-    <p:tnLst>
-      <p:par>
-        <p:cTn id="1" dur="indefinite" restart="never" nodeType="tmRoot"/>
-      </p:par>
-    </p:tnLst>
-  </p:timing>
 </p:sld>
 </file>
 
@@ -36137,10 +35854,9 @@
           <a:p>
             <a:pPr algn="r"/>
             <a:r>
-              <a:rPr lang="en-US" dirty="0" smtClean="0"/>
+              <a:rPr lang="en-US" dirty="0"/>
               <a:t>Tables</a:t>
             </a:r>
-            <a:endParaRPr lang="en-US" dirty="0"/>
           </a:p>
         </p:txBody>
       </p:sp>
@@ -36196,13 +35912,6 @@
   <p:transition>
     <p:fade/>
   </p:transition>
-  <p:timing>
-    <p:tnLst>
-      <p:par>
-        <p:cTn id="1" dur="indefinite" restart="never" nodeType="tmRoot"/>
-      </p:par>
-    </p:tnLst>
-  </p:timing>
 </p:sld>
 </file>
 
@@ -36239,10 +35948,9 @@
           <a:lstStyle/>
           <a:p>
             <a:r>
-              <a:rPr lang="en-US" dirty="0" smtClean="0"/>
+              <a:rPr lang="en-US" dirty="0"/>
               <a:t>HTML Tables</a:t>
             </a:r>
-            <a:endParaRPr lang="en-US" dirty="0"/>
           </a:p>
         </p:txBody>
       </p:sp>
@@ -36267,7 +35975,7 @@
           <a:lstStyle/>
           <a:p>
             <a:r>
-              <a:rPr lang="en-US" dirty="0" smtClean="0"/>
+              <a:rPr lang="en-US" dirty="0"/>
               <a:t>What type of data could be displayed in a table?</a:t>
             </a:r>
           </a:p>
@@ -36347,7 +36055,7 @@
                 <a:spcPts val="600"/>
               </a:spcAft>
             </a:pPr>
-            <a:endParaRPr lang="en-US" sz="2400" dirty="0" err="1" smtClean="0">
+            <a:endParaRPr lang="en-US" sz="2400" dirty="0" err="1">
               <a:gradFill>
                 <a:gsLst>
                   <a:gs pos="2917">
@@ -36431,15 +36139,33 @@
                                   </p:childTnLst>
                                 </p:cTn>
                               </p:par>
+                            </p:childTnLst>
+                          </p:cTn>
+                        </p:par>
+                      </p:childTnLst>
+                    </p:cTn>
+                  </p:par>
+                  <p:par>
+                    <p:cTn id="8" fill="hold">
+                      <p:stCondLst>
+                        <p:cond delay="indefinite"/>
+                      </p:stCondLst>
+                      <p:childTnLst>
+                        <p:par>
+                          <p:cTn id="9" fill="hold">
+                            <p:stCondLst>
+                              <p:cond delay="0"/>
+                            </p:stCondLst>
+                            <p:childTnLst>
                               <p:par>
-                                <p:cTn id="8" presetID="10" presetClass="entr" presetSubtype="0" fill="hold" grpId="0" nodeType="withEffect">
+                                <p:cTn id="10" presetID="10" presetClass="entr" presetSubtype="0" fill="hold" grpId="0" nodeType="clickEffect">
                                   <p:stCondLst>
                                     <p:cond delay="0"/>
                                   </p:stCondLst>
                                   <p:childTnLst>
                                     <p:set>
                                       <p:cBhvr>
-                                        <p:cTn id="9" dur="1" fill="hold">
+                                        <p:cTn id="11" dur="1" fill="hold">
                                           <p:stCondLst>
                                             <p:cond delay="0"/>
                                           </p:stCondLst>
@@ -36457,7 +36183,7 @@
                                     </p:set>
                                     <p:animEffect transition="in" filter="fade">
                                       <p:cBhvr>
-                                        <p:cTn id="10" dur="500"/>
+                                        <p:cTn id="12" dur="500"/>
                                         <p:tgtEl>
                                           <p:spTgt spid="6"/>
                                         </p:tgtEl>
@@ -36533,10 +36259,9 @@
           <a:lstStyle/>
           <a:p>
             <a:r>
-              <a:rPr lang="en-US" dirty="0" smtClean="0"/>
+              <a:rPr lang="en-US" dirty="0"/>
               <a:t>Table elements</a:t>
             </a:r>
-            <a:endParaRPr lang="en-US" dirty="0"/>
           </a:p>
         </p:txBody>
       </p:sp>
@@ -36550,25 +36275,32 @@
             <p:ph idx="1"/>
           </p:nvPr>
         </p:nvSpPr>
-        <p:spPr/>
+        <p:spPr>
+          <a:xfrm>
+            <a:off x="381000" y="1143000"/>
+            <a:ext cx="11430000" cy="3086100"/>
+          </a:xfrm>
+        </p:spPr>
         <p:txBody>
-          <a:bodyPr/>
+          <a:bodyPr>
+            <a:normAutofit/>
+          </a:bodyPr>
           <a:lstStyle/>
           <a:p>
+            <a:pPr marL="57150" indent="0">
+              <a:buNone/>
+            </a:pPr>
             <a:r>
-              <a:rPr lang="en-US" dirty="0" smtClean="0"/>
+              <a:rPr lang="en-US" i="1" dirty="0"/>
               <a:t>HTML Tables consist of several nested elements:</a:t>
             </a:r>
-          </a:p>
-          <a:p>
-            <a:endParaRPr lang="en-US" dirty="0"/>
           </a:p>
           <a:p>
             <a:pPr marL="57150" indent="0">
               <a:buNone/>
             </a:pPr>
             <a:r>
-              <a:rPr lang="en-US" sz="3200" b="1" dirty="0" smtClean="0">
+              <a:rPr lang="en-US" sz="3200" b="1" dirty="0">
                 <a:solidFill>
                   <a:schemeClr val="accent2">
                     <a:lumMod val="75000"/>
@@ -36579,7 +36311,7 @@
               <a:t>table</a:t>
             </a:r>
             <a:r>
-              <a:rPr lang="en-US" dirty="0" smtClean="0"/>
+              <a:rPr lang="en-US" dirty="0"/>
               <a:t>: the primary element in a table, contains all other elements</a:t>
             </a:r>
           </a:p>
@@ -36588,81 +36320,9 @@
               <a:buNone/>
             </a:pPr>
             <a:r>
-              <a:rPr lang="en-US" sz="3200" b="1" dirty="0" err="1" smtClean="0">
+              <a:rPr lang="en-US" sz="3200" b="1" dirty="0">
                 <a:solidFill>
-                  <a:schemeClr val="accent2">
-                    <a:lumMod val="75000"/>
-                  </a:schemeClr>
-                </a:solidFill>
-                <a:latin typeface="Consolas" panose="020B0609020204030204" pitchFamily="49" charset="0"/>
-              </a:rPr>
-              <a:t>thead</a:t>
-            </a:r>
-            <a:r>
-              <a:rPr lang="en-US" dirty="0" smtClean="0"/>
-              <a:t>: contains the </a:t>
-            </a:r>
-            <a:r>
-              <a:rPr lang="en-US" i="1" dirty="0" smtClean="0"/>
-              <a:t>header</a:t>
-            </a:r>
-            <a:r>
-              <a:rPr lang="en-US" dirty="0" smtClean="0"/>
-              <a:t> portion of the table</a:t>
-            </a:r>
-            <a:endParaRPr lang="en-US" b="1" dirty="0">
-              <a:solidFill>
-                <a:schemeClr val="accent2">
-                  <a:lumMod val="75000"/>
-                </a:schemeClr>
-              </a:solidFill>
-              <a:latin typeface="Consolas" panose="020B0609020204030204" pitchFamily="49" charset="0"/>
-            </a:endParaRPr>
-          </a:p>
-          <a:p>
-            <a:pPr marL="57150" indent="0">
-              <a:buNone/>
-            </a:pPr>
-            <a:r>
-              <a:rPr lang="en-US" sz="3200" b="1" dirty="0" err="1" smtClean="0">
-                <a:solidFill>
-                  <a:schemeClr val="accent2">
-                    <a:lumMod val="75000"/>
-                  </a:schemeClr>
-                </a:solidFill>
-                <a:latin typeface="Consolas" panose="020B0609020204030204" pitchFamily="49" charset="0"/>
-              </a:rPr>
-              <a:t>tbody</a:t>
-            </a:r>
-            <a:r>
-              <a:rPr lang="en-US" dirty="0" smtClean="0"/>
-              <a:t>: contains the </a:t>
-            </a:r>
-            <a:r>
-              <a:rPr lang="en-US" i="1" dirty="0" smtClean="0"/>
-              <a:t>data</a:t>
-            </a:r>
-            <a:r>
-              <a:rPr lang="en-US" dirty="0" smtClean="0"/>
-              <a:t> portion of the table</a:t>
-            </a:r>
-            <a:endParaRPr lang="en-US" b="1" dirty="0">
-              <a:solidFill>
-                <a:schemeClr val="accent2">
-                  <a:lumMod val="75000"/>
-                </a:schemeClr>
-              </a:solidFill>
-              <a:latin typeface="Consolas" panose="020B0609020204030204" pitchFamily="49" charset="0"/>
-            </a:endParaRPr>
-          </a:p>
-          <a:p>
-            <a:pPr marL="57150" indent="0">
-              <a:buNone/>
-            </a:pPr>
-            <a:r>
-              <a:rPr lang="en-US" sz="3200" b="1" dirty="0" err="1" smtClean="0">
-                <a:solidFill>
-                  <a:schemeClr val="accent2">
+                  <a:schemeClr val="accent1">
                     <a:lumMod val="75000"/>
                   </a:schemeClr>
                 </a:solidFill>
@@ -36671,15 +36331,15 @@
               <a:t>tr</a:t>
             </a:r>
             <a:r>
-              <a:rPr lang="en-US" dirty="0" smtClean="0"/>
+              <a:rPr lang="en-US" dirty="0"/>
               <a:t>: a </a:t>
             </a:r>
             <a:r>
-              <a:rPr lang="en-US" i="1" dirty="0" smtClean="0"/>
+              <a:rPr lang="en-US" i="1" dirty="0"/>
               <a:t>row</a:t>
             </a:r>
             <a:r>
-              <a:rPr lang="en-US" dirty="0" smtClean="0"/>
+              <a:rPr lang="en-US" dirty="0"/>
               <a:t> in the table</a:t>
             </a:r>
             <a:endParaRPr lang="en-US" b="1" dirty="0">
@@ -36696,26 +36356,24 @@
               <a:buNone/>
             </a:pPr>
             <a:r>
-              <a:rPr lang="en-US" sz="3200" b="1" dirty="0" err="1" smtClean="0">
+              <a:rPr lang="en-US" sz="3200" b="1" dirty="0" err="1">
                 <a:solidFill>
-                  <a:schemeClr val="accent2">
-                    <a:lumMod val="75000"/>
-                  </a:schemeClr>
+                  <a:srgbClr val="FF8300"/>
                 </a:solidFill>
                 <a:latin typeface="Consolas" panose="020B0609020204030204" pitchFamily="49" charset="0"/>
               </a:rPr>
               <a:t>th</a:t>
             </a:r>
             <a:r>
-              <a:rPr lang="en-US" dirty="0" smtClean="0"/>
+              <a:rPr lang="en-US" dirty="0"/>
               <a:t>: a </a:t>
             </a:r>
             <a:r>
-              <a:rPr lang="en-US" i="1" dirty="0" smtClean="0"/>
+              <a:rPr lang="en-US" i="1" dirty="0"/>
               <a:t>header cell</a:t>
             </a:r>
             <a:r>
-              <a:rPr lang="en-US" dirty="0" smtClean="0"/>
+              <a:rPr lang="en-US" dirty="0"/>
               <a:t> in the table</a:t>
             </a:r>
             <a:endParaRPr lang="en-US" b="1" dirty="0">
@@ -36732,29 +36390,27 @@
               <a:buNone/>
             </a:pPr>
             <a:r>
-              <a:rPr lang="en-US" sz="3200" b="1" dirty="0" smtClean="0">
+              <a:rPr lang="en-US" sz="3200" b="1" dirty="0">
                 <a:solidFill>
-                  <a:schemeClr val="accent2">
-                    <a:lumMod val="75000"/>
-                  </a:schemeClr>
+                  <a:srgbClr val="E95EBE"/>
                 </a:solidFill>
                 <a:latin typeface="Consolas" panose="020B0609020204030204" pitchFamily="49" charset="0"/>
               </a:rPr>
               <a:t>td</a:t>
             </a:r>
             <a:r>
-              <a:rPr lang="en-US" dirty="0" smtClean="0"/>
+              <a:rPr lang="en-US" dirty="0"/>
               <a:t>: a </a:t>
             </a:r>
             <a:r>
-              <a:rPr lang="en-US" i="1" dirty="0" smtClean="0"/>
-              <a:t>cell</a:t>
+              <a:rPr lang="en-US" i="1" dirty="0"/>
+              <a:t>normal cell</a:t>
             </a:r>
             <a:r>
-              <a:rPr lang="en-US" dirty="0" smtClean="0"/>
+              <a:rPr lang="en-US" dirty="0"/>
               <a:t> in the table</a:t>
             </a:r>
-            <a:endParaRPr lang="en-US" b="1" dirty="0" smtClean="0">
+            <a:endParaRPr lang="en-US" b="1" dirty="0">
               <a:solidFill>
                 <a:schemeClr val="accent2">
                   <a:lumMod val="75000"/>
@@ -36763,14 +36419,366 @@
               <a:latin typeface="Consolas" panose="020B0609020204030204" pitchFamily="49" charset="0"/>
             </a:endParaRPr>
           </a:p>
+        </p:txBody>
+      </p:sp>
+      <p:pic>
+        <p:nvPicPr>
+          <p:cNvPr id="5" name="Picture 4">
+            <a:extLst>
+              <a:ext uri="{FF2B5EF4-FFF2-40B4-BE49-F238E27FC236}">
+                <a16:creationId xmlns:a16="http://schemas.microsoft.com/office/drawing/2014/main" id="{5A97C71E-A23A-42B9-9137-B0C6F092A1E7}"/>
+              </a:ext>
+            </a:extLst>
+          </p:cNvPr>
+          <p:cNvPicPr>
+            <a:picLocks noChangeAspect="1"/>
+          </p:cNvPicPr>
+          <p:nvPr/>
+        </p:nvPicPr>
+        <p:blipFill>
+          <a:blip r:embed="rId3"/>
+          <a:stretch>
+            <a:fillRect/>
+          </a:stretch>
+        </p:blipFill>
+        <p:spPr>
+          <a:xfrm>
+            <a:off x="609600" y="4397542"/>
+            <a:ext cx="10583752" cy="2381582"/>
+          </a:xfrm>
+          <a:prstGeom prst="rect">
+            <a:avLst/>
+          </a:prstGeom>
+        </p:spPr>
+      </p:pic>
+      <p:sp>
+        <p:nvSpPr>
+          <p:cNvPr id="6" name="Rectangle 5">
+            <a:extLst>
+              <a:ext uri="{FF2B5EF4-FFF2-40B4-BE49-F238E27FC236}">
+                <a16:creationId xmlns:a16="http://schemas.microsoft.com/office/drawing/2014/main" id="{22865F2E-D2A2-4655-9BD6-029692C741FB}"/>
+              </a:ext>
+            </a:extLst>
+          </p:cNvPr>
+          <p:cNvSpPr/>
+          <p:nvPr/>
+        </p:nvSpPr>
+        <p:spPr bwMode="auto">
+          <a:xfrm>
+            <a:off x="381000" y="4397542"/>
+            <a:ext cx="11430000" cy="2381582"/>
+          </a:xfrm>
+          <a:prstGeom prst="rect">
+            <a:avLst/>
+          </a:prstGeom>
+          <a:noFill/>
+          <a:ln w="50800">
+            <a:solidFill>
+              <a:schemeClr val="accent2"/>
+            </a:solidFill>
+            <a:miter lim="800000"/>
+            <a:headEnd type="none" w="med" len="med"/>
+            <a:tailEnd type="none" w="med" len="med"/>
+          </a:ln>
+          <a:effectLst/>
+        </p:spPr>
+        <p:style>
+          <a:lnRef idx="1">
+            <a:schemeClr val="accent2"/>
+          </a:lnRef>
+          <a:fillRef idx="3">
+            <a:schemeClr val="accent2"/>
+          </a:fillRef>
+          <a:effectRef idx="2">
+            <a:schemeClr val="accent2"/>
+          </a:effectRef>
+          <a:fontRef idx="minor">
+            <a:schemeClr val="lt1"/>
+          </a:fontRef>
+        </p:style>
+        <p:txBody>
+          <a:bodyPr rot="0" spcFirstLastPara="0" vertOverflow="overflow" horzOverflow="overflow" vert="horz" wrap="square" lIns="182880" tIns="146304" rIns="182880" bIns="146304" numCol="1" spcCol="0" rtlCol="0" fromWordArt="0" anchor="t" anchorCtr="0" forceAA="0" compatLnSpc="1">
+            <a:prstTxWarp prst="textNoShape">
+              <a:avLst/>
+            </a:prstTxWarp>
+            <a:noAutofit/>
+          </a:bodyPr>
+          <a:lstStyle/>
           <a:p>
-            <a:endParaRPr lang="en-US" b="1" dirty="0">
-              <a:solidFill>
-                <a:schemeClr val="accent2">
-                  <a:lumMod val="75000"/>
-                </a:schemeClr>
-              </a:solidFill>
-              <a:latin typeface="Consolas" panose="020B0609020204030204" pitchFamily="49" charset="0"/>
+            <a:pPr algn="ctr" defTabSz="932472" fontAlgn="base">
+              <a:lnSpc>
+                <a:spcPct val="90000"/>
+              </a:lnSpc>
+              <a:spcBef>
+                <a:spcPct val="0"/>
+              </a:spcBef>
+              <a:spcAft>
+                <a:spcPct val="0"/>
+              </a:spcAft>
+            </a:pPr>
+            <a:endParaRPr lang="en-US" sz="2400" dirty="0" err="1">
+              <a:gradFill>
+                <a:gsLst>
+                  <a:gs pos="0">
+                    <a:srgbClr val="FFFFFF"/>
+                  </a:gs>
+                  <a:gs pos="100000">
+                    <a:srgbClr val="FFFFFF"/>
+                  </a:gs>
+                </a:gsLst>
+                <a:lin ang="5400000" scaled="0"/>
+              </a:gradFill>
+              <a:ea typeface="Segoe UI" pitchFamily="34" charset="0"/>
+              <a:cs typeface="Segoe UI" pitchFamily="34" charset="0"/>
+            </a:endParaRPr>
+          </a:p>
+        </p:txBody>
+      </p:sp>
+      <p:sp>
+        <p:nvSpPr>
+          <p:cNvPr id="7" name="Rectangle 6">
+            <a:extLst>
+              <a:ext uri="{FF2B5EF4-FFF2-40B4-BE49-F238E27FC236}">
+                <a16:creationId xmlns:a16="http://schemas.microsoft.com/office/drawing/2014/main" id="{E7099D6C-6567-4C58-BA2F-CD078BC47DA5}"/>
+              </a:ext>
+            </a:extLst>
+          </p:cNvPr>
+          <p:cNvSpPr/>
+          <p:nvPr/>
+        </p:nvSpPr>
+        <p:spPr bwMode="auto">
+          <a:xfrm>
+            <a:off x="381000" y="4914900"/>
+            <a:ext cx="11430000" cy="457200"/>
+          </a:xfrm>
+          <a:prstGeom prst="rect">
+            <a:avLst/>
+          </a:prstGeom>
+          <a:noFill/>
+          <a:ln w="50800">
+            <a:solidFill>
+              <a:schemeClr val="accent1"/>
+            </a:solidFill>
+            <a:miter lim="800000"/>
+            <a:headEnd type="none" w="med" len="med"/>
+            <a:tailEnd type="none" w="med" len="med"/>
+          </a:ln>
+          <a:effectLst/>
+        </p:spPr>
+        <p:style>
+          <a:lnRef idx="1">
+            <a:schemeClr val="accent2"/>
+          </a:lnRef>
+          <a:fillRef idx="3">
+            <a:schemeClr val="accent2"/>
+          </a:fillRef>
+          <a:effectRef idx="2">
+            <a:schemeClr val="accent2"/>
+          </a:effectRef>
+          <a:fontRef idx="minor">
+            <a:schemeClr val="lt1"/>
+          </a:fontRef>
+        </p:style>
+        <p:txBody>
+          <a:bodyPr rot="0" spcFirstLastPara="0" vertOverflow="overflow" horzOverflow="overflow" vert="horz" wrap="square" lIns="182880" tIns="146304" rIns="182880" bIns="146304" numCol="1" spcCol="0" rtlCol="0" fromWordArt="0" anchor="t" anchorCtr="0" forceAA="0" compatLnSpc="1">
+            <a:prstTxWarp prst="textNoShape">
+              <a:avLst/>
+            </a:prstTxWarp>
+            <a:noAutofit/>
+          </a:bodyPr>
+          <a:lstStyle/>
+          <a:p>
+            <a:pPr algn="ctr" defTabSz="932472" fontAlgn="base">
+              <a:lnSpc>
+                <a:spcPct val="90000"/>
+              </a:lnSpc>
+              <a:spcBef>
+                <a:spcPct val="0"/>
+              </a:spcBef>
+              <a:spcAft>
+                <a:spcPct val="0"/>
+              </a:spcAft>
+            </a:pPr>
+            <a:endParaRPr lang="en-US" sz="2400" dirty="0" err="1">
+              <a:gradFill>
+                <a:gsLst>
+                  <a:gs pos="0">
+                    <a:srgbClr val="FFFFFF"/>
+                  </a:gs>
+                  <a:gs pos="100000">
+                    <a:srgbClr val="FFFFFF"/>
+                  </a:gs>
+                </a:gsLst>
+                <a:lin ang="5400000" scaled="0"/>
+              </a:gradFill>
+              <a:ea typeface="Segoe UI" pitchFamily="34" charset="0"/>
+              <a:cs typeface="Segoe UI" pitchFamily="34" charset="0"/>
+            </a:endParaRPr>
+          </a:p>
+        </p:txBody>
+      </p:sp>
+      <p:sp>
+        <p:nvSpPr>
+          <p:cNvPr id="8" name="Rectangle 7">
+            <a:extLst>
+              <a:ext uri="{FF2B5EF4-FFF2-40B4-BE49-F238E27FC236}">
+                <a16:creationId xmlns:a16="http://schemas.microsoft.com/office/drawing/2014/main" id="{AA5A7812-F97B-4EC5-BB1A-32ADEDE81F25}"/>
+              </a:ext>
+            </a:extLst>
+          </p:cNvPr>
+          <p:cNvSpPr/>
+          <p:nvPr/>
+        </p:nvSpPr>
+        <p:spPr bwMode="auto">
+          <a:xfrm>
+            <a:off x="3238500" y="4457700"/>
+            <a:ext cx="2857500" cy="457200"/>
+          </a:xfrm>
+          <a:prstGeom prst="rect">
+            <a:avLst/>
+          </a:prstGeom>
+          <a:noFill/>
+          <a:ln w="50800">
+            <a:solidFill>
+              <a:srgbClr val="FFC000"/>
+            </a:solidFill>
+            <a:miter lim="800000"/>
+            <a:headEnd type="none" w="med" len="med"/>
+            <a:tailEnd type="none" w="med" len="med"/>
+          </a:ln>
+          <a:effectLst/>
+        </p:spPr>
+        <p:style>
+          <a:lnRef idx="1">
+            <a:schemeClr val="accent2"/>
+          </a:lnRef>
+          <a:fillRef idx="3">
+            <a:schemeClr val="accent2"/>
+          </a:fillRef>
+          <a:effectRef idx="2">
+            <a:schemeClr val="accent2"/>
+          </a:effectRef>
+          <a:fontRef idx="minor">
+            <a:schemeClr val="lt1"/>
+          </a:fontRef>
+        </p:style>
+        <p:txBody>
+          <a:bodyPr rot="0" spcFirstLastPara="0" vertOverflow="overflow" horzOverflow="overflow" vert="horz" wrap="square" lIns="182880" tIns="146304" rIns="182880" bIns="146304" numCol="1" spcCol="0" rtlCol="0" fromWordArt="0" anchor="t" anchorCtr="0" forceAA="0" compatLnSpc="1">
+            <a:prstTxWarp prst="textNoShape">
+              <a:avLst/>
+            </a:prstTxWarp>
+            <a:noAutofit/>
+          </a:bodyPr>
+          <a:lstStyle/>
+          <a:p>
+            <a:pPr algn="ctr" defTabSz="932472" fontAlgn="base">
+              <a:lnSpc>
+                <a:spcPct val="90000"/>
+              </a:lnSpc>
+              <a:spcBef>
+                <a:spcPct val="0"/>
+              </a:spcBef>
+              <a:spcAft>
+                <a:spcPct val="0"/>
+              </a:spcAft>
+            </a:pPr>
+            <a:endParaRPr lang="en-US" sz="2400" dirty="0" err="1">
+              <a:gradFill>
+                <a:gsLst>
+                  <a:gs pos="0">
+                    <a:srgbClr val="FFFFFF"/>
+                  </a:gs>
+                  <a:gs pos="100000">
+                    <a:srgbClr val="FFFFFF"/>
+                  </a:gs>
+                </a:gsLst>
+                <a:lin ang="5400000" scaled="0"/>
+              </a:gradFill>
+              <a:ea typeface="Segoe UI" pitchFamily="34" charset="0"/>
+              <a:cs typeface="Segoe UI" pitchFamily="34" charset="0"/>
+            </a:endParaRPr>
+          </a:p>
+        </p:txBody>
+      </p:sp>
+      <p:sp>
+        <p:nvSpPr>
+          <p:cNvPr id="9" name="Rectangle 8">
+            <a:extLst>
+              <a:ext uri="{FF2B5EF4-FFF2-40B4-BE49-F238E27FC236}">
+                <a16:creationId xmlns:a16="http://schemas.microsoft.com/office/drawing/2014/main" id="{616B92A4-996F-42D6-BE6F-29427DA51581}"/>
+              </a:ext>
+            </a:extLst>
+          </p:cNvPr>
+          <p:cNvSpPr/>
+          <p:nvPr/>
+        </p:nvSpPr>
+        <p:spPr bwMode="auto">
+          <a:xfrm>
+            <a:off x="8421624" y="5425739"/>
+            <a:ext cx="571500" cy="325188"/>
+          </a:xfrm>
+          <a:prstGeom prst="rect">
+            <a:avLst/>
+          </a:prstGeom>
+          <a:noFill/>
+          <a:ln w="50800">
+            <a:solidFill>
+              <a:srgbClr val="E95EBE"/>
+            </a:solidFill>
+            <a:miter lim="800000"/>
+            <a:headEnd type="none" w="med" len="med"/>
+            <a:tailEnd type="none" w="med" len="med"/>
+          </a:ln>
+          <a:effectLst/>
+        </p:spPr>
+        <p:style>
+          <a:lnRef idx="1">
+            <a:schemeClr val="accent2"/>
+          </a:lnRef>
+          <a:fillRef idx="3">
+            <a:schemeClr val="accent2"/>
+          </a:fillRef>
+          <a:effectRef idx="2">
+            <a:schemeClr val="accent2"/>
+          </a:effectRef>
+          <a:fontRef idx="minor">
+            <a:schemeClr val="lt1"/>
+          </a:fontRef>
+        </p:style>
+        <p:txBody>
+          <a:bodyPr rot="0" spcFirstLastPara="0" vertOverflow="overflow" horzOverflow="overflow" vert="horz" wrap="square" lIns="182880" tIns="146304" rIns="182880" bIns="146304" numCol="1" spcCol="0" rtlCol="0" fromWordArt="0" anchor="t" anchorCtr="0" forceAA="0" compatLnSpc="1">
+            <a:prstTxWarp prst="textNoShape">
+              <a:avLst/>
+            </a:prstTxWarp>
+            <a:noAutofit/>
+          </a:bodyPr>
+          <a:lstStyle/>
+          <a:p>
+            <a:pPr algn="ctr" defTabSz="932472" fontAlgn="base">
+              <a:lnSpc>
+                <a:spcPct val="90000"/>
+              </a:lnSpc>
+              <a:spcBef>
+                <a:spcPct val="0"/>
+              </a:spcBef>
+              <a:spcAft>
+                <a:spcPct val="0"/>
+              </a:spcAft>
+            </a:pPr>
+            <a:endParaRPr lang="en-US" sz="2400" dirty="0" err="1">
+              <a:gradFill>
+                <a:gsLst>
+                  <a:gs pos="0">
+                    <a:srgbClr val="FFFFFF"/>
+                  </a:gs>
+                  <a:gs pos="100000">
+                    <a:srgbClr val="FFFFFF"/>
+                  </a:gs>
+                </a:gsLst>
+                <a:lin ang="5400000" scaled="0"/>
+              </a:gradFill>
+              <a:ea typeface="Segoe UI" pitchFamily="34" charset="0"/>
+              <a:cs typeface="Segoe UI" pitchFamily="34" charset="0"/>
             </a:endParaRPr>
           </a:p>
         </p:txBody>
@@ -36885,7 +36893,7 @@
                                         <p:tgtEl>
                                           <p:spTgt spid="3">
                                             <p:txEl>
-                                              <p:pRg st="2" end="2"/>
+                                              <p:pRg st="1" end="1"/>
                                             </p:txEl>
                                           </p:spTgt>
                                         </p:tgtEl>
@@ -36903,9 +36911,44 @@
                                         <p:tgtEl>
                                           <p:spTgt spid="3">
                                             <p:txEl>
-                                              <p:pRg st="2" end="2"/>
+                                              <p:pRg st="1" end="1"/>
                                             </p:txEl>
                                           </p:spTgt>
+                                        </p:tgtEl>
+                                      </p:cBhvr>
+                                    </p:animEffect>
+                                  </p:childTnLst>
+                                </p:cTn>
+                              </p:par>
+                              <p:par>
+                                <p:cTn id="13" presetID="10" presetClass="entr" presetSubtype="0" fill="hold" grpId="0" nodeType="withEffect">
+                                  <p:stCondLst>
+                                    <p:cond delay="0"/>
+                                  </p:stCondLst>
+                                  <p:childTnLst>
+                                    <p:set>
+                                      <p:cBhvr>
+                                        <p:cTn id="14" dur="1" fill="hold">
+                                          <p:stCondLst>
+                                            <p:cond delay="0"/>
+                                          </p:stCondLst>
+                                        </p:cTn>
+                                        <p:tgtEl>
+                                          <p:spTgt spid="6"/>
+                                        </p:tgtEl>
+                                        <p:attrNameLst>
+                                          <p:attrName>style.visibility</p:attrName>
+                                        </p:attrNameLst>
+                                      </p:cBhvr>
+                                      <p:to>
+                                        <p:strVal val="visible"/>
+                                      </p:to>
+                                    </p:set>
+                                    <p:animEffect transition="in" filter="fade">
+                                      <p:cBhvr>
+                                        <p:cTn id="15" dur="500"/>
+                                        <p:tgtEl>
+                                          <p:spTgt spid="6"/>
                                         </p:tgtEl>
                                       </p:cBhvr>
                                     </p:animEffect>
@@ -36919,26 +36962,122 @@
                     </p:cTn>
                   </p:par>
                   <p:par>
-                    <p:cTn id="13" fill="hold">
+                    <p:cTn id="16" fill="hold">
                       <p:stCondLst>
                         <p:cond delay="indefinite"/>
                       </p:stCondLst>
                       <p:childTnLst>
                         <p:par>
-                          <p:cTn id="14" fill="hold">
+                          <p:cTn id="17" fill="hold">
                             <p:stCondLst>
                               <p:cond delay="0"/>
                             </p:stCondLst>
                             <p:childTnLst>
                               <p:par>
-                                <p:cTn id="15" presetID="10" presetClass="entr" presetSubtype="0" fill="hold" grpId="0" nodeType="clickEffect">
+                                <p:cTn id="18" presetID="10" presetClass="entr" presetSubtype="0" fill="hold" grpId="0" nodeType="clickEffect">
                                   <p:stCondLst>
                                     <p:cond delay="0"/>
                                   </p:stCondLst>
                                   <p:childTnLst>
                                     <p:set>
                                       <p:cBhvr>
-                                        <p:cTn id="16" dur="1" fill="hold">
+                                        <p:cTn id="19" dur="1" fill="hold">
+                                          <p:stCondLst>
+                                            <p:cond delay="0"/>
+                                          </p:stCondLst>
+                                        </p:cTn>
+                                        <p:tgtEl>
+                                          <p:spTgt spid="3">
+                                            <p:txEl>
+                                              <p:pRg st="2" end="2"/>
+                                            </p:txEl>
+                                          </p:spTgt>
+                                        </p:tgtEl>
+                                        <p:attrNameLst>
+                                          <p:attrName>style.visibility</p:attrName>
+                                        </p:attrNameLst>
+                                      </p:cBhvr>
+                                      <p:to>
+                                        <p:strVal val="visible"/>
+                                      </p:to>
+                                    </p:set>
+                                    <p:animEffect transition="in" filter="fade">
+                                      <p:cBhvr>
+                                        <p:cTn id="20" dur="500"/>
+                                        <p:tgtEl>
+                                          <p:spTgt spid="3">
+                                            <p:txEl>
+                                              <p:pRg st="2" end="2"/>
+                                            </p:txEl>
+                                          </p:spTgt>
+                                        </p:tgtEl>
+                                      </p:cBhvr>
+                                    </p:animEffect>
+                                  </p:childTnLst>
+                                </p:cTn>
+                              </p:par>
+                              <p:par>
+                                <p:cTn id="21" presetID="10" presetClass="entr" presetSubtype="0" fill="hold" grpId="0" nodeType="withEffect">
+                                  <p:stCondLst>
+                                    <p:cond delay="0"/>
+                                  </p:stCondLst>
+                                  <p:childTnLst>
+                                    <p:set>
+                                      <p:cBhvr>
+                                        <p:cTn id="22" dur="1" fill="hold">
+                                          <p:stCondLst>
+                                            <p:cond delay="0"/>
+                                          </p:stCondLst>
+                                        </p:cTn>
+                                        <p:tgtEl>
+                                          <p:spTgt spid="7"/>
+                                        </p:tgtEl>
+                                        <p:attrNameLst>
+                                          <p:attrName>style.visibility</p:attrName>
+                                        </p:attrNameLst>
+                                      </p:cBhvr>
+                                      <p:to>
+                                        <p:strVal val="visible"/>
+                                      </p:to>
+                                    </p:set>
+                                    <p:animEffect transition="in" filter="fade">
+                                      <p:cBhvr>
+                                        <p:cTn id="23" dur="500"/>
+                                        <p:tgtEl>
+                                          <p:spTgt spid="7"/>
+                                        </p:tgtEl>
+                                      </p:cBhvr>
+                                    </p:animEffect>
+                                  </p:childTnLst>
+                                </p:cTn>
+                              </p:par>
+                            </p:childTnLst>
+                          </p:cTn>
+                        </p:par>
+                      </p:childTnLst>
+                    </p:cTn>
+                  </p:par>
+                  <p:par>
+                    <p:cTn id="24" fill="hold">
+                      <p:stCondLst>
+                        <p:cond delay="indefinite"/>
+                      </p:stCondLst>
+                      <p:childTnLst>
+                        <p:par>
+                          <p:cTn id="25" fill="hold">
+                            <p:stCondLst>
+                              <p:cond delay="0"/>
+                            </p:stCondLst>
+                            <p:childTnLst>
+                              <p:par>
+                                <p:cTn id="26" presetID="10" presetClass="entr" presetSubtype="0" fill="hold" grpId="0" nodeType="clickEffect">
+                                  <p:stCondLst>
+                                    <p:cond delay="0"/>
+                                  </p:stCondLst>
+                                  <p:childTnLst>
+                                    <p:set>
+                                      <p:cBhvr>
+                                        <p:cTn id="27" dur="1" fill="hold">
                                           <p:stCondLst>
                                             <p:cond delay="0"/>
                                           </p:stCondLst>
@@ -36960,13 +37099,48 @@
                                     </p:set>
                                     <p:animEffect transition="in" filter="fade">
                                       <p:cBhvr>
-                                        <p:cTn id="17" dur="500"/>
+                                        <p:cTn id="28" dur="500"/>
                                         <p:tgtEl>
                                           <p:spTgt spid="3">
                                             <p:txEl>
                                               <p:pRg st="3" end="3"/>
                                             </p:txEl>
                                           </p:spTgt>
+                                        </p:tgtEl>
+                                      </p:cBhvr>
+                                    </p:animEffect>
+                                  </p:childTnLst>
+                                </p:cTn>
+                              </p:par>
+                              <p:par>
+                                <p:cTn id="29" presetID="10" presetClass="entr" presetSubtype="0" fill="hold" grpId="0" nodeType="withEffect">
+                                  <p:stCondLst>
+                                    <p:cond delay="0"/>
+                                  </p:stCondLst>
+                                  <p:childTnLst>
+                                    <p:set>
+                                      <p:cBhvr>
+                                        <p:cTn id="30" dur="1" fill="hold">
+                                          <p:stCondLst>
+                                            <p:cond delay="0"/>
+                                          </p:stCondLst>
+                                        </p:cTn>
+                                        <p:tgtEl>
+                                          <p:spTgt spid="8"/>
+                                        </p:tgtEl>
+                                        <p:attrNameLst>
+                                          <p:attrName>style.visibility</p:attrName>
+                                        </p:attrNameLst>
+                                      </p:cBhvr>
+                                      <p:to>
+                                        <p:strVal val="visible"/>
+                                      </p:to>
+                                    </p:set>
+                                    <p:animEffect transition="in" filter="fade">
+                                      <p:cBhvr>
+                                        <p:cTn id="31" dur="500"/>
+                                        <p:tgtEl>
+                                          <p:spTgt spid="8"/>
                                         </p:tgtEl>
                                       </p:cBhvr>
                                     </p:animEffect>
@@ -36980,26 +37154,26 @@
                     </p:cTn>
                   </p:par>
                   <p:par>
-                    <p:cTn id="18" fill="hold">
+                    <p:cTn id="32" fill="hold">
                       <p:stCondLst>
                         <p:cond delay="indefinite"/>
                       </p:stCondLst>
                       <p:childTnLst>
                         <p:par>
-                          <p:cTn id="19" fill="hold">
+                          <p:cTn id="33" fill="hold">
                             <p:stCondLst>
                               <p:cond delay="0"/>
                             </p:stCondLst>
                             <p:childTnLst>
                               <p:par>
-                                <p:cTn id="20" presetID="10" presetClass="entr" presetSubtype="0" fill="hold" grpId="0" nodeType="clickEffect">
+                                <p:cTn id="34" presetID="10" presetClass="entr" presetSubtype="0" fill="hold" grpId="0" nodeType="clickEffect">
                                   <p:stCondLst>
                                     <p:cond delay="0"/>
                                   </p:stCondLst>
                                   <p:childTnLst>
                                     <p:set>
                                       <p:cBhvr>
-                                        <p:cTn id="21" dur="1" fill="hold">
+                                        <p:cTn id="35" dur="1" fill="hold">
                                           <p:stCondLst>
                                             <p:cond delay="0"/>
                                           </p:stCondLst>
@@ -37021,7 +37195,7 @@
                                     </p:set>
                                     <p:animEffect transition="in" filter="fade">
                                       <p:cBhvr>
-                                        <p:cTn id="22" dur="500"/>
+                                        <p:cTn id="36" dur="500"/>
                                         <p:tgtEl>
                                           <p:spTgt spid="3">
                                             <p:txEl>
@@ -37034,43 +37208,21 @@
                                   </p:childTnLst>
                                 </p:cTn>
                               </p:par>
-                            </p:childTnLst>
-                          </p:cTn>
-                        </p:par>
-                      </p:childTnLst>
-                    </p:cTn>
-                  </p:par>
-                  <p:par>
-                    <p:cTn id="23" fill="hold">
-                      <p:stCondLst>
-                        <p:cond delay="indefinite"/>
-                      </p:stCondLst>
-                      <p:childTnLst>
-                        <p:par>
-                          <p:cTn id="24" fill="hold">
-                            <p:stCondLst>
-                              <p:cond delay="0"/>
-                            </p:stCondLst>
-                            <p:childTnLst>
                               <p:par>
-                                <p:cTn id="25" presetID="10" presetClass="entr" presetSubtype="0" fill="hold" grpId="0" nodeType="clickEffect">
+                                <p:cTn id="37" presetID="10" presetClass="entr" presetSubtype="0" fill="hold" grpId="0" nodeType="withEffect">
                                   <p:stCondLst>
                                     <p:cond delay="0"/>
                                   </p:stCondLst>
                                   <p:childTnLst>
                                     <p:set>
                                       <p:cBhvr>
-                                        <p:cTn id="26" dur="1" fill="hold">
+                                        <p:cTn id="38" dur="1" fill="hold">
                                           <p:stCondLst>
                                             <p:cond delay="0"/>
                                           </p:stCondLst>
                                         </p:cTn>
                                         <p:tgtEl>
-                                          <p:spTgt spid="3">
-                                            <p:txEl>
-                                              <p:pRg st="5" end="5"/>
-                                            </p:txEl>
-                                          </p:spTgt>
+                                          <p:spTgt spid="9"/>
                                         </p:tgtEl>
                                         <p:attrNameLst>
                                           <p:attrName>style.visibility</p:attrName>
@@ -37082,135 +37234,9 @@
                                     </p:set>
                                     <p:animEffect transition="in" filter="fade">
                                       <p:cBhvr>
-                                        <p:cTn id="27" dur="500"/>
+                                        <p:cTn id="39" dur="500"/>
                                         <p:tgtEl>
-                                          <p:spTgt spid="3">
-                                            <p:txEl>
-                                              <p:pRg st="5" end="5"/>
-                                            </p:txEl>
-                                          </p:spTgt>
-                                        </p:tgtEl>
-                                      </p:cBhvr>
-                                    </p:animEffect>
-                                  </p:childTnLst>
-                                </p:cTn>
-                              </p:par>
-                            </p:childTnLst>
-                          </p:cTn>
-                        </p:par>
-                      </p:childTnLst>
-                    </p:cTn>
-                  </p:par>
-                  <p:par>
-                    <p:cTn id="28" fill="hold">
-                      <p:stCondLst>
-                        <p:cond delay="indefinite"/>
-                      </p:stCondLst>
-                      <p:childTnLst>
-                        <p:par>
-                          <p:cTn id="29" fill="hold">
-                            <p:stCondLst>
-                              <p:cond delay="0"/>
-                            </p:stCondLst>
-                            <p:childTnLst>
-                              <p:par>
-                                <p:cTn id="30" presetID="10" presetClass="entr" presetSubtype="0" fill="hold" grpId="0" nodeType="clickEffect">
-                                  <p:stCondLst>
-                                    <p:cond delay="0"/>
-                                  </p:stCondLst>
-                                  <p:childTnLst>
-                                    <p:set>
-                                      <p:cBhvr>
-                                        <p:cTn id="31" dur="1" fill="hold">
-                                          <p:stCondLst>
-                                            <p:cond delay="0"/>
-                                          </p:stCondLst>
-                                        </p:cTn>
-                                        <p:tgtEl>
-                                          <p:spTgt spid="3">
-                                            <p:txEl>
-                                              <p:pRg st="6" end="6"/>
-                                            </p:txEl>
-                                          </p:spTgt>
-                                        </p:tgtEl>
-                                        <p:attrNameLst>
-                                          <p:attrName>style.visibility</p:attrName>
-                                        </p:attrNameLst>
-                                      </p:cBhvr>
-                                      <p:to>
-                                        <p:strVal val="visible"/>
-                                      </p:to>
-                                    </p:set>
-                                    <p:animEffect transition="in" filter="fade">
-                                      <p:cBhvr>
-                                        <p:cTn id="32" dur="500"/>
-                                        <p:tgtEl>
-                                          <p:spTgt spid="3">
-                                            <p:txEl>
-                                              <p:pRg st="6" end="6"/>
-                                            </p:txEl>
-                                          </p:spTgt>
-                                        </p:tgtEl>
-                                      </p:cBhvr>
-                                    </p:animEffect>
-                                  </p:childTnLst>
-                                </p:cTn>
-                              </p:par>
-                            </p:childTnLst>
-                          </p:cTn>
-                        </p:par>
-                      </p:childTnLst>
-                    </p:cTn>
-                  </p:par>
-                  <p:par>
-                    <p:cTn id="33" fill="hold">
-                      <p:stCondLst>
-                        <p:cond delay="indefinite"/>
-                      </p:stCondLst>
-                      <p:childTnLst>
-                        <p:par>
-                          <p:cTn id="34" fill="hold">
-                            <p:stCondLst>
-                              <p:cond delay="0"/>
-                            </p:stCondLst>
-                            <p:childTnLst>
-                              <p:par>
-                                <p:cTn id="35" presetID="10" presetClass="entr" presetSubtype="0" fill="hold" grpId="0" nodeType="clickEffect">
-                                  <p:stCondLst>
-                                    <p:cond delay="0"/>
-                                  </p:stCondLst>
-                                  <p:childTnLst>
-                                    <p:set>
-                                      <p:cBhvr>
-                                        <p:cTn id="36" dur="1" fill="hold">
-                                          <p:stCondLst>
-                                            <p:cond delay="0"/>
-                                          </p:stCondLst>
-                                        </p:cTn>
-                                        <p:tgtEl>
-                                          <p:spTgt spid="3">
-                                            <p:txEl>
-                                              <p:pRg st="7" end="7"/>
-                                            </p:txEl>
-                                          </p:spTgt>
-                                        </p:tgtEl>
-                                        <p:attrNameLst>
-                                          <p:attrName>style.visibility</p:attrName>
-                                        </p:attrNameLst>
-                                      </p:cBhvr>
-                                      <p:to>
-                                        <p:strVal val="visible"/>
-                                      </p:to>
-                                    </p:set>
-                                    <p:animEffect transition="in" filter="fade">
-                                      <p:cBhvr>
-                                        <p:cTn id="37" dur="500"/>
-                                        <p:tgtEl>
-                                          <p:spTgt spid="3">
-                                            <p:txEl>
-                                              <p:pRg st="7" end="7"/>
-                                            </p:txEl>
-                                          </p:spTgt>
+                                          <p:spTgt spid="9"/>
                                         </p:tgtEl>
                                       </p:cBhvr>
                                     </p:animEffect>
@@ -37245,7 +37271,11 @@
       </p:par>
     </p:tnLst>
     <p:bldLst>
-      <p:bldP spid="3" grpId="0" build="p"/>
+      <p:bldP spid="3" grpId="0" uiExpand="1" build="p"/>
+      <p:bldP spid="6" grpId="0" animBg="1"/>
+      <p:bldP spid="7" grpId="0" animBg="1"/>
+      <p:bldP spid="8" grpId="0" animBg="1"/>
+      <p:bldP spid="9" grpId="0" animBg="1"/>
     </p:bldLst>
   </p:timing>
 </p:sld>
@@ -37294,10 +37324,9 @@
           <a:lstStyle/>
           <a:p>
             <a:r>
-              <a:rPr lang="en-US" dirty="0" smtClean="0"/>
+              <a:rPr lang="en-US" dirty="0"/>
               <a:t>Table example</a:t>
             </a:r>
-            <a:endParaRPr lang="en-US" dirty="0"/>
           </a:p>
         </p:txBody>
       </p:sp>
@@ -37325,7 +37354,7 @@
               <a:rPr lang="en-US" sz="11500" dirty="0">
                 <a:hlinkClick r:id="rId3"/>
               </a:rPr>
-              <a:t>https://repl.it/repls/MistyroseFrayedUnix</a:t>
+              <a:t>https://repl.it/@JosephMaxwell/TableExample</a:t>
             </a:r>
             <a:endParaRPr lang="en-US" sz="11500" dirty="0"/>
           </a:p>
@@ -37344,13 +37373,6 @@
   <p:transition>
     <p:fade/>
   </p:transition>
-  <p:timing>
-    <p:tnLst>
-      <p:par>
-        <p:cTn id="1" dur="indefinite" restart="never" nodeType="tmRoot"/>
-      </p:par>
-    </p:tnLst>
-  </p:timing>
 </p:sld>
 </file>
 
@@ -37387,11 +37409,11 @@
           <a:lstStyle/>
           <a:p>
             <a:r>
-              <a:rPr lang="en-US" dirty="0" smtClean="0"/>
+              <a:rPr lang="en-US" dirty="0"/>
               <a:t>The </a:t>
             </a:r>
             <a:r>
-              <a:rPr lang="en-US" sz="4000" cap="none" dirty="0" smtClean="0">
+              <a:rPr lang="en-US" sz="4000" cap="none" dirty="0">
                 <a:solidFill>
                   <a:schemeClr val="accent1">
                     <a:lumMod val="50000"/>
@@ -37402,7 +37424,7 @@
               <a:t>border</a:t>
             </a:r>
             <a:r>
-              <a:rPr lang="en-US" dirty="0" smtClean="0"/>
+              <a:rPr lang="en-US" dirty="0"/>
               <a:t> attribute</a:t>
             </a:r>
             <a:endParaRPr lang="en-US" dirty="0">
@@ -37484,19 +37506,10 @@
                 </a:solidFill>
                 <a:latin typeface="Consolas" panose="020B0609020204030204" pitchFamily="49" charset="0"/>
               </a:rPr>
-              <a:t>"1</a:t>
+              <a:t>"1"</a:t>
             </a:r>
             <a:r>
-              <a:rPr lang="en-US" sz="7200" dirty="0" smtClean="0">
-                <a:solidFill>
-                  <a:srgbClr val="0000FF"/>
-                </a:solidFill>
-                <a:latin typeface="Consolas" panose="020B0609020204030204" pitchFamily="49" charset="0"/>
-              </a:rPr>
-              <a:t>"</a:t>
-            </a:r>
-            <a:r>
-              <a:rPr lang="en-US" sz="7200" dirty="0" smtClean="0">
+              <a:rPr lang="en-US" sz="7200" dirty="0">
                 <a:solidFill>
                   <a:srgbClr val="800000"/>
                 </a:solidFill>
@@ -37517,11 +37530,11 @@
           </a:p>
           <a:p>
             <a:r>
-              <a:rPr lang="en-US" sz="4400" dirty="0" smtClean="0"/>
+              <a:rPr lang="en-US" sz="4400" dirty="0"/>
               <a:t>Set the </a:t>
             </a:r>
             <a:r>
-              <a:rPr lang="en-US" sz="4400" b="1" dirty="0" smtClean="0">
+              <a:rPr lang="en-US" sz="4400" b="1" dirty="0">
                 <a:solidFill>
                   <a:schemeClr val="accent1">
                     <a:lumMod val="50000"/>
@@ -37532,11 +37545,11 @@
               <a:t>border</a:t>
             </a:r>
             <a:r>
-              <a:rPr lang="en-US" sz="4400" dirty="0" smtClean="0"/>
+              <a:rPr lang="en-US" sz="4400" dirty="0"/>
               <a:t> attribute to </a:t>
             </a:r>
             <a:r>
-              <a:rPr lang="en-US" sz="4400" b="1" dirty="0" smtClean="0">
+              <a:rPr lang="en-US" sz="4400" b="1" dirty="0">
                 <a:solidFill>
                   <a:schemeClr val="accent1">
                     <a:lumMod val="50000"/>
@@ -37547,10 +37560,10 @@
               <a:t>1</a:t>
             </a:r>
             <a:r>
-              <a:rPr lang="en-US" sz="4400" dirty="0" smtClean="0"/>
+              <a:rPr lang="en-US" sz="4400" dirty="0"/>
               <a:t> to add a border</a:t>
             </a:r>
-            <a:endParaRPr lang="en-US" sz="4800" dirty="0" smtClean="0">
+            <a:endParaRPr lang="en-US" sz="4800" dirty="0">
               <a:solidFill>
                 <a:srgbClr val="800000"/>
               </a:solidFill>
@@ -37715,10 +37728,9 @@
           <a:p>
             <a:pPr algn="r"/>
             <a:r>
-              <a:rPr lang="en-US" dirty="0" smtClean="0"/>
+              <a:rPr lang="en-US" dirty="0"/>
               <a:t>Iframes</a:t>
             </a:r>
-            <a:endParaRPr lang="en-US" dirty="0"/>
           </a:p>
         </p:txBody>
       </p:sp>
@@ -37776,13 +37788,6 @@
   <p:transition>
     <p:fade/>
   </p:transition>
-  <p:timing>
-    <p:tnLst>
-      <p:par>
-        <p:cTn id="1" dur="indefinite" restart="never" nodeType="tmRoot"/>
-      </p:par>
-    </p:tnLst>
-  </p:timing>
 </p:sld>
 </file>
 
@@ -37819,11 +37824,11 @@
           <a:lstStyle/>
           <a:p>
             <a:r>
-              <a:rPr lang="en-US" dirty="0" smtClean="0"/>
+              <a:rPr lang="en-US" dirty="0"/>
               <a:t>The </a:t>
             </a:r>
             <a:r>
-              <a:rPr lang="en-US" sz="4000" cap="none" dirty="0" smtClean="0">
+              <a:rPr lang="en-US" sz="4000" cap="none" dirty="0">
                 <a:solidFill>
                   <a:srgbClr val="54C8E8">
                     <a:lumMod val="50000"/>
@@ -37834,10 +37839,9 @@
               <a:t>iframe</a:t>
             </a:r>
             <a:r>
-              <a:rPr lang="en-US" dirty="0" smtClean="0"/>
+              <a:rPr lang="en-US" dirty="0"/>
               <a:t> element</a:t>
             </a:r>
-            <a:endParaRPr lang="en-US" dirty="0"/>
           </a:p>
         </p:txBody>
       </p:sp>
@@ -37868,11 +37872,7 @@
             </a:r>
             <a:r>
               <a:rPr lang="en-US" dirty="0"/>
-              <a:t> element represents a nested browsing context, embedding another HTML page into the current </a:t>
-            </a:r>
-            <a:r>
-              <a:rPr lang="en-US" dirty="0" smtClean="0"/>
-              <a:t>one</a:t>
+              <a:t> element represents a nested browsing context, embedding another HTML page into the current one</a:t>
             </a:r>
           </a:p>
           <a:p>
@@ -37880,15 +37880,15 @@
           </a:p>
           <a:p>
             <a:r>
-              <a:rPr lang="en-US" dirty="0" smtClean="0"/>
+              <a:rPr lang="en-US" dirty="0"/>
               <a:t>Basically, you can display other webpages </a:t>
             </a:r>
             <a:r>
-              <a:rPr lang="en-US" i="1" dirty="0" smtClean="0"/>
+              <a:rPr lang="en-US" i="1" dirty="0"/>
               <a:t>within</a:t>
             </a:r>
             <a:r>
-              <a:rPr lang="en-US" dirty="0" smtClean="0"/>
+              <a:rPr lang="en-US" dirty="0"/>
               <a:t> your webpage</a:t>
             </a:r>
           </a:p>
@@ -37897,15 +37897,15 @@
           </a:p>
           <a:p>
             <a:r>
-              <a:rPr lang="en-US" dirty="0" err="1" smtClean="0"/>
+              <a:rPr lang="en-US" dirty="0" err="1"/>
               <a:t>IFrames</a:t>
             </a:r>
             <a:r>
-              <a:rPr lang="en-US" dirty="0" smtClean="0"/>
+              <a:rPr lang="en-US" dirty="0"/>
               <a:t> use the </a:t>
             </a:r>
             <a:r>
-              <a:rPr lang="en-US" b="1" dirty="0" err="1" smtClean="0">
+              <a:rPr lang="en-US" b="1" dirty="0" err="1">
                 <a:solidFill>
                   <a:schemeClr val="accent2">
                     <a:lumMod val="75000"/>
@@ -37916,18 +37916,18 @@
               <a:t>src</a:t>
             </a:r>
             <a:r>
-              <a:rPr lang="en-US" dirty="0" smtClean="0"/>
+              <a:rPr lang="en-US" dirty="0"/>
               <a:t> element to determine which webpage to display</a:t>
             </a:r>
           </a:p>
           <a:p>
             <a:pPr lvl="1"/>
             <a:r>
-              <a:rPr lang="en-US" dirty="0" smtClean="0"/>
+              <a:rPr lang="en-US" dirty="0"/>
               <a:t>There are also </a:t>
             </a:r>
             <a:r>
-              <a:rPr lang="en-US" b="1" dirty="0" smtClean="0">
+              <a:rPr lang="en-US" b="1" dirty="0">
                 <a:solidFill>
                   <a:schemeClr val="accent2">
                     <a:lumMod val="75000"/>
@@ -37938,11 +37938,11 @@
               <a:t>height</a:t>
             </a:r>
             <a:r>
-              <a:rPr lang="en-US" dirty="0" smtClean="0"/>
+              <a:rPr lang="en-US" dirty="0"/>
               <a:t> and </a:t>
             </a:r>
             <a:r>
-              <a:rPr lang="en-US" b="1" dirty="0" smtClean="0">
+              <a:rPr lang="en-US" b="1" dirty="0">
                 <a:solidFill>
                   <a:schemeClr val="accent2">
                     <a:lumMod val="75000"/>
@@ -37953,7 +37953,7 @@
               <a:t>width</a:t>
             </a:r>
             <a:r>
-              <a:rPr lang="en-US" dirty="0" smtClean="0"/>
+              <a:rPr lang="en-US" dirty="0"/>
               <a:t> attributes</a:t>
             </a:r>
           </a:p>
@@ -38007,25 +38007,7 @@
                 </a:solidFill>
                 <a:latin typeface="Consolas" panose="020B0609020204030204" pitchFamily="49" charset="0"/>
               </a:rPr>
-              <a:t>"https://</a:t>
-            </a:r>
-            <a:r>
-              <a:rPr lang="en-US" sz="3200" dirty="0" smtClean="0">
-                <a:solidFill>
-                  <a:srgbClr val="0000FF"/>
-                </a:solidFill>
-                <a:latin typeface="Consolas" panose="020B0609020204030204" pitchFamily="49" charset="0"/>
-              </a:rPr>
-              <a:t>www.w3schools.com"</a:t>
-            </a:r>
-            <a:r>
-              <a:rPr lang="en-US" sz="3200" dirty="0" smtClean="0">
-                <a:solidFill>
-                  <a:srgbClr val="800000"/>
-                </a:solidFill>
-                <a:latin typeface="Consolas" panose="020B0609020204030204" pitchFamily="49" charset="0"/>
-              </a:rPr>
-              <a:t>&gt;&lt;/iframe</a:t>
+              <a:t>"https://www.w3schools.com"</a:t>
             </a:r>
             <a:r>
               <a:rPr lang="en-US" sz="3200" dirty="0">
@@ -38034,7 +38016,7 @@
                 </a:solidFill>
                 <a:latin typeface="Consolas" panose="020B0609020204030204" pitchFamily="49" charset="0"/>
               </a:rPr>
-              <a:t>&gt;</a:t>
+              <a:t>&gt;&lt;/iframe&gt;</a:t>
             </a:r>
             <a:endParaRPr lang="en-US" sz="3200" dirty="0">
               <a:solidFill>
@@ -38044,7 +38026,7 @@
             </a:endParaRPr>
           </a:p>
           <a:p>
-            <a:endParaRPr lang="en-US" dirty="0" smtClean="0"/>
+            <a:endParaRPr lang="en-US" dirty="0"/>
           </a:p>
         </p:txBody>
       </p:sp>
@@ -38061,13 +38043,6 @@
   <p:transition>
     <p:fade/>
   </p:transition>
-  <p:timing>
-    <p:tnLst>
-      <p:par>
-        <p:cTn id="1" dur="indefinite" restart="never" nodeType="tmRoot"/>
-      </p:par>
-    </p:tnLst>
-  </p:timing>
 </p:sld>
 </file>
 
@@ -38114,10 +38089,9 @@
           <a:lstStyle/>
           <a:p>
             <a:r>
-              <a:rPr lang="en-US" dirty="0" smtClean="0"/>
+              <a:rPr lang="en-US" dirty="0"/>
               <a:t>iframe example</a:t>
             </a:r>
-            <a:endParaRPr lang="en-US" dirty="0"/>
           </a:p>
         </p:txBody>
       </p:sp>
@@ -38145,7 +38119,7 @@
               <a:rPr lang="en-US" sz="11500" dirty="0">
                 <a:hlinkClick r:id="rId3"/>
               </a:rPr>
-              <a:t>https://repl.it/repls/LemonchiffonQualifiedNumbers</a:t>
+              <a:t>https://repl.it/@JosephMaxwell/IFrameExample</a:t>
             </a:r>
             <a:endParaRPr lang="en-US" sz="16600" dirty="0"/>
           </a:p>
@@ -38164,13 +38138,6 @@
   <p:transition>
     <p:fade/>
   </p:transition>
-  <p:timing>
-    <p:tnLst>
-      <p:par>
-        <p:cTn id="1" dur="indefinite" restart="never" nodeType="tmRoot"/>
-      </p:par>
-    </p:tnLst>
-  </p:timing>
 </p:sld>
 </file>
 

</xml_diff>

<commit_message>
Update gitbook 2021-10-11 20:42:13
</commit_message>
<xml_diff>
--- a/Week04/TablesAndIFrames.pptx
+++ b/Week04/TablesAndIFrames.pptx
@@ -216,7 +216,7 @@
           <a:p>
             <a:fld id="{19104133-B5B0-4351-8158-4F0E5EB1E2BF}" type="datetimeFigureOut">
               <a:rPr lang="en-US" smtClean="0"/>
-              <a:t>6/24/2021</a:t>
+              <a:t>10/7/2021</a:t>
             </a:fld>
             <a:endParaRPr lang="en-US"/>
           </a:p>
@@ -748,19 +748,11 @@
           <a:p>
             <a:r>
               <a:rPr lang="en-US" dirty="0"/>
-              <a:t>For the </a:t>
-            </a:r>
-            <a:r>
-              <a:rPr lang="en-US" dirty="0" err="1"/>
-              <a:t>Repl</a:t>
-            </a:r>
-            <a:r>
-              <a:rPr lang="en-US" dirty="0"/>
-              <a:t>,</a:t>
+              <a:t>Start by forking the Repl project. E</a:t>
             </a:r>
             <a:r>
               <a:rPr lang="en-US" baseline="0" dirty="0"/>
-              <a:t> emphasize the relationships between each table element. Ask students which elements are parents/children/</a:t>
+              <a:t>mphasize the relationships between each table element. Ask students which elements are parents/children/</a:t>
             </a:r>
             <a:r>
               <a:rPr lang="en-US" baseline="0" dirty="0" err="1"/>
@@ -785,15 +777,7 @@
             </a:r>
             <a:r>
               <a:rPr lang="en-US" b="0" baseline="0" dirty="0"/>
-              <a:t> attribute in this </a:t>
-            </a:r>
-            <a:r>
-              <a:rPr lang="en-US" b="0" baseline="0" dirty="0" err="1"/>
-              <a:t>Repl</a:t>
-            </a:r>
-            <a:r>
-              <a:rPr lang="en-US" b="0" baseline="0" dirty="0"/>
-              <a:t> – it starts as 0, so change it to 1 to see the border.</a:t>
+              <a:t> attribute – it starts as 0, so change it to 1 to see the border.</a:t>
             </a:r>
             <a:endParaRPr lang="en-US" baseline="0" dirty="0"/>
           </a:p>
@@ -1203,7 +1187,7 @@
             <a:fld id="{1C2D31DE-C454-491C-B5C3-F097855E3DF7}" type="datetime4">
               <a:rPr lang="en-US" smtClean="0"/>
               <a:pPr/>
-              <a:t>June 24, 2021</a:t>
+              <a:t>October 7, 2021</a:t>
             </a:fld>
             <a:endParaRPr lang="en-US" dirty="0"/>
           </a:p>
@@ -4595,7 +4579,7 @@
           <a:p>
             <a:fld id="{5958763E-B898-436D-883D-03711491D54A}" type="datetimeFigureOut">
               <a:rPr lang="en-US" smtClean="0"/>
-              <a:t>6/24/2021</a:t>
+              <a:t>10/7/2021</a:t>
             </a:fld>
             <a:endParaRPr lang="en-US"/>
           </a:p>
@@ -4788,7 +4772,7 @@
           <a:p>
             <a:fld id="{5958763E-B898-436D-883D-03711491D54A}" type="datetimeFigureOut">
               <a:rPr lang="en-US" smtClean="0"/>
-              <a:t>6/24/2021</a:t>
+              <a:t>10/7/2021</a:t>
             </a:fld>
             <a:endParaRPr lang="en-US"/>
           </a:p>
@@ -5038,7 +5022,7 @@
           <a:p>
             <a:fld id="{5958763E-B898-436D-883D-03711491D54A}" type="datetimeFigureOut">
               <a:rPr lang="en-US" smtClean="0"/>
-              <a:t>6/24/2021</a:t>
+              <a:t>10/7/2021</a:t>
             </a:fld>
             <a:endParaRPr lang="en-US"/>
           </a:p>
@@ -5386,7 +5370,7 @@
           <a:p>
             <a:fld id="{5958763E-B898-436D-883D-03711491D54A}" type="datetimeFigureOut">
               <a:rPr lang="en-US" smtClean="0"/>
-              <a:t>6/24/2021</a:t>
+              <a:t>10/7/2021</a:t>
             </a:fld>
             <a:endParaRPr lang="en-US"/>
           </a:p>
@@ -5802,7 +5786,7 @@
           <a:p>
             <a:fld id="{5958763E-B898-436D-883D-03711491D54A}" type="datetimeFigureOut">
               <a:rPr lang="en-US" smtClean="0"/>
-              <a:t>6/24/2021</a:t>
+              <a:t>10/7/2021</a:t>
             </a:fld>
             <a:endParaRPr lang="en-US"/>
           </a:p>
@@ -6303,7 +6287,7 @@
           <a:p>
             <a:fld id="{5958763E-B898-436D-883D-03711491D54A}" type="datetimeFigureOut">
               <a:rPr lang="en-US" smtClean="0"/>
-              <a:t>6/24/2021</a:t>
+              <a:t>10/7/2021</a:t>
             </a:fld>
             <a:endParaRPr lang="en-US"/>
           </a:p>
@@ -6754,7 +6738,7 @@
           <a:p>
             <a:fld id="{5958763E-B898-436D-883D-03711491D54A}" type="datetimeFigureOut">
               <a:rPr lang="en-US" smtClean="0"/>
-              <a:t>6/24/2021</a:t>
+              <a:t>10/7/2021</a:t>
             </a:fld>
             <a:endParaRPr lang="en-US"/>
           </a:p>
@@ -7365,7 +7349,7 @@
           <a:p>
             <a:fld id="{5958763E-B898-436D-883D-03711491D54A}" type="datetimeFigureOut">
               <a:rPr lang="en-US" smtClean="0"/>
-              <a:t>6/24/2021</a:t>
+              <a:t>10/7/2021</a:t>
             </a:fld>
             <a:endParaRPr lang="en-US"/>
           </a:p>
@@ -8136,7 +8120,7 @@
           <a:p>
             <a:fld id="{5958763E-B898-436D-883D-03711491D54A}" type="datetimeFigureOut">
               <a:rPr lang="en-US" smtClean="0"/>
-              <a:t>6/24/2021</a:t>
+              <a:t>10/7/2021</a:t>
             </a:fld>
             <a:endParaRPr lang="en-US"/>
           </a:p>
@@ -8240,7 +8224,7 @@
           <a:p>
             <a:fld id="{5958763E-B898-436D-883D-03711491D54A}" type="datetimeFigureOut">
               <a:rPr lang="en-US" smtClean="0"/>
-              <a:t>6/24/2021</a:t>
+              <a:t>10/7/2021</a:t>
             </a:fld>
             <a:endParaRPr lang="en-US"/>
           </a:p>
@@ -8567,7 +8551,7 @@
             <a:fld id="{1C2D31DE-C454-491C-B5C3-F097855E3DF7}" type="datetime4">
               <a:rPr lang="en-US" smtClean="0"/>
               <a:pPr/>
-              <a:t>June 24, 2021</a:t>
+              <a:t>October 7, 2021</a:t>
             </a:fld>
             <a:endParaRPr lang="en-US" dirty="0"/>
           </a:p>
@@ -11719,7 +11703,7 @@
           <a:p>
             <a:fld id="{5958763E-B898-436D-883D-03711491D54A}" type="datetimeFigureOut">
               <a:rPr lang="en-US" smtClean="0"/>
-              <a:t>6/24/2021</a:t>
+              <a:t>10/7/2021</a:t>
             </a:fld>
             <a:endParaRPr lang="en-US"/>
           </a:p>
@@ -11843,7 +11827,7 @@
           <a:p>
             <a:fld id="{5958763E-B898-436D-883D-03711491D54A}" type="datetimeFigureOut">
               <a:rPr lang="en-US" smtClean="0"/>
-              <a:t>6/24/2021</a:t>
+              <a:t>10/7/2021</a:t>
             </a:fld>
             <a:endParaRPr lang="en-US"/>
           </a:p>
@@ -11967,7 +11951,7 @@
           <a:p>
             <a:fld id="{5958763E-B898-436D-883D-03711491D54A}" type="datetimeFigureOut">
               <a:rPr lang="en-US" smtClean="0"/>
-              <a:t>6/24/2021</a:t>
+              <a:t>10/7/2021</a:t>
             </a:fld>
             <a:endParaRPr lang="en-US"/>
           </a:p>
@@ -12091,7 +12075,7 @@
           <a:p>
             <a:fld id="{5958763E-B898-436D-883D-03711491D54A}" type="datetimeFigureOut">
               <a:rPr lang="en-US" smtClean="0"/>
-              <a:t>6/24/2021</a:t>
+              <a:t>10/7/2021</a:t>
             </a:fld>
             <a:endParaRPr lang="en-US"/>
           </a:p>
@@ -12215,7 +12199,7 @@
           <a:p>
             <a:fld id="{5958763E-B898-436D-883D-03711491D54A}" type="datetimeFigureOut">
               <a:rPr lang="en-US" smtClean="0"/>
-              <a:t>6/24/2021</a:t>
+              <a:t>10/7/2021</a:t>
             </a:fld>
             <a:endParaRPr lang="en-US"/>
           </a:p>
@@ -12339,7 +12323,7 @@
           <a:p>
             <a:fld id="{5958763E-B898-436D-883D-03711491D54A}" type="datetimeFigureOut">
               <a:rPr lang="en-US" smtClean="0"/>
-              <a:t>6/24/2021</a:t>
+              <a:t>10/7/2021</a:t>
             </a:fld>
             <a:endParaRPr lang="en-US"/>
           </a:p>
@@ -12463,7 +12447,7 @@
           <a:p>
             <a:fld id="{5958763E-B898-436D-883D-03711491D54A}" type="datetimeFigureOut">
               <a:rPr lang="en-US" smtClean="0"/>
-              <a:t>6/24/2021</a:t>
+              <a:t>10/7/2021</a:t>
             </a:fld>
             <a:endParaRPr lang="en-US"/>
           </a:p>
@@ -12587,7 +12571,7 @@
           <a:p>
             <a:fld id="{5958763E-B898-436D-883D-03711491D54A}" type="datetimeFigureOut">
               <a:rPr lang="en-US" smtClean="0"/>
-              <a:t>6/24/2021</a:t>
+              <a:t>10/7/2021</a:t>
             </a:fld>
             <a:endParaRPr lang="en-US"/>
           </a:p>
@@ -12720,7 +12704,7 @@
           <a:p>
             <a:fld id="{5958763E-B898-436D-883D-03711491D54A}" type="datetimeFigureOut">
               <a:rPr lang="en-US" smtClean="0"/>
-              <a:t>6/24/2021</a:t>
+              <a:t>10/7/2021</a:t>
             </a:fld>
             <a:endParaRPr lang="en-US"/>
           </a:p>
@@ -16059,7 +16043,7 @@
             <a:fld id="{1C2D31DE-C454-491C-B5C3-F097855E3DF7}" type="datetime4">
               <a:rPr lang="en-US" smtClean="0"/>
               <a:pPr/>
-              <a:t>June 24, 2021</a:t>
+              <a:t>October 7, 2021</a:t>
             </a:fld>
             <a:endParaRPr lang="en-US" dirty="0"/>
           </a:p>
@@ -28295,7 +28279,7 @@
           <a:p>
             <a:fld id="{5958763E-B898-436D-883D-03711491D54A}" type="datetimeFigureOut">
               <a:rPr lang="en-US" smtClean="0"/>
-              <a:t>6/24/2021</a:t>
+              <a:t>10/7/2021</a:t>
             </a:fld>
             <a:endParaRPr lang="en-US"/>
           </a:p>
@@ -28697,7 +28681,7 @@
           <a:p>
             <a:fld id="{5958763E-B898-436D-883D-03711491D54A}" type="datetimeFigureOut">
               <a:rPr lang="en-US" smtClean="0"/>
-              <a:t>6/24/2021</a:t>
+              <a:t>10/7/2021</a:t>
             </a:fld>
             <a:endParaRPr lang="en-US"/>
           </a:p>
@@ -28991,7 +28975,7 @@
           <a:p>
             <a:fld id="{5958763E-B898-436D-883D-03711491D54A}" type="datetimeFigureOut">
               <a:rPr lang="en-US" smtClean="0"/>
-              <a:t>6/24/2021</a:t>
+              <a:t>10/7/2021</a:t>
             </a:fld>
             <a:endParaRPr lang="en-US"/>
           </a:p>
@@ -29192,7 +29176,7 @@
           <a:p>
             <a:fld id="{5958763E-B898-436D-883D-03711491D54A}" type="datetimeFigureOut">
               <a:rPr lang="en-US" smtClean="0"/>
-              <a:t>6/24/2021</a:t>
+              <a:t>10/7/2021</a:t>
             </a:fld>
             <a:endParaRPr lang="en-US"/>
           </a:p>
@@ -29453,7 +29437,7 @@
           <a:p>
             <a:fld id="{5958763E-B898-436D-883D-03711491D54A}" type="datetimeFigureOut">
               <a:rPr lang="en-US" smtClean="0"/>
-              <a:t>6/24/2021</a:t>
+              <a:t>10/7/2021</a:t>
             </a:fld>
             <a:endParaRPr lang="en-US"/>
           </a:p>
@@ -29961,7 +29945,7 @@
           <a:p>
             <a:fld id="{5958763E-B898-436D-883D-03711491D54A}" type="datetimeFigureOut">
               <a:rPr lang="en-US" smtClean="0"/>
-              <a:t>6/24/2021</a:t>
+              <a:t>10/7/2021</a:t>
             </a:fld>
             <a:endParaRPr lang="en-US"/>
           </a:p>
@@ -30440,7 +30424,7 @@
           <a:p>
             <a:fld id="{5958763E-B898-436D-883D-03711491D54A}" type="datetimeFigureOut">
               <a:rPr lang="en-US" smtClean="0"/>
-              <a:t>6/24/2021</a:t>
+              <a:t>10/7/2021</a:t>
             </a:fld>
             <a:endParaRPr lang="en-US"/>
           </a:p>
@@ -31259,7 +31243,7 @@
           <a:p>
             <a:fld id="{5958763E-B898-436D-883D-03711491D54A}" type="datetimeFigureOut">
               <a:rPr lang="en-US" smtClean="0"/>
-              <a:t>6/24/2021</a:t>
+              <a:t>10/7/2021</a:t>
             </a:fld>
             <a:endParaRPr lang="en-US"/>
           </a:p>
@@ -31460,7 +31444,7 @@
           <a:p>
             <a:fld id="{5958763E-B898-436D-883D-03711491D54A}" type="datetimeFigureOut">
               <a:rPr lang="en-US" smtClean="0"/>
-              <a:t>6/24/2021</a:t>
+              <a:t>10/7/2021</a:t>
             </a:fld>
             <a:endParaRPr lang="en-US"/>
           </a:p>
@@ -31795,7 +31779,7 @@
           <a:p>
             <a:fld id="{5958763E-B898-436D-883D-03711491D54A}" type="datetimeFigureOut">
               <a:rPr lang="en-US" smtClean="0"/>
-              <a:t>6/24/2021</a:t>
+              <a:t>10/7/2021</a:t>
             </a:fld>
             <a:endParaRPr lang="en-US"/>
           </a:p>
@@ -32025,7 +32009,7 @@
           <a:p>
             <a:fld id="{5958763E-B898-436D-883D-03711491D54A}" type="datetimeFigureOut">
               <a:rPr lang="en-US" smtClean="0"/>
-              <a:t>6/24/2021</a:t>
+              <a:t>10/7/2021</a:t>
             </a:fld>
             <a:endParaRPr lang="en-US"/>
           </a:p>
@@ -32269,7 +32253,7 @@
           <a:p>
             <a:fld id="{5958763E-B898-436D-883D-03711491D54A}" type="datetimeFigureOut">
               <a:rPr lang="en-US" smtClean="0"/>
-              <a:t>6/24/2021</a:t>
+              <a:t>10/7/2021</a:t>
             </a:fld>
             <a:endParaRPr lang="en-US"/>
           </a:p>
@@ -37354,7 +37338,7 @@
               <a:rPr lang="en-US" sz="11500" dirty="0">
                 <a:hlinkClick r:id="rId3"/>
               </a:rPr>
-              <a:t>https://repl.it/@JosephMaxwell/TableExample</a:t>
+              <a:t>https://replit.com/@HylandOutreach/TableExample</a:t>
             </a:r>
             <a:endParaRPr lang="en-US" sz="11500" dirty="0"/>
           </a:p>
@@ -38116,10 +38100,10 @@
               <a:buNone/>
             </a:pPr>
             <a:r>
-              <a:rPr lang="en-US" sz="11500" dirty="0">
+              <a:rPr lang="en-US" sz="9600" dirty="0">
                 <a:hlinkClick r:id="rId3"/>
               </a:rPr>
-              <a:t>https://repl.it/@JosephMaxwell/IFrameExample</a:t>
+              <a:t>https://replit.com/@HylandOutreach/IFrameExample</a:t>
             </a:r>
             <a:endParaRPr lang="en-US" sz="16600" dirty="0"/>
           </a:p>

</xml_diff>

<commit_message>
add questions slide to tables presentation
</commit_message>
<xml_diff>
--- a/Week04/TablesAndIFrames.pptx
+++ b/Week04/TablesAndIFrames.pptx
@@ -5,7 +5,7 @@
     <p:sldMasterId id="2147483648" r:id="rId1"/>
   </p:sldMasterIdLst>
   <p:notesMasterIdLst>
-    <p:notesMasterId r:id="rId11"/>
+    <p:notesMasterId r:id="rId12"/>
   </p:notesMasterIdLst>
   <p:sldIdLst>
     <p:sldId id="258" r:id="rId2"/>
@@ -17,6 +17,7 @@
     <p:sldId id="310" r:id="rId8"/>
     <p:sldId id="312" r:id="rId9"/>
     <p:sldId id="311" r:id="rId10"/>
+    <p:sldId id="313" r:id="rId11"/>
   </p:sldIdLst>
   <p:sldSz cx="12192000" cy="6858000"/>
   <p:notesSz cx="6858000" cy="9144000"/>
@@ -216,7 +217,7 @@
           <a:p>
             <a:fld id="{19104133-B5B0-4351-8158-4F0E5EB1E2BF}" type="datetimeFigureOut">
               <a:rPr lang="en-US" smtClean="0"/>
-              <a:t>10/7/2021</a:t>
+              <a:t>10/13/2021</a:t>
             </a:fld>
             <a:endParaRPr lang="en-US"/>
           </a:p>
@@ -1187,7 +1188,7 @@
             <a:fld id="{1C2D31DE-C454-491C-B5C3-F097855E3DF7}" type="datetime4">
               <a:rPr lang="en-US" smtClean="0"/>
               <a:pPr/>
-              <a:t>October 7, 2021</a:t>
+              <a:t>October 13, 2021</a:t>
             </a:fld>
             <a:endParaRPr lang="en-US" dirty="0"/>
           </a:p>
@@ -4579,7 +4580,7 @@
           <a:p>
             <a:fld id="{5958763E-B898-436D-883D-03711491D54A}" type="datetimeFigureOut">
               <a:rPr lang="en-US" smtClean="0"/>
-              <a:t>10/7/2021</a:t>
+              <a:t>10/13/2021</a:t>
             </a:fld>
             <a:endParaRPr lang="en-US"/>
           </a:p>
@@ -4772,7 +4773,7 @@
           <a:p>
             <a:fld id="{5958763E-B898-436D-883D-03711491D54A}" type="datetimeFigureOut">
               <a:rPr lang="en-US" smtClean="0"/>
-              <a:t>10/7/2021</a:t>
+              <a:t>10/13/2021</a:t>
             </a:fld>
             <a:endParaRPr lang="en-US"/>
           </a:p>
@@ -5022,7 +5023,7 @@
           <a:p>
             <a:fld id="{5958763E-B898-436D-883D-03711491D54A}" type="datetimeFigureOut">
               <a:rPr lang="en-US" smtClean="0"/>
-              <a:t>10/7/2021</a:t>
+              <a:t>10/13/2021</a:t>
             </a:fld>
             <a:endParaRPr lang="en-US"/>
           </a:p>
@@ -5370,7 +5371,7 @@
           <a:p>
             <a:fld id="{5958763E-B898-436D-883D-03711491D54A}" type="datetimeFigureOut">
               <a:rPr lang="en-US" smtClean="0"/>
-              <a:t>10/7/2021</a:t>
+              <a:t>10/13/2021</a:t>
             </a:fld>
             <a:endParaRPr lang="en-US"/>
           </a:p>
@@ -5786,7 +5787,7 @@
           <a:p>
             <a:fld id="{5958763E-B898-436D-883D-03711491D54A}" type="datetimeFigureOut">
               <a:rPr lang="en-US" smtClean="0"/>
-              <a:t>10/7/2021</a:t>
+              <a:t>10/13/2021</a:t>
             </a:fld>
             <a:endParaRPr lang="en-US"/>
           </a:p>
@@ -6287,7 +6288,7 @@
           <a:p>
             <a:fld id="{5958763E-B898-436D-883D-03711491D54A}" type="datetimeFigureOut">
               <a:rPr lang="en-US" smtClean="0"/>
-              <a:t>10/7/2021</a:t>
+              <a:t>10/13/2021</a:t>
             </a:fld>
             <a:endParaRPr lang="en-US"/>
           </a:p>
@@ -6738,7 +6739,7 @@
           <a:p>
             <a:fld id="{5958763E-B898-436D-883D-03711491D54A}" type="datetimeFigureOut">
               <a:rPr lang="en-US" smtClean="0"/>
-              <a:t>10/7/2021</a:t>
+              <a:t>10/13/2021</a:t>
             </a:fld>
             <a:endParaRPr lang="en-US"/>
           </a:p>
@@ -7349,7 +7350,7 @@
           <a:p>
             <a:fld id="{5958763E-B898-436D-883D-03711491D54A}" type="datetimeFigureOut">
               <a:rPr lang="en-US" smtClean="0"/>
-              <a:t>10/7/2021</a:t>
+              <a:t>10/13/2021</a:t>
             </a:fld>
             <a:endParaRPr lang="en-US"/>
           </a:p>
@@ -8120,7 +8121,7 @@
           <a:p>
             <a:fld id="{5958763E-B898-436D-883D-03711491D54A}" type="datetimeFigureOut">
               <a:rPr lang="en-US" smtClean="0"/>
-              <a:t>10/7/2021</a:t>
+              <a:t>10/13/2021</a:t>
             </a:fld>
             <a:endParaRPr lang="en-US"/>
           </a:p>
@@ -8224,7 +8225,7 @@
           <a:p>
             <a:fld id="{5958763E-B898-436D-883D-03711491D54A}" type="datetimeFigureOut">
               <a:rPr lang="en-US" smtClean="0"/>
-              <a:t>10/7/2021</a:t>
+              <a:t>10/13/2021</a:t>
             </a:fld>
             <a:endParaRPr lang="en-US"/>
           </a:p>
@@ -8551,7 +8552,7 @@
             <a:fld id="{1C2D31DE-C454-491C-B5C3-F097855E3DF7}" type="datetime4">
               <a:rPr lang="en-US" smtClean="0"/>
               <a:pPr/>
-              <a:t>October 7, 2021</a:t>
+              <a:t>October 13, 2021</a:t>
             </a:fld>
             <a:endParaRPr lang="en-US" dirty="0"/>
           </a:p>
@@ -11703,7 +11704,7 @@
           <a:p>
             <a:fld id="{5958763E-B898-436D-883D-03711491D54A}" type="datetimeFigureOut">
               <a:rPr lang="en-US" smtClean="0"/>
-              <a:t>10/7/2021</a:t>
+              <a:t>10/13/2021</a:t>
             </a:fld>
             <a:endParaRPr lang="en-US"/>
           </a:p>
@@ -11827,7 +11828,7 @@
           <a:p>
             <a:fld id="{5958763E-B898-436D-883D-03711491D54A}" type="datetimeFigureOut">
               <a:rPr lang="en-US" smtClean="0"/>
-              <a:t>10/7/2021</a:t>
+              <a:t>10/13/2021</a:t>
             </a:fld>
             <a:endParaRPr lang="en-US"/>
           </a:p>
@@ -11951,7 +11952,7 @@
           <a:p>
             <a:fld id="{5958763E-B898-436D-883D-03711491D54A}" type="datetimeFigureOut">
               <a:rPr lang="en-US" smtClean="0"/>
-              <a:t>10/7/2021</a:t>
+              <a:t>10/13/2021</a:t>
             </a:fld>
             <a:endParaRPr lang="en-US"/>
           </a:p>
@@ -12075,7 +12076,7 @@
           <a:p>
             <a:fld id="{5958763E-B898-436D-883D-03711491D54A}" type="datetimeFigureOut">
               <a:rPr lang="en-US" smtClean="0"/>
-              <a:t>10/7/2021</a:t>
+              <a:t>10/13/2021</a:t>
             </a:fld>
             <a:endParaRPr lang="en-US"/>
           </a:p>
@@ -12199,7 +12200,7 @@
           <a:p>
             <a:fld id="{5958763E-B898-436D-883D-03711491D54A}" type="datetimeFigureOut">
               <a:rPr lang="en-US" smtClean="0"/>
-              <a:t>10/7/2021</a:t>
+              <a:t>10/13/2021</a:t>
             </a:fld>
             <a:endParaRPr lang="en-US"/>
           </a:p>
@@ -12323,7 +12324,7 @@
           <a:p>
             <a:fld id="{5958763E-B898-436D-883D-03711491D54A}" type="datetimeFigureOut">
               <a:rPr lang="en-US" smtClean="0"/>
-              <a:t>10/7/2021</a:t>
+              <a:t>10/13/2021</a:t>
             </a:fld>
             <a:endParaRPr lang="en-US"/>
           </a:p>
@@ -12447,7 +12448,7 @@
           <a:p>
             <a:fld id="{5958763E-B898-436D-883D-03711491D54A}" type="datetimeFigureOut">
               <a:rPr lang="en-US" smtClean="0"/>
-              <a:t>10/7/2021</a:t>
+              <a:t>10/13/2021</a:t>
             </a:fld>
             <a:endParaRPr lang="en-US"/>
           </a:p>
@@ -12571,7 +12572,7 @@
           <a:p>
             <a:fld id="{5958763E-B898-436D-883D-03711491D54A}" type="datetimeFigureOut">
               <a:rPr lang="en-US" smtClean="0"/>
-              <a:t>10/7/2021</a:t>
+              <a:t>10/13/2021</a:t>
             </a:fld>
             <a:endParaRPr lang="en-US"/>
           </a:p>
@@ -12704,7 +12705,7 @@
           <a:p>
             <a:fld id="{5958763E-B898-436D-883D-03711491D54A}" type="datetimeFigureOut">
               <a:rPr lang="en-US" smtClean="0"/>
-              <a:t>10/7/2021</a:t>
+              <a:t>10/13/2021</a:t>
             </a:fld>
             <a:endParaRPr lang="en-US"/>
           </a:p>
@@ -16043,7 +16044,7 @@
             <a:fld id="{1C2D31DE-C454-491C-B5C3-F097855E3DF7}" type="datetime4">
               <a:rPr lang="en-US" smtClean="0"/>
               <a:pPr/>
-              <a:t>October 7, 2021</a:t>
+              <a:t>October 13, 2021</a:t>
             </a:fld>
             <a:endParaRPr lang="en-US" dirty="0"/>
           </a:p>
@@ -28279,7 +28280,7 @@
           <a:p>
             <a:fld id="{5958763E-B898-436D-883D-03711491D54A}" type="datetimeFigureOut">
               <a:rPr lang="en-US" smtClean="0"/>
-              <a:t>10/7/2021</a:t>
+              <a:t>10/13/2021</a:t>
             </a:fld>
             <a:endParaRPr lang="en-US"/>
           </a:p>
@@ -28681,7 +28682,7 @@
           <a:p>
             <a:fld id="{5958763E-B898-436D-883D-03711491D54A}" type="datetimeFigureOut">
               <a:rPr lang="en-US" smtClean="0"/>
-              <a:t>10/7/2021</a:t>
+              <a:t>10/13/2021</a:t>
             </a:fld>
             <a:endParaRPr lang="en-US"/>
           </a:p>
@@ -28975,7 +28976,7 @@
           <a:p>
             <a:fld id="{5958763E-B898-436D-883D-03711491D54A}" type="datetimeFigureOut">
               <a:rPr lang="en-US" smtClean="0"/>
-              <a:t>10/7/2021</a:t>
+              <a:t>10/13/2021</a:t>
             </a:fld>
             <a:endParaRPr lang="en-US"/>
           </a:p>
@@ -29176,7 +29177,7 @@
           <a:p>
             <a:fld id="{5958763E-B898-436D-883D-03711491D54A}" type="datetimeFigureOut">
               <a:rPr lang="en-US" smtClean="0"/>
-              <a:t>10/7/2021</a:t>
+              <a:t>10/13/2021</a:t>
             </a:fld>
             <a:endParaRPr lang="en-US"/>
           </a:p>
@@ -29437,7 +29438,7 @@
           <a:p>
             <a:fld id="{5958763E-B898-436D-883D-03711491D54A}" type="datetimeFigureOut">
               <a:rPr lang="en-US" smtClean="0"/>
-              <a:t>10/7/2021</a:t>
+              <a:t>10/13/2021</a:t>
             </a:fld>
             <a:endParaRPr lang="en-US"/>
           </a:p>
@@ -29945,7 +29946,7 @@
           <a:p>
             <a:fld id="{5958763E-B898-436D-883D-03711491D54A}" type="datetimeFigureOut">
               <a:rPr lang="en-US" smtClean="0"/>
-              <a:t>10/7/2021</a:t>
+              <a:t>10/13/2021</a:t>
             </a:fld>
             <a:endParaRPr lang="en-US"/>
           </a:p>
@@ -30424,7 +30425,7 @@
           <a:p>
             <a:fld id="{5958763E-B898-436D-883D-03711491D54A}" type="datetimeFigureOut">
               <a:rPr lang="en-US" smtClean="0"/>
-              <a:t>10/7/2021</a:t>
+              <a:t>10/13/2021</a:t>
             </a:fld>
             <a:endParaRPr lang="en-US"/>
           </a:p>
@@ -31243,7 +31244,7 @@
           <a:p>
             <a:fld id="{5958763E-B898-436D-883D-03711491D54A}" type="datetimeFigureOut">
               <a:rPr lang="en-US" smtClean="0"/>
-              <a:t>10/7/2021</a:t>
+              <a:t>10/13/2021</a:t>
             </a:fld>
             <a:endParaRPr lang="en-US"/>
           </a:p>
@@ -31444,7 +31445,7 @@
           <a:p>
             <a:fld id="{5958763E-B898-436D-883D-03711491D54A}" type="datetimeFigureOut">
               <a:rPr lang="en-US" smtClean="0"/>
-              <a:t>10/7/2021</a:t>
+              <a:t>10/13/2021</a:t>
             </a:fld>
             <a:endParaRPr lang="en-US"/>
           </a:p>
@@ -31779,7 +31780,7 @@
           <a:p>
             <a:fld id="{5958763E-B898-436D-883D-03711491D54A}" type="datetimeFigureOut">
               <a:rPr lang="en-US" smtClean="0"/>
-              <a:t>10/7/2021</a:t>
+              <a:t>10/13/2021</a:t>
             </a:fld>
             <a:endParaRPr lang="en-US"/>
           </a:p>
@@ -32009,7 +32010,7 @@
           <a:p>
             <a:fld id="{5958763E-B898-436D-883D-03711491D54A}" type="datetimeFigureOut">
               <a:rPr lang="en-US" smtClean="0"/>
-              <a:t>10/7/2021</a:t>
+              <a:t>10/13/2021</a:t>
             </a:fld>
             <a:endParaRPr lang="en-US"/>
           </a:p>
@@ -32253,7 +32254,7 @@
           <a:p>
             <a:fld id="{5958763E-B898-436D-883D-03711491D54A}" type="datetimeFigureOut">
               <a:rPr lang="en-US" smtClean="0"/>
-              <a:t>10/7/2021</a:t>
+              <a:t>10/13/2021</a:t>
             </a:fld>
             <a:endParaRPr lang="en-US"/>
           </a:p>
@@ -35792,6 +35793,67 @@
     <p:extLst>
       <p:ext uri="{BB962C8B-B14F-4D97-AF65-F5344CB8AC3E}">
         <p14:creationId xmlns:p14="http://schemas.microsoft.com/office/powerpoint/2010/main" val="1399880830"/>
+      </p:ext>
+    </p:extLst>
+  </p:cSld>
+  <p:clrMapOvr>
+    <a:masterClrMapping/>
+  </p:clrMapOvr>
+  <p:transition>
+    <p:fade/>
+  </p:transition>
+</p:sld>
+</file>
+
+<file path=ppt/slides/slide10.xml><?xml version="1.0" encoding="utf-8"?>
+<p:sld xmlns:a="http://schemas.openxmlformats.org/drawingml/2006/main" xmlns:r="http://schemas.openxmlformats.org/officeDocument/2006/relationships" xmlns:p="http://schemas.openxmlformats.org/presentationml/2006/main">
+  <p:cSld>
+    <p:spTree>
+      <p:nvGrpSpPr>
+        <p:cNvPr id="1" name=""/>
+        <p:cNvGrpSpPr/>
+        <p:nvPr/>
+      </p:nvGrpSpPr>
+      <p:grpSpPr>
+        <a:xfrm>
+          <a:off x="0" y="0"/>
+          <a:ext cx="0" cy="0"/>
+          <a:chOff x="0" y="0"/>
+          <a:chExt cx="0" cy="0"/>
+        </a:xfrm>
+      </p:grpSpPr>
+      <p:sp>
+        <p:nvSpPr>
+          <p:cNvPr id="2" name="Text Placeholder 1">
+            <a:extLst>
+              <a:ext uri="{FF2B5EF4-FFF2-40B4-BE49-F238E27FC236}">
+                <a16:creationId xmlns:a16="http://schemas.microsoft.com/office/drawing/2014/main" id="{23EA4A5B-C31E-41D9-95E7-851F615E0EFB}"/>
+              </a:ext>
+            </a:extLst>
+          </p:cNvPr>
+          <p:cNvSpPr>
+            <a:spLocks noGrp="1"/>
+          </p:cNvSpPr>
+          <p:nvPr>
+            <p:ph type="body" sz="quarter" idx="10"/>
+          </p:nvPr>
+        </p:nvSpPr>
+        <p:spPr/>
+        <p:txBody>
+          <a:bodyPr/>
+          <a:lstStyle/>
+          <a:p>
+            <a:r>
+              <a:rPr lang="en-US" dirty="0"/>
+              <a:t>Questions?</a:t>
+            </a:r>
+          </a:p>
+        </p:txBody>
+      </p:sp>
+    </p:spTree>
+    <p:extLst>
+      <p:ext uri="{BB962C8B-B14F-4D97-AF65-F5344CB8AC3E}">
+        <p14:creationId xmlns:p14="http://schemas.microsoft.com/office/powerpoint/2010/main" val="960076313"/>
       </p:ext>
     </p:extLst>
   </p:cSld>

</xml_diff>

<commit_message>
Update gitbook 2021-10-13 13:49:25
</commit_message>
<xml_diff>
--- a/Week04/TablesAndIFrames.pptx
+++ b/Week04/TablesAndIFrames.pptx
@@ -5,7 +5,7 @@
     <p:sldMasterId id="2147483648" r:id="rId1"/>
   </p:sldMasterIdLst>
   <p:notesMasterIdLst>
-    <p:notesMasterId r:id="rId11"/>
+    <p:notesMasterId r:id="rId12"/>
   </p:notesMasterIdLst>
   <p:sldIdLst>
     <p:sldId id="258" r:id="rId2"/>
@@ -17,6 +17,7 @@
     <p:sldId id="310" r:id="rId8"/>
     <p:sldId id="312" r:id="rId9"/>
     <p:sldId id="311" r:id="rId10"/>
+    <p:sldId id="313" r:id="rId11"/>
   </p:sldIdLst>
   <p:sldSz cx="12192000" cy="6858000"/>
   <p:notesSz cx="6858000" cy="9144000"/>
@@ -216,7 +217,7 @@
           <a:p>
             <a:fld id="{19104133-B5B0-4351-8158-4F0E5EB1E2BF}" type="datetimeFigureOut">
               <a:rPr lang="en-US" smtClean="0"/>
-              <a:t>10/7/2021</a:t>
+              <a:t>10/13/2021</a:t>
             </a:fld>
             <a:endParaRPr lang="en-US"/>
           </a:p>
@@ -1187,7 +1188,7 @@
             <a:fld id="{1C2D31DE-C454-491C-B5C3-F097855E3DF7}" type="datetime4">
               <a:rPr lang="en-US" smtClean="0"/>
               <a:pPr/>
-              <a:t>October 7, 2021</a:t>
+              <a:t>October 13, 2021</a:t>
             </a:fld>
             <a:endParaRPr lang="en-US" dirty="0"/>
           </a:p>
@@ -4579,7 +4580,7 @@
           <a:p>
             <a:fld id="{5958763E-B898-436D-883D-03711491D54A}" type="datetimeFigureOut">
               <a:rPr lang="en-US" smtClean="0"/>
-              <a:t>10/7/2021</a:t>
+              <a:t>10/13/2021</a:t>
             </a:fld>
             <a:endParaRPr lang="en-US"/>
           </a:p>
@@ -4772,7 +4773,7 @@
           <a:p>
             <a:fld id="{5958763E-B898-436D-883D-03711491D54A}" type="datetimeFigureOut">
               <a:rPr lang="en-US" smtClean="0"/>
-              <a:t>10/7/2021</a:t>
+              <a:t>10/13/2021</a:t>
             </a:fld>
             <a:endParaRPr lang="en-US"/>
           </a:p>
@@ -5022,7 +5023,7 @@
           <a:p>
             <a:fld id="{5958763E-B898-436D-883D-03711491D54A}" type="datetimeFigureOut">
               <a:rPr lang="en-US" smtClean="0"/>
-              <a:t>10/7/2021</a:t>
+              <a:t>10/13/2021</a:t>
             </a:fld>
             <a:endParaRPr lang="en-US"/>
           </a:p>
@@ -5370,7 +5371,7 @@
           <a:p>
             <a:fld id="{5958763E-B898-436D-883D-03711491D54A}" type="datetimeFigureOut">
               <a:rPr lang="en-US" smtClean="0"/>
-              <a:t>10/7/2021</a:t>
+              <a:t>10/13/2021</a:t>
             </a:fld>
             <a:endParaRPr lang="en-US"/>
           </a:p>
@@ -5786,7 +5787,7 @@
           <a:p>
             <a:fld id="{5958763E-B898-436D-883D-03711491D54A}" type="datetimeFigureOut">
               <a:rPr lang="en-US" smtClean="0"/>
-              <a:t>10/7/2021</a:t>
+              <a:t>10/13/2021</a:t>
             </a:fld>
             <a:endParaRPr lang="en-US"/>
           </a:p>
@@ -6287,7 +6288,7 @@
           <a:p>
             <a:fld id="{5958763E-B898-436D-883D-03711491D54A}" type="datetimeFigureOut">
               <a:rPr lang="en-US" smtClean="0"/>
-              <a:t>10/7/2021</a:t>
+              <a:t>10/13/2021</a:t>
             </a:fld>
             <a:endParaRPr lang="en-US"/>
           </a:p>
@@ -6738,7 +6739,7 @@
           <a:p>
             <a:fld id="{5958763E-B898-436D-883D-03711491D54A}" type="datetimeFigureOut">
               <a:rPr lang="en-US" smtClean="0"/>
-              <a:t>10/7/2021</a:t>
+              <a:t>10/13/2021</a:t>
             </a:fld>
             <a:endParaRPr lang="en-US"/>
           </a:p>
@@ -7349,7 +7350,7 @@
           <a:p>
             <a:fld id="{5958763E-B898-436D-883D-03711491D54A}" type="datetimeFigureOut">
               <a:rPr lang="en-US" smtClean="0"/>
-              <a:t>10/7/2021</a:t>
+              <a:t>10/13/2021</a:t>
             </a:fld>
             <a:endParaRPr lang="en-US"/>
           </a:p>
@@ -8120,7 +8121,7 @@
           <a:p>
             <a:fld id="{5958763E-B898-436D-883D-03711491D54A}" type="datetimeFigureOut">
               <a:rPr lang="en-US" smtClean="0"/>
-              <a:t>10/7/2021</a:t>
+              <a:t>10/13/2021</a:t>
             </a:fld>
             <a:endParaRPr lang="en-US"/>
           </a:p>
@@ -8224,7 +8225,7 @@
           <a:p>
             <a:fld id="{5958763E-B898-436D-883D-03711491D54A}" type="datetimeFigureOut">
               <a:rPr lang="en-US" smtClean="0"/>
-              <a:t>10/7/2021</a:t>
+              <a:t>10/13/2021</a:t>
             </a:fld>
             <a:endParaRPr lang="en-US"/>
           </a:p>
@@ -8551,7 +8552,7 @@
             <a:fld id="{1C2D31DE-C454-491C-B5C3-F097855E3DF7}" type="datetime4">
               <a:rPr lang="en-US" smtClean="0"/>
               <a:pPr/>
-              <a:t>October 7, 2021</a:t>
+              <a:t>October 13, 2021</a:t>
             </a:fld>
             <a:endParaRPr lang="en-US" dirty="0"/>
           </a:p>
@@ -11703,7 +11704,7 @@
           <a:p>
             <a:fld id="{5958763E-B898-436D-883D-03711491D54A}" type="datetimeFigureOut">
               <a:rPr lang="en-US" smtClean="0"/>
-              <a:t>10/7/2021</a:t>
+              <a:t>10/13/2021</a:t>
             </a:fld>
             <a:endParaRPr lang="en-US"/>
           </a:p>
@@ -11827,7 +11828,7 @@
           <a:p>
             <a:fld id="{5958763E-B898-436D-883D-03711491D54A}" type="datetimeFigureOut">
               <a:rPr lang="en-US" smtClean="0"/>
-              <a:t>10/7/2021</a:t>
+              <a:t>10/13/2021</a:t>
             </a:fld>
             <a:endParaRPr lang="en-US"/>
           </a:p>
@@ -11951,7 +11952,7 @@
           <a:p>
             <a:fld id="{5958763E-B898-436D-883D-03711491D54A}" type="datetimeFigureOut">
               <a:rPr lang="en-US" smtClean="0"/>
-              <a:t>10/7/2021</a:t>
+              <a:t>10/13/2021</a:t>
             </a:fld>
             <a:endParaRPr lang="en-US"/>
           </a:p>
@@ -12075,7 +12076,7 @@
           <a:p>
             <a:fld id="{5958763E-B898-436D-883D-03711491D54A}" type="datetimeFigureOut">
               <a:rPr lang="en-US" smtClean="0"/>
-              <a:t>10/7/2021</a:t>
+              <a:t>10/13/2021</a:t>
             </a:fld>
             <a:endParaRPr lang="en-US"/>
           </a:p>
@@ -12199,7 +12200,7 @@
           <a:p>
             <a:fld id="{5958763E-B898-436D-883D-03711491D54A}" type="datetimeFigureOut">
               <a:rPr lang="en-US" smtClean="0"/>
-              <a:t>10/7/2021</a:t>
+              <a:t>10/13/2021</a:t>
             </a:fld>
             <a:endParaRPr lang="en-US"/>
           </a:p>
@@ -12323,7 +12324,7 @@
           <a:p>
             <a:fld id="{5958763E-B898-436D-883D-03711491D54A}" type="datetimeFigureOut">
               <a:rPr lang="en-US" smtClean="0"/>
-              <a:t>10/7/2021</a:t>
+              <a:t>10/13/2021</a:t>
             </a:fld>
             <a:endParaRPr lang="en-US"/>
           </a:p>
@@ -12447,7 +12448,7 @@
           <a:p>
             <a:fld id="{5958763E-B898-436D-883D-03711491D54A}" type="datetimeFigureOut">
               <a:rPr lang="en-US" smtClean="0"/>
-              <a:t>10/7/2021</a:t>
+              <a:t>10/13/2021</a:t>
             </a:fld>
             <a:endParaRPr lang="en-US"/>
           </a:p>
@@ -12571,7 +12572,7 @@
           <a:p>
             <a:fld id="{5958763E-B898-436D-883D-03711491D54A}" type="datetimeFigureOut">
               <a:rPr lang="en-US" smtClean="0"/>
-              <a:t>10/7/2021</a:t>
+              <a:t>10/13/2021</a:t>
             </a:fld>
             <a:endParaRPr lang="en-US"/>
           </a:p>
@@ -12704,7 +12705,7 @@
           <a:p>
             <a:fld id="{5958763E-B898-436D-883D-03711491D54A}" type="datetimeFigureOut">
               <a:rPr lang="en-US" smtClean="0"/>
-              <a:t>10/7/2021</a:t>
+              <a:t>10/13/2021</a:t>
             </a:fld>
             <a:endParaRPr lang="en-US"/>
           </a:p>
@@ -16043,7 +16044,7 @@
             <a:fld id="{1C2D31DE-C454-491C-B5C3-F097855E3DF7}" type="datetime4">
               <a:rPr lang="en-US" smtClean="0"/>
               <a:pPr/>
-              <a:t>October 7, 2021</a:t>
+              <a:t>October 13, 2021</a:t>
             </a:fld>
             <a:endParaRPr lang="en-US" dirty="0"/>
           </a:p>
@@ -28279,7 +28280,7 @@
           <a:p>
             <a:fld id="{5958763E-B898-436D-883D-03711491D54A}" type="datetimeFigureOut">
               <a:rPr lang="en-US" smtClean="0"/>
-              <a:t>10/7/2021</a:t>
+              <a:t>10/13/2021</a:t>
             </a:fld>
             <a:endParaRPr lang="en-US"/>
           </a:p>
@@ -28681,7 +28682,7 @@
           <a:p>
             <a:fld id="{5958763E-B898-436D-883D-03711491D54A}" type="datetimeFigureOut">
               <a:rPr lang="en-US" smtClean="0"/>
-              <a:t>10/7/2021</a:t>
+              <a:t>10/13/2021</a:t>
             </a:fld>
             <a:endParaRPr lang="en-US"/>
           </a:p>
@@ -28975,7 +28976,7 @@
           <a:p>
             <a:fld id="{5958763E-B898-436D-883D-03711491D54A}" type="datetimeFigureOut">
               <a:rPr lang="en-US" smtClean="0"/>
-              <a:t>10/7/2021</a:t>
+              <a:t>10/13/2021</a:t>
             </a:fld>
             <a:endParaRPr lang="en-US"/>
           </a:p>
@@ -29176,7 +29177,7 @@
           <a:p>
             <a:fld id="{5958763E-B898-436D-883D-03711491D54A}" type="datetimeFigureOut">
               <a:rPr lang="en-US" smtClean="0"/>
-              <a:t>10/7/2021</a:t>
+              <a:t>10/13/2021</a:t>
             </a:fld>
             <a:endParaRPr lang="en-US"/>
           </a:p>
@@ -29437,7 +29438,7 @@
           <a:p>
             <a:fld id="{5958763E-B898-436D-883D-03711491D54A}" type="datetimeFigureOut">
               <a:rPr lang="en-US" smtClean="0"/>
-              <a:t>10/7/2021</a:t>
+              <a:t>10/13/2021</a:t>
             </a:fld>
             <a:endParaRPr lang="en-US"/>
           </a:p>
@@ -29945,7 +29946,7 @@
           <a:p>
             <a:fld id="{5958763E-B898-436D-883D-03711491D54A}" type="datetimeFigureOut">
               <a:rPr lang="en-US" smtClean="0"/>
-              <a:t>10/7/2021</a:t>
+              <a:t>10/13/2021</a:t>
             </a:fld>
             <a:endParaRPr lang="en-US"/>
           </a:p>
@@ -30424,7 +30425,7 @@
           <a:p>
             <a:fld id="{5958763E-B898-436D-883D-03711491D54A}" type="datetimeFigureOut">
               <a:rPr lang="en-US" smtClean="0"/>
-              <a:t>10/7/2021</a:t>
+              <a:t>10/13/2021</a:t>
             </a:fld>
             <a:endParaRPr lang="en-US"/>
           </a:p>
@@ -31243,7 +31244,7 @@
           <a:p>
             <a:fld id="{5958763E-B898-436D-883D-03711491D54A}" type="datetimeFigureOut">
               <a:rPr lang="en-US" smtClean="0"/>
-              <a:t>10/7/2021</a:t>
+              <a:t>10/13/2021</a:t>
             </a:fld>
             <a:endParaRPr lang="en-US"/>
           </a:p>
@@ -31444,7 +31445,7 @@
           <a:p>
             <a:fld id="{5958763E-B898-436D-883D-03711491D54A}" type="datetimeFigureOut">
               <a:rPr lang="en-US" smtClean="0"/>
-              <a:t>10/7/2021</a:t>
+              <a:t>10/13/2021</a:t>
             </a:fld>
             <a:endParaRPr lang="en-US"/>
           </a:p>
@@ -31779,7 +31780,7 @@
           <a:p>
             <a:fld id="{5958763E-B898-436D-883D-03711491D54A}" type="datetimeFigureOut">
               <a:rPr lang="en-US" smtClean="0"/>
-              <a:t>10/7/2021</a:t>
+              <a:t>10/13/2021</a:t>
             </a:fld>
             <a:endParaRPr lang="en-US"/>
           </a:p>
@@ -32009,7 +32010,7 @@
           <a:p>
             <a:fld id="{5958763E-B898-436D-883D-03711491D54A}" type="datetimeFigureOut">
               <a:rPr lang="en-US" smtClean="0"/>
-              <a:t>10/7/2021</a:t>
+              <a:t>10/13/2021</a:t>
             </a:fld>
             <a:endParaRPr lang="en-US"/>
           </a:p>
@@ -32253,7 +32254,7 @@
           <a:p>
             <a:fld id="{5958763E-B898-436D-883D-03711491D54A}" type="datetimeFigureOut">
               <a:rPr lang="en-US" smtClean="0"/>
-              <a:t>10/7/2021</a:t>
+              <a:t>10/13/2021</a:t>
             </a:fld>
             <a:endParaRPr lang="en-US"/>
           </a:p>
@@ -35792,6 +35793,67 @@
     <p:extLst>
       <p:ext uri="{BB962C8B-B14F-4D97-AF65-F5344CB8AC3E}">
         <p14:creationId xmlns:p14="http://schemas.microsoft.com/office/powerpoint/2010/main" val="1399880830"/>
+      </p:ext>
+    </p:extLst>
+  </p:cSld>
+  <p:clrMapOvr>
+    <a:masterClrMapping/>
+  </p:clrMapOvr>
+  <p:transition>
+    <p:fade/>
+  </p:transition>
+</p:sld>
+</file>
+
+<file path=ppt/slides/slide10.xml><?xml version="1.0" encoding="utf-8"?>
+<p:sld xmlns:a="http://schemas.openxmlformats.org/drawingml/2006/main" xmlns:r="http://schemas.openxmlformats.org/officeDocument/2006/relationships" xmlns:p="http://schemas.openxmlformats.org/presentationml/2006/main">
+  <p:cSld>
+    <p:spTree>
+      <p:nvGrpSpPr>
+        <p:cNvPr id="1" name=""/>
+        <p:cNvGrpSpPr/>
+        <p:nvPr/>
+      </p:nvGrpSpPr>
+      <p:grpSpPr>
+        <a:xfrm>
+          <a:off x="0" y="0"/>
+          <a:ext cx="0" cy="0"/>
+          <a:chOff x="0" y="0"/>
+          <a:chExt cx="0" cy="0"/>
+        </a:xfrm>
+      </p:grpSpPr>
+      <p:sp>
+        <p:nvSpPr>
+          <p:cNvPr id="2" name="Text Placeholder 1">
+            <a:extLst>
+              <a:ext uri="{FF2B5EF4-FFF2-40B4-BE49-F238E27FC236}">
+                <a16:creationId xmlns:a16="http://schemas.microsoft.com/office/drawing/2014/main" id="{23EA4A5B-C31E-41D9-95E7-851F615E0EFB}"/>
+              </a:ext>
+            </a:extLst>
+          </p:cNvPr>
+          <p:cNvSpPr>
+            <a:spLocks noGrp="1"/>
+          </p:cNvSpPr>
+          <p:nvPr>
+            <p:ph type="body" sz="quarter" idx="10"/>
+          </p:nvPr>
+        </p:nvSpPr>
+        <p:spPr/>
+        <p:txBody>
+          <a:bodyPr/>
+          <a:lstStyle/>
+          <a:p>
+            <a:r>
+              <a:rPr lang="en-US" dirty="0"/>
+              <a:t>Questions?</a:t>
+            </a:r>
+          </a:p>
+        </p:txBody>
+      </p:sp>
+    </p:spTree>
+    <p:extLst>
+      <p:ext uri="{BB962C8B-B14F-4D97-AF65-F5344CB8AC3E}">
+        <p14:creationId xmlns:p14="http://schemas.microsoft.com/office/powerpoint/2010/main" val="960076313"/>
       </p:ext>
     </p:extLst>
   </p:cSld>

</xml_diff>